<commit_message>
geometric distribution formula corrected
</commit_message>
<xml_diff>
--- a/text/Usus.NET.pptx
+++ b/text/Usus.NET.pptx
@@ -8234,8 +8234,12 @@
         <a:p>
           <a:pPr rtl="0"/>
           <a:r>
+            <a:rPr lang="de-DE" i="1" dirty="0" smtClean="0"/>
+            <a:t>Clean Code </a:t>
+          </a:r>
+          <a:r>
             <a:rPr lang="de-DE" dirty="0" smtClean="0"/>
-            <a:t>Clean Code bezeichnet strukturierteren, wartbareren und verständlicheren Quellcode. „Clean Code“ ist der Titel von Robert C. </a:t>
+            <a:t>bezeichnet strukturierteren, wartbareren und verständlicheren Quellcode. „Clean Code“ ist der Titel von Robert C. </a:t>
           </a:r>
           <a:r>
             <a:rPr lang="de-DE" dirty="0" err="1" smtClean="0"/>
@@ -11017,17 +11021,46 @@
       </dgm:t>
     </dgm:pt>
     <dgm:pt modelId="{F3745F33-B0D0-4F7C-A663-E22BFD34C2AB}">
-      <dgm:prSet phldrT="[Text]"/>
+      <dgm:prSet phldrT="[Text]">
+        <dgm:style>
+          <a:lnRef idx="1">
+            <a:schemeClr val="accent3"/>
+          </a:lnRef>
+          <a:fillRef idx="3">
+            <a:schemeClr val="accent3"/>
+          </a:fillRef>
+          <a:effectRef idx="2">
+            <a:schemeClr val="accent3"/>
+          </a:effectRef>
+          <a:fontRef idx="minor">
+            <a:schemeClr val="lt1"/>
+          </a:fontRef>
+        </dgm:style>
+      </dgm:prSet>
       <dgm:spPr/>
       <dgm:t>
         <a:bodyPr/>
         <a:lstStyle/>
         <a:p>
           <a:r>
-            <a:rPr lang="de-DE" strike="sngStrike" dirty="0" smtClean="0"/>
+            <a:rPr lang="de-DE" strike="noStrike" dirty="0" smtClean="0">
+              <a:solidFill>
+                <a:schemeClr val="accent4">
+                  <a:lumMod val="50000"/>
+                  <a:lumOff val="50000"/>
+                </a:schemeClr>
+              </a:solidFill>
+            </a:rPr>
             <a:t>Förderung von Clean Code</a:t>
           </a:r>
-          <a:endParaRPr lang="de-DE" strike="sngStrike" dirty="0"/>
+          <a:endParaRPr lang="de-DE" strike="noStrike" dirty="0">
+            <a:solidFill>
+              <a:schemeClr val="accent4">
+                <a:lumMod val="50000"/>
+                <a:lumOff val="50000"/>
+              </a:schemeClr>
+            </a:solidFill>
+          </a:endParaRPr>
         </a:p>
       </dgm:t>
     </dgm:pt>
@@ -11062,17 +11095,46 @@
       </dgm:t>
     </dgm:pt>
     <dgm:pt modelId="{D1EF77B1-A154-4F3B-ADCD-AEC4A03FC1B0}">
-      <dgm:prSet phldrT="[Text]"/>
+      <dgm:prSet phldrT="[Text]">
+        <dgm:style>
+          <a:lnRef idx="1">
+            <a:schemeClr val="accent3"/>
+          </a:lnRef>
+          <a:fillRef idx="3">
+            <a:schemeClr val="accent3"/>
+          </a:fillRef>
+          <a:effectRef idx="2">
+            <a:schemeClr val="accent3"/>
+          </a:effectRef>
+          <a:fontRef idx="minor">
+            <a:schemeClr val="lt1"/>
+          </a:fontRef>
+        </dgm:style>
+      </dgm:prSet>
       <dgm:spPr/>
       <dgm:t>
         <a:bodyPr/>
         <a:lstStyle/>
         <a:p>
           <a:r>
-            <a:rPr lang="de-DE" strike="sngStrike" dirty="0" smtClean="0"/>
+            <a:rPr lang="de-DE" strike="noStrike" dirty="0" smtClean="0">
+              <a:solidFill>
+                <a:schemeClr val="accent4">
+                  <a:lumMod val="50000"/>
+                  <a:lumOff val="50000"/>
+                </a:schemeClr>
+              </a:solidFill>
+            </a:rPr>
             <a:t>Interpretation der Softwarequalität</a:t>
           </a:r>
-          <a:endParaRPr lang="de-DE" strike="sngStrike" dirty="0"/>
+          <a:endParaRPr lang="de-DE" strike="noStrike" dirty="0">
+            <a:solidFill>
+              <a:schemeClr val="accent4">
+                <a:lumMod val="50000"/>
+                <a:lumOff val="50000"/>
+              </a:schemeClr>
+            </a:solidFill>
+          </a:endParaRPr>
         </a:p>
       </dgm:t>
     </dgm:pt>
@@ -11393,17 +11455,46 @@
       </dgm:t>
     </dgm:pt>
     <dgm:pt modelId="{5BECDAC4-ACC7-4BD7-8AA9-69BCE58FCA57}">
-      <dgm:prSet phldrT="[Text]"/>
+      <dgm:prSet phldrT="[Text]">
+        <dgm:style>
+          <a:lnRef idx="1">
+            <a:schemeClr val="accent3"/>
+          </a:lnRef>
+          <a:fillRef idx="3">
+            <a:schemeClr val="accent3"/>
+          </a:fillRef>
+          <a:effectRef idx="2">
+            <a:schemeClr val="accent3"/>
+          </a:effectRef>
+          <a:fontRef idx="minor">
+            <a:schemeClr val="lt1"/>
+          </a:fontRef>
+        </dgm:style>
+      </dgm:prSet>
       <dgm:spPr/>
       <dgm:t>
         <a:bodyPr/>
         <a:lstStyle/>
         <a:p>
           <a:r>
-            <a:rPr lang="de-DE" strike="sngStrike" dirty="0" smtClean="0"/>
+            <a:rPr lang="de-DE" strike="noStrike" dirty="0" smtClean="0">
+              <a:solidFill>
+                <a:schemeClr val="accent4">
+                  <a:lumMod val="50000"/>
+                  <a:lumOff val="50000"/>
+                </a:schemeClr>
+              </a:solidFill>
+            </a:rPr>
             <a:t>Einsicht in die Codebasis</a:t>
           </a:r>
-          <a:endParaRPr lang="de-DE" strike="sngStrike" dirty="0"/>
+          <a:endParaRPr lang="de-DE" strike="noStrike" dirty="0">
+            <a:solidFill>
+              <a:schemeClr val="accent4">
+                <a:lumMod val="50000"/>
+                <a:lumOff val="50000"/>
+              </a:schemeClr>
+            </a:solidFill>
+          </a:endParaRPr>
         </a:p>
       </dgm:t>
     </dgm:pt>
@@ -11438,17 +11529,46 @@
       </dgm:t>
     </dgm:pt>
     <dgm:pt modelId="{C599B4BA-9475-41B3-BD9F-94FCA6ECC533}">
-      <dgm:prSet phldrT="[Text]"/>
+      <dgm:prSet phldrT="[Text]">
+        <dgm:style>
+          <a:lnRef idx="1">
+            <a:schemeClr val="accent3"/>
+          </a:lnRef>
+          <a:fillRef idx="3">
+            <a:schemeClr val="accent3"/>
+          </a:fillRef>
+          <a:effectRef idx="2">
+            <a:schemeClr val="accent3"/>
+          </a:effectRef>
+          <a:fontRef idx="minor">
+            <a:schemeClr val="lt1"/>
+          </a:fontRef>
+        </dgm:style>
+      </dgm:prSet>
       <dgm:spPr/>
       <dgm:t>
         <a:bodyPr/>
         <a:lstStyle/>
         <a:p>
           <a:r>
-            <a:rPr lang="de-DE" strike="sngStrike" dirty="0" smtClean="0"/>
+            <a:rPr lang="de-DE" strike="noStrike" dirty="0" smtClean="0">
+              <a:solidFill>
+                <a:schemeClr val="accent4">
+                  <a:lumMod val="50000"/>
+                  <a:lumOff val="50000"/>
+                </a:schemeClr>
+              </a:solidFill>
+            </a:rPr>
             <a:t>Erkennen von Problemfällen</a:t>
           </a:r>
-          <a:endParaRPr lang="de-DE" strike="sngStrike" dirty="0"/>
+          <a:endParaRPr lang="de-DE" strike="noStrike" dirty="0">
+            <a:solidFill>
+              <a:schemeClr val="accent4">
+                <a:lumMod val="50000"/>
+                <a:lumOff val="50000"/>
+              </a:schemeClr>
+            </a:solidFill>
+          </a:endParaRPr>
         </a:p>
       </dgm:t>
     </dgm:pt>
@@ -11528,17 +11648,46 @@
       </dgm:t>
     </dgm:pt>
     <dgm:pt modelId="{D1EF77B1-A154-4F3B-ADCD-AEC4A03FC1B0}">
-      <dgm:prSet phldrT="[Text]"/>
+      <dgm:prSet phldrT="[Text]">
+        <dgm:style>
+          <a:lnRef idx="1">
+            <a:schemeClr val="accent3"/>
+          </a:lnRef>
+          <a:fillRef idx="3">
+            <a:schemeClr val="accent3"/>
+          </a:fillRef>
+          <a:effectRef idx="2">
+            <a:schemeClr val="accent3"/>
+          </a:effectRef>
+          <a:fontRef idx="minor">
+            <a:schemeClr val="lt1"/>
+          </a:fontRef>
+        </dgm:style>
+      </dgm:prSet>
       <dgm:spPr/>
       <dgm:t>
         <a:bodyPr/>
         <a:lstStyle/>
         <a:p>
           <a:r>
-            <a:rPr lang="de-DE" strike="sngStrike" dirty="0" smtClean="0"/>
+            <a:rPr lang="de-DE" strike="noStrike" dirty="0" smtClean="0">
+              <a:solidFill>
+                <a:schemeClr val="accent4">
+                  <a:lumMod val="50000"/>
+                  <a:lumOff val="50000"/>
+                </a:schemeClr>
+              </a:solidFill>
+            </a:rPr>
             <a:t>Interpretation der Softwarequalität</a:t>
           </a:r>
-          <a:endParaRPr lang="de-DE" strike="sngStrike" dirty="0"/>
+          <a:endParaRPr lang="de-DE" strike="noStrike" dirty="0">
+            <a:solidFill>
+              <a:schemeClr val="accent4">
+                <a:lumMod val="50000"/>
+                <a:lumOff val="50000"/>
+              </a:schemeClr>
+            </a:solidFill>
+          </a:endParaRPr>
         </a:p>
       </dgm:t>
     </dgm:pt>
@@ -11696,17 +11845,46 @@
       </dgm:t>
     </dgm:pt>
     <dgm:pt modelId="{5BECDAC4-ACC7-4BD7-8AA9-69BCE58FCA57}">
-      <dgm:prSet phldrT="[Text]"/>
+      <dgm:prSet phldrT="[Text]">
+        <dgm:style>
+          <a:lnRef idx="1">
+            <a:schemeClr val="accent3"/>
+          </a:lnRef>
+          <a:fillRef idx="3">
+            <a:schemeClr val="accent3"/>
+          </a:fillRef>
+          <a:effectRef idx="2">
+            <a:schemeClr val="accent3"/>
+          </a:effectRef>
+          <a:fontRef idx="minor">
+            <a:schemeClr val="lt1"/>
+          </a:fontRef>
+        </dgm:style>
+      </dgm:prSet>
       <dgm:spPr/>
       <dgm:t>
         <a:bodyPr/>
         <a:lstStyle/>
         <a:p>
           <a:r>
-            <a:rPr lang="de-DE" strike="sngStrike" dirty="0" smtClean="0"/>
+            <a:rPr lang="de-DE" strike="noStrike" dirty="0" smtClean="0">
+              <a:solidFill>
+                <a:schemeClr val="accent4">
+                  <a:lumMod val="50000"/>
+                  <a:lumOff val="50000"/>
+                </a:schemeClr>
+              </a:solidFill>
+            </a:rPr>
             <a:t>Einsicht in die Codebasis</a:t>
           </a:r>
-          <a:endParaRPr lang="de-DE" strike="sngStrike" dirty="0"/>
+          <a:endParaRPr lang="de-DE" strike="noStrike" dirty="0">
+            <a:solidFill>
+              <a:schemeClr val="accent4">
+                <a:lumMod val="50000"/>
+                <a:lumOff val="50000"/>
+              </a:schemeClr>
+            </a:solidFill>
+          </a:endParaRPr>
         </a:p>
       </dgm:t>
     </dgm:pt>
@@ -11741,17 +11919,46 @@
       </dgm:t>
     </dgm:pt>
     <dgm:pt modelId="{C599B4BA-9475-41B3-BD9F-94FCA6ECC533}">
-      <dgm:prSet phldrT="[Text]"/>
+      <dgm:prSet phldrT="[Text]">
+        <dgm:style>
+          <a:lnRef idx="1">
+            <a:schemeClr val="accent3"/>
+          </a:lnRef>
+          <a:fillRef idx="3">
+            <a:schemeClr val="accent3"/>
+          </a:fillRef>
+          <a:effectRef idx="2">
+            <a:schemeClr val="accent3"/>
+          </a:effectRef>
+          <a:fontRef idx="minor">
+            <a:schemeClr val="lt1"/>
+          </a:fontRef>
+        </dgm:style>
+      </dgm:prSet>
       <dgm:spPr/>
       <dgm:t>
         <a:bodyPr/>
         <a:lstStyle/>
         <a:p>
           <a:r>
-            <a:rPr lang="de-DE" strike="sngStrike" dirty="0" smtClean="0"/>
+            <a:rPr lang="de-DE" strike="noStrike" dirty="0" smtClean="0">
+              <a:solidFill>
+                <a:schemeClr val="accent4">
+                  <a:lumMod val="50000"/>
+                  <a:lumOff val="50000"/>
+                </a:schemeClr>
+              </a:solidFill>
+            </a:rPr>
             <a:t>Erkennen von Problemfällen</a:t>
           </a:r>
-          <a:endParaRPr lang="de-DE" strike="sngStrike" dirty="0"/>
+          <a:endParaRPr lang="de-DE" strike="noStrike" dirty="0">
+            <a:solidFill>
+              <a:schemeClr val="accent4">
+                <a:lumMod val="50000"/>
+                <a:lumOff val="50000"/>
+              </a:schemeClr>
+            </a:solidFill>
+          </a:endParaRPr>
         </a:p>
       </dgm:t>
     </dgm:pt>
@@ -11786,17 +11993,46 @@
       </dgm:t>
     </dgm:pt>
     <dgm:pt modelId="{F3745F33-B0D0-4F7C-A663-E22BFD34C2AB}">
-      <dgm:prSet phldrT="[Text]"/>
+      <dgm:prSet phldrT="[Text]">
+        <dgm:style>
+          <a:lnRef idx="1">
+            <a:schemeClr val="accent3"/>
+          </a:lnRef>
+          <a:fillRef idx="3">
+            <a:schemeClr val="accent3"/>
+          </a:fillRef>
+          <a:effectRef idx="2">
+            <a:schemeClr val="accent3"/>
+          </a:effectRef>
+          <a:fontRef idx="minor">
+            <a:schemeClr val="lt1"/>
+          </a:fontRef>
+        </dgm:style>
+      </dgm:prSet>
       <dgm:spPr/>
       <dgm:t>
         <a:bodyPr/>
         <a:lstStyle/>
         <a:p>
           <a:r>
-            <a:rPr lang="de-DE" strike="sngStrike" dirty="0" smtClean="0"/>
+            <a:rPr lang="de-DE" strike="noStrike" dirty="0" smtClean="0">
+              <a:solidFill>
+                <a:schemeClr val="accent4">
+                  <a:lumMod val="50000"/>
+                  <a:lumOff val="50000"/>
+                </a:schemeClr>
+              </a:solidFill>
+            </a:rPr>
             <a:t>Förderung von Clean Code</a:t>
           </a:r>
-          <a:endParaRPr lang="de-DE" strike="sngStrike" dirty="0"/>
+          <a:endParaRPr lang="de-DE" strike="noStrike" dirty="0">
+            <a:solidFill>
+              <a:schemeClr val="accent4">
+                <a:lumMod val="50000"/>
+                <a:lumOff val="50000"/>
+              </a:schemeClr>
+            </a:solidFill>
+          </a:endParaRPr>
         </a:p>
       </dgm:t>
     </dgm:pt>
@@ -11961,8 +12197,8 @@
     <dgm:cxn modelId="{7A330350-8B9F-4539-AD34-2D462DEE6BFA}" srcId="{8D8EFB5B-A4E8-4144-BC06-05A81497629B}" destId="{5BECDAC4-ACC7-4BD7-8AA9-69BCE58FCA57}" srcOrd="0" destOrd="0" parTransId="{CBEFE6FF-EB76-4D4D-89F4-5F46BBAEDF90}" sibTransId="{3522A706-C4B1-4B5E-BC86-16E0EF69C5AF}"/>
     <dgm:cxn modelId="{D4F725A5-A7CD-48CA-BF33-AE7E39E51A76}" srcId="{8D8EFB5B-A4E8-4144-BC06-05A81497629B}" destId="{C599B4BA-9475-41B3-BD9F-94FCA6ECC533}" srcOrd="1" destOrd="0" parTransId="{13406500-3068-4B70-A037-75DFC3E91AAC}" sibTransId="{78843C47-C094-4CB2-8FF3-889FEDD2DF7D}"/>
     <dgm:cxn modelId="{ACDA5756-492E-4AB2-A989-E8B967BEE2A4}" type="presOf" srcId="{5BECDAC4-ACC7-4BD7-8AA9-69BCE58FCA57}" destId="{2372183F-ABE0-405A-B06C-6D0223575225}" srcOrd="0" destOrd="0" presId="urn:microsoft.com/office/officeart/2005/8/layout/default"/>
+    <dgm:cxn modelId="{A756C186-4F28-4879-A016-ADA33F7DD51C}" type="presOf" srcId="{8D8EFB5B-A4E8-4144-BC06-05A81497629B}" destId="{964B784C-B548-4EBB-86C3-04BBF4D88122}" srcOrd="0" destOrd="0" presId="urn:microsoft.com/office/officeart/2005/8/layout/default"/>
     <dgm:cxn modelId="{C2245E01-84E8-4E6F-87C1-46649E96B0C0}" type="presOf" srcId="{F3745F33-B0D0-4F7C-A663-E22BFD34C2AB}" destId="{E8735D3C-EA26-431B-8465-4E37B17E7E25}" srcOrd="0" destOrd="0" presId="urn:microsoft.com/office/officeart/2005/8/layout/default"/>
-    <dgm:cxn modelId="{A756C186-4F28-4879-A016-ADA33F7DD51C}" type="presOf" srcId="{8D8EFB5B-A4E8-4144-BC06-05A81497629B}" destId="{964B784C-B548-4EBB-86C3-04BBF4D88122}" srcOrd="0" destOrd="0" presId="urn:microsoft.com/office/officeart/2005/8/layout/default"/>
     <dgm:cxn modelId="{4714474F-B79E-44CD-93F7-0F7F55645286}" srcId="{8D8EFB5B-A4E8-4144-BC06-05A81497629B}" destId="{D1EF77B1-A154-4F3B-ADCD-AEC4A03FC1B0}" srcOrd="3" destOrd="0" parTransId="{3EEF1B10-763A-4AFD-B55A-685E37E549F5}" sibTransId="{7560341A-1175-4BC2-8E37-4F7E35836337}"/>
     <dgm:cxn modelId="{17BFF0C2-0D45-4F47-97F0-B367D686BEB1}" type="presOf" srcId="{C599B4BA-9475-41B3-BD9F-94FCA6ECC533}" destId="{04015519-56C3-41C1-8354-98EB09D52274}" srcOrd="0" destOrd="0" presId="urn:microsoft.com/office/officeart/2005/8/layout/default"/>
     <dgm:cxn modelId="{5D678074-354B-4279-979C-30E6931ADBC4}" srcId="{8D8EFB5B-A4E8-4144-BC06-05A81497629B}" destId="{F3745F33-B0D0-4F7C-A663-E22BFD34C2AB}" srcOrd="2" destOrd="0" parTransId="{B880A116-4DF1-4880-BF78-2A3CCD47ADB0}" sibTransId="{D40B150B-B9B1-435F-9584-7B545800056E}"/>
@@ -12390,8 +12626,12 @@
             <a:buChar char="••"/>
           </a:pPr>
           <a:r>
+            <a:rPr lang="de-DE" sz="1700" i="1" kern="1200" dirty="0" smtClean="0"/>
+            <a:t>Clean Code </a:t>
+          </a:r>
+          <a:r>
             <a:rPr lang="de-DE" sz="1700" kern="1200" dirty="0" smtClean="0"/>
-            <a:t>Clean Code bezeichnet strukturierteren, wartbareren und verständlicheren Quellcode. „Clean Code“ ist der Titel von Robert C. </a:t>
+            <a:t>bezeichnet strukturierteren, wartbareren und verständlicheren Quellcode. „Clean Code“ ist der Titel von Robert C. </a:t>
           </a:r>
           <a:r>
             <a:rPr lang="de-DE" sz="1700" kern="1200" dirty="0" err="1" smtClean="0"/>
@@ -14977,36 +15217,55 @@
         <a:prstGeom prst="rect">
           <a:avLst/>
         </a:prstGeom>
-        <a:solidFill>
-          <a:schemeClr val="accent6">
-            <a:hueOff val="0"/>
-            <a:satOff val="0"/>
-            <a:lumOff val="0"/>
-            <a:alphaOff val="0"/>
-          </a:schemeClr>
-        </a:solidFill>
-        <a:ln w="25400" cap="flat" cmpd="sng" algn="ctr">
+        <a:gradFill rotWithShape="1">
+          <a:gsLst>
+            <a:gs pos="0">
+              <a:schemeClr val="accent3">
+                <a:shade val="51000"/>
+                <a:satMod val="130000"/>
+              </a:schemeClr>
+            </a:gs>
+            <a:gs pos="80000">
+              <a:schemeClr val="accent3">
+                <a:shade val="93000"/>
+                <a:satMod val="130000"/>
+              </a:schemeClr>
+            </a:gs>
+            <a:gs pos="100000">
+              <a:schemeClr val="accent3">
+                <a:shade val="94000"/>
+                <a:satMod val="135000"/>
+              </a:schemeClr>
+            </a:gs>
+          </a:gsLst>
+          <a:lin ang="16200000" scaled="0"/>
+        </a:gradFill>
+        <a:ln w="9525" cap="flat" cmpd="sng" algn="ctr">
           <a:solidFill>
-            <a:schemeClr val="lt1">
-              <a:hueOff val="0"/>
-              <a:satOff val="0"/>
-              <a:lumOff val="0"/>
-              <a:alphaOff val="0"/>
+            <a:schemeClr val="accent3">
+              <a:shade val="95000"/>
+              <a:satMod val="105000"/>
             </a:schemeClr>
           </a:solidFill>
           <a:prstDash val="solid"/>
         </a:ln>
-        <a:effectLst/>
+        <a:effectLst>
+          <a:outerShdw blurRad="40000" dist="23000" dir="5400000" rotWithShape="0">
+            <a:srgbClr val="000000">
+              <a:alpha val="35000"/>
+            </a:srgbClr>
+          </a:outerShdw>
+        </a:effectLst>
       </dsp:spPr>
       <dsp:style>
-        <a:lnRef idx="2">
-          <a:scrgbClr r="0" g="0" b="0"/>
+        <a:lnRef idx="1">
+          <a:schemeClr val="accent3"/>
         </a:lnRef>
-        <a:fillRef idx="1">
-          <a:scrgbClr r="0" g="0" b="0"/>
+        <a:fillRef idx="3">
+          <a:schemeClr val="accent3"/>
         </a:fillRef>
-        <a:effectRef idx="0">
-          <a:scrgbClr r="0" g="0" b="0"/>
+        <a:effectRef idx="2">
+          <a:schemeClr val="accent3"/>
         </a:effectRef>
         <a:fontRef idx="minor">
           <a:schemeClr val="lt1"/>
@@ -15030,10 +15289,24 @@
             </a:spcAft>
           </a:pPr>
           <a:r>
-            <a:rPr lang="de-DE" sz="3600" strike="sngStrike" kern="1200" dirty="0" smtClean="0"/>
+            <a:rPr lang="de-DE" sz="3600" strike="noStrike" kern="1200" dirty="0" smtClean="0">
+              <a:solidFill>
+                <a:schemeClr val="accent4">
+                  <a:lumMod val="50000"/>
+                  <a:lumOff val="50000"/>
+                </a:schemeClr>
+              </a:solidFill>
+            </a:rPr>
             <a:t>Förderung von Clean Code</a:t>
           </a:r>
-          <a:endParaRPr lang="de-DE" sz="3600" strike="sngStrike" kern="1200" dirty="0"/>
+          <a:endParaRPr lang="de-DE" sz="3600" strike="noStrike" kern="1200" dirty="0">
+            <a:solidFill>
+              <a:schemeClr val="accent4">
+                <a:lumMod val="50000"/>
+                <a:lumOff val="50000"/>
+              </a:schemeClr>
+            </a:solidFill>
+          </a:endParaRPr>
         </a:p>
       </dsp:txBody>
       <dsp:txXfrm>
@@ -15054,36 +15327,55 @@
         <a:prstGeom prst="rect">
           <a:avLst/>
         </a:prstGeom>
-        <a:solidFill>
-          <a:schemeClr val="accent6">
-            <a:hueOff val="0"/>
-            <a:satOff val="0"/>
-            <a:lumOff val="0"/>
-            <a:alphaOff val="0"/>
-          </a:schemeClr>
-        </a:solidFill>
-        <a:ln w="25400" cap="flat" cmpd="sng" algn="ctr">
+        <a:gradFill rotWithShape="1">
+          <a:gsLst>
+            <a:gs pos="0">
+              <a:schemeClr val="accent3">
+                <a:shade val="51000"/>
+                <a:satMod val="130000"/>
+              </a:schemeClr>
+            </a:gs>
+            <a:gs pos="80000">
+              <a:schemeClr val="accent3">
+                <a:shade val="93000"/>
+                <a:satMod val="130000"/>
+              </a:schemeClr>
+            </a:gs>
+            <a:gs pos="100000">
+              <a:schemeClr val="accent3">
+                <a:shade val="94000"/>
+                <a:satMod val="135000"/>
+              </a:schemeClr>
+            </a:gs>
+          </a:gsLst>
+          <a:lin ang="16200000" scaled="0"/>
+        </a:gradFill>
+        <a:ln w="9525" cap="flat" cmpd="sng" algn="ctr">
           <a:solidFill>
-            <a:schemeClr val="lt1">
-              <a:hueOff val="0"/>
-              <a:satOff val="0"/>
-              <a:lumOff val="0"/>
-              <a:alphaOff val="0"/>
+            <a:schemeClr val="accent3">
+              <a:shade val="95000"/>
+              <a:satMod val="105000"/>
             </a:schemeClr>
           </a:solidFill>
           <a:prstDash val="solid"/>
         </a:ln>
-        <a:effectLst/>
+        <a:effectLst>
+          <a:outerShdw blurRad="40000" dist="23000" dir="5400000" rotWithShape="0">
+            <a:srgbClr val="000000">
+              <a:alpha val="35000"/>
+            </a:srgbClr>
+          </a:outerShdw>
+        </a:effectLst>
       </dsp:spPr>
       <dsp:style>
-        <a:lnRef idx="2">
-          <a:scrgbClr r="0" g="0" b="0"/>
+        <a:lnRef idx="1">
+          <a:schemeClr val="accent3"/>
         </a:lnRef>
-        <a:fillRef idx="1">
-          <a:scrgbClr r="0" g="0" b="0"/>
+        <a:fillRef idx="3">
+          <a:schemeClr val="accent3"/>
         </a:fillRef>
-        <a:effectRef idx="0">
-          <a:scrgbClr r="0" g="0" b="0"/>
+        <a:effectRef idx="2">
+          <a:schemeClr val="accent3"/>
         </a:effectRef>
         <a:fontRef idx="minor">
           <a:schemeClr val="lt1"/>
@@ -15107,10 +15399,24 @@
             </a:spcAft>
           </a:pPr>
           <a:r>
-            <a:rPr lang="de-DE" sz="3600" strike="sngStrike" kern="1200" dirty="0" smtClean="0"/>
+            <a:rPr lang="de-DE" sz="3600" strike="noStrike" kern="1200" dirty="0" smtClean="0">
+              <a:solidFill>
+                <a:schemeClr val="accent4">
+                  <a:lumMod val="50000"/>
+                  <a:lumOff val="50000"/>
+                </a:schemeClr>
+              </a:solidFill>
+            </a:rPr>
             <a:t>Interpretation der Softwarequalität</a:t>
           </a:r>
-          <a:endParaRPr lang="de-DE" sz="3600" strike="sngStrike" kern="1200" dirty="0"/>
+          <a:endParaRPr lang="de-DE" sz="3600" strike="noStrike" kern="1200" dirty="0">
+            <a:solidFill>
+              <a:schemeClr val="accent4">
+                <a:lumMod val="50000"/>
+                <a:lumOff val="50000"/>
+              </a:schemeClr>
+            </a:solidFill>
+          </a:endParaRPr>
         </a:p>
       </dsp:txBody>
       <dsp:txXfrm>
@@ -15315,36 +15621,55 @@
         <a:prstGeom prst="rect">
           <a:avLst/>
         </a:prstGeom>
-        <a:solidFill>
-          <a:schemeClr val="accent6">
-            <a:hueOff val="0"/>
-            <a:satOff val="0"/>
-            <a:lumOff val="0"/>
-            <a:alphaOff val="0"/>
-          </a:schemeClr>
-        </a:solidFill>
-        <a:ln w="25400" cap="flat" cmpd="sng" algn="ctr">
+        <a:gradFill rotWithShape="1">
+          <a:gsLst>
+            <a:gs pos="0">
+              <a:schemeClr val="accent3">
+                <a:shade val="51000"/>
+                <a:satMod val="130000"/>
+              </a:schemeClr>
+            </a:gs>
+            <a:gs pos="80000">
+              <a:schemeClr val="accent3">
+                <a:shade val="93000"/>
+                <a:satMod val="130000"/>
+              </a:schemeClr>
+            </a:gs>
+            <a:gs pos="100000">
+              <a:schemeClr val="accent3">
+                <a:shade val="94000"/>
+                <a:satMod val="135000"/>
+              </a:schemeClr>
+            </a:gs>
+          </a:gsLst>
+          <a:lin ang="16200000" scaled="0"/>
+        </a:gradFill>
+        <a:ln w="9525" cap="flat" cmpd="sng" algn="ctr">
           <a:solidFill>
-            <a:schemeClr val="lt1">
-              <a:hueOff val="0"/>
-              <a:satOff val="0"/>
-              <a:lumOff val="0"/>
-              <a:alphaOff val="0"/>
+            <a:schemeClr val="accent3">
+              <a:shade val="95000"/>
+              <a:satMod val="105000"/>
             </a:schemeClr>
           </a:solidFill>
           <a:prstDash val="solid"/>
         </a:ln>
-        <a:effectLst/>
+        <a:effectLst>
+          <a:outerShdw blurRad="40000" dist="23000" dir="5400000" rotWithShape="0">
+            <a:srgbClr val="000000">
+              <a:alpha val="35000"/>
+            </a:srgbClr>
+          </a:outerShdw>
+        </a:effectLst>
       </dsp:spPr>
       <dsp:style>
-        <a:lnRef idx="2">
-          <a:scrgbClr r="0" g="0" b="0"/>
+        <a:lnRef idx="1">
+          <a:schemeClr val="accent3"/>
         </a:lnRef>
-        <a:fillRef idx="1">
-          <a:scrgbClr r="0" g="0" b="0"/>
+        <a:fillRef idx="3">
+          <a:schemeClr val="accent3"/>
         </a:fillRef>
-        <a:effectRef idx="0">
-          <a:scrgbClr r="0" g="0" b="0"/>
+        <a:effectRef idx="2">
+          <a:schemeClr val="accent3"/>
         </a:effectRef>
         <a:fontRef idx="minor">
           <a:schemeClr val="lt1"/>
@@ -15368,10 +15693,24 @@
             </a:spcAft>
           </a:pPr>
           <a:r>
-            <a:rPr lang="de-DE" sz="3600" strike="sngStrike" kern="1200" dirty="0" smtClean="0"/>
+            <a:rPr lang="de-DE" sz="3600" strike="noStrike" kern="1200" dirty="0" smtClean="0">
+              <a:solidFill>
+                <a:schemeClr val="accent4">
+                  <a:lumMod val="50000"/>
+                  <a:lumOff val="50000"/>
+                </a:schemeClr>
+              </a:solidFill>
+            </a:rPr>
             <a:t>Einsicht in die Codebasis</a:t>
           </a:r>
-          <a:endParaRPr lang="de-DE" sz="3600" strike="sngStrike" kern="1200" dirty="0"/>
+          <a:endParaRPr lang="de-DE" sz="3600" strike="noStrike" kern="1200" dirty="0">
+            <a:solidFill>
+              <a:schemeClr val="accent4">
+                <a:lumMod val="50000"/>
+                <a:lumOff val="50000"/>
+              </a:schemeClr>
+            </a:solidFill>
+          </a:endParaRPr>
         </a:p>
       </dsp:txBody>
       <dsp:txXfrm>
@@ -15392,36 +15731,55 @@
         <a:prstGeom prst="rect">
           <a:avLst/>
         </a:prstGeom>
-        <a:solidFill>
-          <a:schemeClr val="accent6">
-            <a:hueOff val="0"/>
-            <a:satOff val="0"/>
-            <a:lumOff val="0"/>
-            <a:alphaOff val="0"/>
-          </a:schemeClr>
-        </a:solidFill>
-        <a:ln w="25400" cap="flat" cmpd="sng" algn="ctr">
+        <a:gradFill rotWithShape="1">
+          <a:gsLst>
+            <a:gs pos="0">
+              <a:schemeClr val="accent3">
+                <a:shade val="51000"/>
+                <a:satMod val="130000"/>
+              </a:schemeClr>
+            </a:gs>
+            <a:gs pos="80000">
+              <a:schemeClr val="accent3">
+                <a:shade val="93000"/>
+                <a:satMod val="130000"/>
+              </a:schemeClr>
+            </a:gs>
+            <a:gs pos="100000">
+              <a:schemeClr val="accent3">
+                <a:shade val="94000"/>
+                <a:satMod val="135000"/>
+              </a:schemeClr>
+            </a:gs>
+          </a:gsLst>
+          <a:lin ang="16200000" scaled="0"/>
+        </a:gradFill>
+        <a:ln w="9525" cap="flat" cmpd="sng" algn="ctr">
           <a:solidFill>
-            <a:schemeClr val="lt1">
-              <a:hueOff val="0"/>
-              <a:satOff val="0"/>
-              <a:lumOff val="0"/>
-              <a:alphaOff val="0"/>
+            <a:schemeClr val="accent3">
+              <a:shade val="95000"/>
+              <a:satMod val="105000"/>
             </a:schemeClr>
           </a:solidFill>
           <a:prstDash val="solid"/>
         </a:ln>
-        <a:effectLst/>
+        <a:effectLst>
+          <a:outerShdw blurRad="40000" dist="23000" dir="5400000" rotWithShape="0">
+            <a:srgbClr val="000000">
+              <a:alpha val="35000"/>
+            </a:srgbClr>
+          </a:outerShdw>
+        </a:effectLst>
       </dsp:spPr>
       <dsp:style>
-        <a:lnRef idx="2">
-          <a:scrgbClr r="0" g="0" b="0"/>
+        <a:lnRef idx="1">
+          <a:schemeClr val="accent3"/>
         </a:lnRef>
-        <a:fillRef idx="1">
-          <a:scrgbClr r="0" g="0" b="0"/>
+        <a:fillRef idx="3">
+          <a:schemeClr val="accent3"/>
         </a:fillRef>
-        <a:effectRef idx="0">
-          <a:scrgbClr r="0" g="0" b="0"/>
+        <a:effectRef idx="2">
+          <a:schemeClr val="accent3"/>
         </a:effectRef>
         <a:fontRef idx="minor">
           <a:schemeClr val="lt1"/>
@@ -15445,10 +15803,24 @@
             </a:spcAft>
           </a:pPr>
           <a:r>
-            <a:rPr lang="de-DE" sz="3600" strike="sngStrike" kern="1200" dirty="0" smtClean="0"/>
+            <a:rPr lang="de-DE" sz="3600" strike="noStrike" kern="1200" dirty="0" smtClean="0">
+              <a:solidFill>
+                <a:schemeClr val="accent4">
+                  <a:lumMod val="50000"/>
+                  <a:lumOff val="50000"/>
+                </a:schemeClr>
+              </a:solidFill>
+            </a:rPr>
             <a:t>Erkennen von Problemfällen</a:t>
           </a:r>
-          <a:endParaRPr lang="de-DE" sz="3600" strike="sngStrike" kern="1200" dirty="0"/>
+          <a:endParaRPr lang="de-DE" sz="3600" strike="noStrike" kern="1200" dirty="0">
+            <a:solidFill>
+              <a:schemeClr val="accent4">
+                <a:lumMod val="50000"/>
+                <a:lumOff val="50000"/>
+              </a:schemeClr>
+            </a:solidFill>
+          </a:endParaRPr>
         </a:p>
       </dsp:txBody>
       <dsp:txXfrm>
@@ -15546,36 +15918,55 @@
         <a:prstGeom prst="rect">
           <a:avLst/>
         </a:prstGeom>
-        <a:solidFill>
-          <a:schemeClr val="accent6">
-            <a:hueOff val="0"/>
-            <a:satOff val="0"/>
-            <a:lumOff val="0"/>
-            <a:alphaOff val="0"/>
-          </a:schemeClr>
-        </a:solidFill>
-        <a:ln w="25400" cap="flat" cmpd="sng" algn="ctr">
+        <a:gradFill rotWithShape="1">
+          <a:gsLst>
+            <a:gs pos="0">
+              <a:schemeClr val="accent3">
+                <a:shade val="51000"/>
+                <a:satMod val="130000"/>
+              </a:schemeClr>
+            </a:gs>
+            <a:gs pos="80000">
+              <a:schemeClr val="accent3">
+                <a:shade val="93000"/>
+                <a:satMod val="130000"/>
+              </a:schemeClr>
+            </a:gs>
+            <a:gs pos="100000">
+              <a:schemeClr val="accent3">
+                <a:shade val="94000"/>
+                <a:satMod val="135000"/>
+              </a:schemeClr>
+            </a:gs>
+          </a:gsLst>
+          <a:lin ang="16200000" scaled="0"/>
+        </a:gradFill>
+        <a:ln w="9525" cap="flat" cmpd="sng" algn="ctr">
           <a:solidFill>
-            <a:schemeClr val="lt1">
-              <a:hueOff val="0"/>
-              <a:satOff val="0"/>
-              <a:lumOff val="0"/>
-              <a:alphaOff val="0"/>
+            <a:schemeClr val="accent3">
+              <a:shade val="95000"/>
+              <a:satMod val="105000"/>
             </a:schemeClr>
           </a:solidFill>
           <a:prstDash val="solid"/>
         </a:ln>
-        <a:effectLst/>
+        <a:effectLst>
+          <a:outerShdw blurRad="40000" dist="23000" dir="5400000" rotWithShape="0">
+            <a:srgbClr val="000000">
+              <a:alpha val="35000"/>
+            </a:srgbClr>
+          </a:outerShdw>
+        </a:effectLst>
       </dsp:spPr>
       <dsp:style>
-        <a:lnRef idx="2">
-          <a:scrgbClr r="0" g="0" b="0"/>
+        <a:lnRef idx="1">
+          <a:schemeClr val="accent3"/>
         </a:lnRef>
-        <a:fillRef idx="1">
-          <a:scrgbClr r="0" g="0" b="0"/>
+        <a:fillRef idx="3">
+          <a:schemeClr val="accent3"/>
         </a:fillRef>
-        <a:effectRef idx="0">
-          <a:scrgbClr r="0" g="0" b="0"/>
+        <a:effectRef idx="2">
+          <a:schemeClr val="accent3"/>
         </a:effectRef>
         <a:fontRef idx="minor">
           <a:schemeClr val="lt1"/>
@@ -15599,10 +15990,24 @@
             </a:spcAft>
           </a:pPr>
           <a:r>
-            <a:rPr lang="de-DE" sz="3600" strike="sngStrike" kern="1200" dirty="0" smtClean="0"/>
+            <a:rPr lang="de-DE" sz="3600" strike="noStrike" kern="1200" dirty="0" smtClean="0">
+              <a:solidFill>
+                <a:schemeClr val="accent4">
+                  <a:lumMod val="50000"/>
+                  <a:lumOff val="50000"/>
+                </a:schemeClr>
+              </a:solidFill>
+            </a:rPr>
             <a:t>Interpretation der Softwarequalität</a:t>
           </a:r>
-          <a:endParaRPr lang="de-DE" sz="3600" strike="sngStrike" kern="1200" dirty="0"/>
+          <a:endParaRPr lang="de-DE" sz="3600" strike="noStrike" kern="1200" dirty="0">
+            <a:solidFill>
+              <a:schemeClr val="accent4">
+                <a:lumMod val="50000"/>
+                <a:lumOff val="50000"/>
+              </a:schemeClr>
+            </a:solidFill>
+          </a:endParaRPr>
         </a:p>
       </dsp:txBody>
       <dsp:txXfrm>
@@ -15635,36 +16040,55 @@
         <a:prstGeom prst="rect">
           <a:avLst/>
         </a:prstGeom>
-        <a:solidFill>
-          <a:schemeClr val="accent6">
-            <a:hueOff val="0"/>
-            <a:satOff val="0"/>
-            <a:lumOff val="0"/>
-            <a:alphaOff val="0"/>
-          </a:schemeClr>
-        </a:solidFill>
-        <a:ln w="25400" cap="flat" cmpd="sng" algn="ctr">
+        <a:gradFill rotWithShape="1">
+          <a:gsLst>
+            <a:gs pos="0">
+              <a:schemeClr val="accent3">
+                <a:shade val="51000"/>
+                <a:satMod val="130000"/>
+              </a:schemeClr>
+            </a:gs>
+            <a:gs pos="80000">
+              <a:schemeClr val="accent3">
+                <a:shade val="93000"/>
+                <a:satMod val="130000"/>
+              </a:schemeClr>
+            </a:gs>
+            <a:gs pos="100000">
+              <a:schemeClr val="accent3">
+                <a:shade val="94000"/>
+                <a:satMod val="135000"/>
+              </a:schemeClr>
+            </a:gs>
+          </a:gsLst>
+          <a:lin ang="16200000" scaled="0"/>
+        </a:gradFill>
+        <a:ln w="9525" cap="flat" cmpd="sng" algn="ctr">
           <a:solidFill>
-            <a:schemeClr val="lt1">
-              <a:hueOff val="0"/>
-              <a:satOff val="0"/>
-              <a:lumOff val="0"/>
-              <a:alphaOff val="0"/>
+            <a:schemeClr val="accent3">
+              <a:shade val="95000"/>
+              <a:satMod val="105000"/>
             </a:schemeClr>
           </a:solidFill>
           <a:prstDash val="solid"/>
         </a:ln>
-        <a:effectLst/>
+        <a:effectLst>
+          <a:outerShdw blurRad="40000" dist="23000" dir="5400000" rotWithShape="0">
+            <a:srgbClr val="000000">
+              <a:alpha val="35000"/>
+            </a:srgbClr>
+          </a:outerShdw>
+        </a:effectLst>
       </dsp:spPr>
       <dsp:style>
-        <a:lnRef idx="2">
-          <a:scrgbClr r="0" g="0" b="0"/>
+        <a:lnRef idx="1">
+          <a:schemeClr val="accent3"/>
         </a:lnRef>
-        <a:fillRef idx="1">
-          <a:scrgbClr r="0" g="0" b="0"/>
+        <a:fillRef idx="3">
+          <a:schemeClr val="accent3"/>
         </a:fillRef>
-        <a:effectRef idx="0">
-          <a:scrgbClr r="0" g="0" b="0"/>
+        <a:effectRef idx="2">
+          <a:schemeClr val="accent3"/>
         </a:effectRef>
         <a:fontRef idx="minor">
           <a:schemeClr val="lt1"/>
@@ -15688,10 +16112,24 @@
             </a:spcAft>
           </a:pPr>
           <a:r>
-            <a:rPr lang="de-DE" sz="3600" strike="sngStrike" kern="1200" dirty="0" smtClean="0"/>
+            <a:rPr lang="de-DE" sz="3600" strike="noStrike" kern="1200" dirty="0" smtClean="0">
+              <a:solidFill>
+                <a:schemeClr val="accent4">
+                  <a:lumMod val="50000"/>
+                  <a:lumOff val="50000"/>
+                </a:schemeClr>
+              </a:solidFill>
+            </a:rPr>
             <a:t>Einsicht in die Codebasis</a:t>
           </a:r>
-          <a:endParaRPr lang="de-DE" sz="3600" strike="sngStrike" kern="1200" dirty="0"/>
+          <a:endParaRPr lang="de-DE" sz="3600" strike="noStrike" kern="1200" dirty="0">
+            <a:solidFill>
+              <a:schemeClr val="accent4">
+                <a:lumMod val="50000"/>
+                <a:lumOff val="50000"/>
+              </a:schemeClr>
+            </a:solidFill>
+          </a:endParaRPr>
         </a:p>
       </dsp:txBody>
       <dsp:txXfrm>
@@ -15712,36 +16150,55 @@
         <a:prstGeom prst="rect">
           <a:avLst/>
         </a:prstGeom>
-        <a:solidFill>
-          <a:schemeClr val="accent6">
-            <a:hueOff val="0"/>
-            <a:satOff val="0"/>
-            <a:lumOff val="0"/>
-            <a:alphaOff val="0"/>
-          </a:schemeClr>
-        </a:solidFill>
-        <a:ln w="25400" cap="flat" cmpd="sng" algn="ctr">
+        <a:gradFill rotWithShape="1">
+          <a:gsLst>
+            <a:gs pos="0">
+              <a:schemeClr val="accent3">
+                <a:shade val="51000"/>
+                <a:satMod val="130000"/>
+              </a:schemeClr>
+            </a:gs>
+            <a:gs pos="80000">
+              <a:schemeClr val="accent3">
+                <a:shade val="93000"/>
+                <a:satMod val="130000"/>
+              </a:schemeClr>
+            </a:gs>
+            <a:gs pos="100000">
+              <a:schemeClr val="accent3">
+                <a:shade val="94000"/>
+                <a:satMod val="135000"/>
+              </a:schemeClr>
+            </a:gs>
+          </a:gsLst>
+          <a:lin ang="16200000" scaled="0"/>
+        </a:gradFill>
+        <a:ln w="9525" cap="flat" cmpd="sng" algn="ctr">
           <a:solidFill>
-            <a:schemeClr val="lt1">
-              <a:hueOff val="0"/>
-              <a:satOff val="0"/>
-              <a:lumOff val="0"/>
-              <a:alphaOff val="0"/>
+            <a:schemeClr val="accent3">
+              <a:shade val="95000"/>
+              <a:satMod val="105000"/>
             </a:schemeClr>
           </a:solidFill>
           <a:prstDash val="solid"/>
         </a:ln>
-        <a:effectLst/>
+        <a:effectLst>
+          <a:outerShdw blurRad="40000" dist="23000" dir="5400000" rotWithShape="0">
+            <a:srgbClr val="000000">
+              <a:alpha val="35000"/>
+            </a:srgbClr>
+          </a:outerShdw>
+        </a:effectLst>
       </dsp:spPr>
       <dsp:style>
-        <a:lnRef idx="2">
-          <a:scrgbClr r="0" g="0" b="0"/>
+        <a:lnRef idx="1">
+          <a:schemeClr val="accent3"/>
         </a:lnRef>
-        <a:fillRef idx="1">
-          <a:scrgbClr r="0" g="0" b="0"/>
+        <a:fillRef idx="3">
+          <a:schemeClr val="accent3"/>
         </a:fillRef>
-        <a:effectRef idx="0">
-          <a:scrgbClr r="0" g="0" b="0"/>
+        <a:effectRef idx="2">
+          <a:schemeClr val="accent3"/>
         </a:effectRef>
         <a:fontRef idx="minor">
           <a:schemeClr val="lt1"/>
@@ -15765,10 +16222,24 @@
             </a:spcAft>
           </a:pPr>
           <a:r>
-            <a:rPr lang="de-DE" sz="3600" strike="sngStrike" kern="1200" dirty="0" smtClean="0"/>
+            <a:rPr lang="de-DE" sz="3600" strike="noStrike" kern="1200" dirty="0" smtClean="0">
+              <a:solidFill>
+                <a:schemeClr val="accent4">
+                  <a:lumMod val="50000"/>
+                  <a:lumOff val="50000"/>
+                </a:schemeClr>
+              </a:solidFill>
+            </a:rPr>
             <a:t>Erkennen von Problemfällen</a:t>
           </a:r>
-          <a:endParaRPr lang="de-DE" sz="3600" strike="sngStrike" kern="1200" dirty="0"/>
+          <a:endParaRPr lang="de-DE" sz="3600" strike="noStrike" kern="1200" dirty="0">
+            <a:solidFill>
+              <a:schemeClr val="accent4">
+                <a:lumMod val="50000"/>
+                <a:lumOff val="50000"/>
+              </a:schemeClr>
+            </a:solidFill>
+          </a:endParaRPr>
         </a:p>
       </dsp:txBody>
       <dsp:txXfrm>
@@ -15789,36 +16260,55 @@
         <a:prstGeom prst="rect">
           <a:avLst/>
         </a:prstGeom>
-        <a:solidFill>
-          <a:schemeClr val="accent6">
-            <a:hueOff val="0"/>
-            <a:satOff val="0"/>
-            <a:lumOff val="0"/>
-            <a:alphaOff val="0"/>
-          </a:schemeClr>
-        </a:solidFill>
-        <a:ln w="25400" cap="flat" cmpd="sng" algn="ctr">
+        <a:gradFill rotWithShape="1">
+          <a:gsLst>
+            <a:gs pos="0">
+              <a:schemeClr val="accent3">
+                <a:shade val="51000"/>
+                <a:satMod val="130000"/>
+              </a:schemeClr>
+            </a:gs>
+            <a:gs pos="80000">
+              <a:schemeClr val="accent3">
+                <a:shade val="93000"/>
+                <a:satMod val="130000"/>
+              </a:schemeClr>
+            </a:gs>
+            <a:gs pos="100000">
+              <a:schemeClr val="accent3">
+                <a:shade val="94000"/>
+                <a:satMod val="135000"/>
+              </a:schemeClr>
+            </a:gs>
+          </a:gsLst>
+          <a:lin ang="16200000" scaled="0"/>
+        </a:gradFill>
+        <a:ln w="9525" cap="flat" cmpd="sng" algn="ctr">
           <a:solidFill>
-            <a:schemeClr val="lt1">
-              <a:hueOff val="0"/>
-              <a:satOff val="0"/>
-              <a:lumOff val="0"/>
-              <a:alphaOff val="0"/>
+            <a:schemeClr val="accent3">
+              <a:shade val="95000"/>
+              <a:satMod val="105000"/>
             </a:schemeClr>
           </a:solidFill>
           <a:prstDash val="solid"/>
         </a:ln>
-        <a:effectLst/>
+        <a:effectLst>
+          <a:outerShdw blurRad="40000" dist="23000" dir="5400000" rotWithShape="0">
+            <a:srgbClr val="000000">
+              <a:alpha val="35000"/>
+            </a:srgbClr>
+          </a:outerShdw>
+        </a:effectLst>
       </dsp:spPr>
       <dsp:style>
-        <a:lnRef idx="2">
-          <a:scrgbClr r="0" g="0" b="0"/>
+        <a:lnRef idx="1">
+          <a:schemeClr val="accent3"/>
         </a:lnRef>
-        <a:fillRef idx="1">
-          <a:scrgbClr r="0" g="0" b="0"/>
+        <a:fillRef idx="3">
+          <a:schemeClr val="accent3"/>
         </a:fillRef>
-        <a:effectRef idx="0">
-          <a:scrgbClr r="0" g="0" b="0"/>
+        <a:effectRef idx="2">
+          <a:schemeClr val="accent3"/>
         </a:effectRef>
         <a:fontRef idx="minor">
           <a:schemeClr val="lt1"/>
@@ -15842,10 +16332,24 @@
             </a:spcAft>
           </a:pPr>
           <a:r>
-            <a:rPr lang="de-DE" sz="3600" strike="sngStrike" kern="1200" dirty="0" smtClean="0"/>
+            <a:rPr lang="de-DE" sz="3600" strike="noStrike" kern="1200" dirty="0" smtClean="0">
+              <a:solidFill>
+                <a:schemeClr val="accent4">
+                  <a:lumMod val="50000"/>
+                  <a:lumOff val="50000"/>
+                </a:schemeClr>
+              </a:solidFill>
+            </a:rPr>
             <a:t>Förderung von Clean Code</a:t>
           </a:r>
-          <a:endParaRPr lang="de-DE" sz="3600" strike="sngStrike" kern="1200" dirty="0"/>
+          <a:endParaRPr lang="de-DE" sz="3600" strike="noStrike" kern="1200" dirty="0">
+            <a:solidFill>
+              <a:schemeClr val="accent4">
+                <a:lumMod val="50000"/>
+                <a:lumOff val="50000"/>
+              </a:schemeClr>
+            </a:solidFill>
+          </a:endParaRPr>
         </a:p>
       </dsp:txBody>
       <dsp:txXfrm>
@@ -27996,7 +28500,7 @@
             <a:fld id="{69A4D274-F89A-475C-98AC-A35180A58BA7}" type="datetimeFigureOut">
               <a:rPr lang="de-DE" smtClean="0"/>
               <a:pPr/>
-              <a:t>29.08.2012</a:t>
+              <a:t>30.08.2012</a:t>
             </a:fld>
             <a:endParaRPr lang="de-DE"/>
           </a:p>
@@ -28698,7 +29202,7 @@
             <a:fld id="{2132E481-F655-4011-8F04-C9235C2A4B83}" type="datetime1">
               <a:rPr lang="de-DE"/>
               <a:pPr/>
-              <a:t>29.08.2012</a:t>
+              <a:t>30.08.2012</a:t>
             </a:fld>
             <a:endParaRPr lang="de-DE"/>
           </a:p>
@@ -28921,7 +29425,7 @@
             <a:fld id="{931DD153-71D8-4C46-A432-1713C7F792FC}" type="datetime1">
               <a:rPr lang="de-DE"/>
               <a:pPr/>
-              <a:t>29.08.2012</a:t>
+              <a:t>30.08.2012</a:t>
             </a:fld>
             <a:endParaRPr lang="de-DE"/>
           </a:p>
@@ -29113,7 +29617,7 @@
             <a:fld id="{079AF691-E88B-40AF-BE24-228988EBF0AD}" type="datetime1">
               <a:rPr lang="de-DE"/>
               <a:pPr/>
-              <a:t>29.08.2012</a:t>
+              <a:t>30.08.2012</a:t>
             </a:fld>
             <a:endParaRPr lang="de-DE"/>
           </a:p>
@@ -29295,7 +29799,7 @@
             <a:fld id="{CBC0F77A-B02C-46ED-92AE-5313E2DEEECD}" type="datetime1">
               <a:rPr lang="de-DE"/>
               <a:pPr/>
-              <a:t>29.08.2012</a:t>
+              <a:t>30.08.2012</a:t>
             </a:fld>
             <a:endParaRPr lang="de-DE"/>
           </a:p>
@@ -29499,7 +30003,7 @@
             <a:fld id="{1B016BD9-B961-4061-825C-528CF92485FD}" type="datetime1">
               <a:rPr lang="de-DE"/>
               <a:pPr/>
-              <a:t>29.08.2012</a:t>
+              <a:t>30.08.2012</a:t>
             </a:fld>
             <a:endParaRPr lang="de-DE"/>
           </a:p>
@@ -29799,7 +30303,7 @@
             <a:fld id="{A280FF88-694E-4002-9B14-0F12622BD036}" type="datetime1">
               <a:rPr lang="de-DE"/>
               <a:pPr/>
-              <a:t>29.08.2012</a:t>
+              <a:t>30.08.2012</a:t>
             </a:fld>
             <a:endParaRPr lang="de-DE"/>
           </a:p>
@@ -30238,7 +30742,7 @@
             <a:fld id="{C82890F3-9A04-47A6-A7A3-ECB89FFBD575}" type="datetime1">
               <a:rPr lang="de-DE"/>
               <a:pPr/>
-              <a:t>29.08.2012</a:t>
+              <a:t>30.08.2012</a:t>
             </a:fld>
             <a:endParaRPr lang="de-DE"/>
           </a:p>
@@ -30368,7 +30872,7 @@
             <a:fld id="{C16F9097-2E66-461B-B729-D824989516FF}" type="datetime1">
               <a:rPr lang="de-DE"/>
               <a:pPr/>
-              <a:t>29.08.2012</a:t>
+              <a:t>30.08.2012</a:t>
             </a:fld>
             <a:endParaRPr lang="de-DE"/>
           </a:p>
@@ -30475,7 +30979,7 @@
             <a:fld id="{7AC69A8F-2ACC-45D4-A87F-B7D676E1814C}" type="datetime1">
               <a:rPr lang="de-DE"/>
               <a:pPr/>
-              <a:t>29.08.2012</a:t>
+              <a:t>30.08.2012</a:t>
             </a:fld>
             <a:endParaRPr lang="de-DE"/>
           </a:p>
@@ -30764,7 +31268,7 @@
             <a:fld id="{6EA65B51-4750-4E05-9C7D-9527F16C7307}" type="datetime1">
               <a:rPr lang="de-DE"/>
               <a:pPr/>
-              <a:t>29.08.2012</a:t>
+              <a:t>30.08.2012</a:t>
             </a:fld>
             <a:endParaRPr lang="de-DE"/>
           </a:p>
@@ -31033,7 +31537,7 @@
             <a:fld id="{2A05A253-57A7-478E-BB6D-D26F8F225B73}" type="datetime1">
               <a:rPr lang="de-DE"/>
               <a:pPr/>
-              <a:t>29.08.2012</a:t>
+              <a:t>30.08.2012</a:t>
             </a:fld>
             <a:endParaRPr lang="de-DE"/>
           </a:p>
@@ -31372,7 +31876,7 @@
             <a:fld id="{F0C1A889-87E8-48E6-B675-A3932D4416BB}" type="datetime1">
               <a:rPr lang="de-DE"/>
               <a:pPr/>
-              <a:t>29.08.2012</a:t>
+              <a:t>30.08.2012</a:t>
             </a:fld>
             <a:endParaRPr lang="de-DE"/>
           </a:p>
@@ -31956,7 +32460,7 @@
             <a:fld id="{CBC0F77A-B02C-46ED-92AE-5313E2DEEECD}" type="datetime1">
               <a:rPr lang="de-DE" smtClean="0"/>
               <a:pPr/>
-              <a:t>29.08.2012</a:t>
+              <a:t>30.08.2012</a:t>
             </a:fld>
             <a:endParaRPr lang="de-DE"/>
           </a:p>
@@ -31999,6 +32503,13 @@
   <p:transition>
     <p:fade/>
   </p:transition>
+  <p:timing>
+    <p:tnLst>
+      <p:par>
+        <p:cTn id="1" dur="indefinite" restart="never" nodeType="tmRoot"/>
+      </p:par>
+    </p:tnLst>
+  </p:timing>
 </p:sld>
 </file>
 
@@ -32097,7 +32608,7 @@
             <a:fld id="{CBC0F77A-B02C-46ED-92AE-5313E2DEEECD}" type="datetime1">
               <a:rPr lang="de-DE" smtClean="0"/>
               <a:pPr/>
-              <a:t>29.08.2012</a:t>
+              <a:t>30.08.2012</a:t>
             </a:fld>
             <a:endParaRPr lang="de-DE"/>
           </a:p>
@@ -32236,7 +32747,7 @@
             <a:fld id="{CBC0F77A-B02C-46ED-92AE-5313E2DEEECD}" type="datetime1">
               <a:rPr lang="de-DE" smtClean="0"/>
               <a:pPr/>
-              <a:t>29.08.2012</a:t>
+              <a:t>30.08.2012</a:t>
             </a:fld>
             <a:endParaRPr lang="de-DE"/>
           </a:p>
@@ -32279,6 +32790,13 @@
   <p:transition>
     <p:fade/>
   </p:transition>
+  <p:timing>
+    <p:tnLst>
+      <p:par>
+        <p:cTn id="1" dur="indefinite" restart="never" nodeType="tmRoot"/>
+      </p:par>
+    </p:tnLst>
+  </p:timing>
 </p:sld>
 </file>
 
@@ -32400,7 +32918,7 @@
             <a:fld id="{CBC0F77A-B02C-46ED-92AE-5313E2DEEECD}" type="datetime1">
               <a:rPr lang="de-DE" smtClean="0"/>
               <a:pPr/>
-              <a:t>29.08.2012</a:t>
+              <a:t>30.08.2012</a:t>
             </a:fld>
             <a:endParaRPr lang="de-DE"/>
           </a:p>
@@ -32443,6 +32961,13 @@
   <p:transition>
     <p:fade/>
   </p:transition>
+  <p:timing>
+    <p:tnLst>
+      <p:par>
+        <p:cTn id="1" dur="indefinite" restart="never" nodeType="tmRoot"/>
+      </p:par>
+    </p:tnLst>
+  </p:timing>
 </p:sld>
 </file>
 
@@ -32537,7 +33062,7 @@
             <a:fld id="{A280FF88-694E-4002-9B14-0F12622BD036}" type="datetime1">
               <a:rPr lang="de-DE" smtClean="0"/>
               <a:pPr/>
-              <a:t>29.08.2012</a:t>
+              <a:t>30.08.2012</a:t>
             </a:fld>
             <a:endParaRPr lang="de-DE"/>
           </a:p>
@@ -32580,6 +33105,13 @@
   <p:transition>
     <p:fade/>
   </p:transition>
+  <p:timing>
+    <p:tnLst>
+      <p:par>
+        <p:cTn id="1" dur="indefinite" restart="never" nodeType="tmRoot"/>
+      </p:par>
+    </p:tnLst>
+  </p:timing>
 </p:sld>
 </file>
 
@@ -32674,7 +33206,7 @@
             <a:fld id="{A280FF88-694E-4002-9B14-0F12622BD036}" type="datetime1">
               <a:rPr lang="de-DE" smtClean="0"/>
               <a:pPr/>
-              <a:t>29.08.2012</a:t>
+              <a:t>30.08.2012</a:t>
             </a:fld>
             <a:endParaRPr lang="de-DE"/>
           </a:p>
@@ -32717,6 +33249,13 @@
   <p:transition>
     <p:fade/>
   </p:transition>
+  <p:timing>
+    <p:tnLst>
+      <p:par>
+        <p:cTn id="1" dur="indefinite" restart="never" nodeType="tmRoot"/>
+      </p:par>
+    </p:tnLst>
+  </p:timing>
 </p:sld>
 </file>
 
@@ -32807,7 +33346,7 @@
             <a:fld id="{CBC0F77A-B02C-46ED-92AE-5313E2DEEECD}" type="datetime1">
               <a:rPr lang="de-DE" smtClean="0"/>
               <a:pPr/>
-              <a:t>29.08.2012</a:t>
+              <a:t>30.08.2012</a:t>
             </a:fld>
             <a:endParaRPr lang="de-DE"/>
           </a:p>
@@ -32850,6 +33389,13 @@
   <p:transition>
     <p:fade/>
   </p:transition>
+  <p:timing>
+    <p:tnLst>
+      <p:par>
+        <p:cTn id="1" dur="indefinite" restart="never" nodeType="tmRoot"/>
+      </p:par>
+    </p:tnLst>
+  </p:timing>
 </p:sld>
 </file>
 
@@ -33006,7 +33552,7 @@
             <a:fld id="{1B016BD9-B961-4061-825C-528CF92485FD}" type="datetime1">
               <a:rPr lang="de-DE" smtClean="0"/>
               <a:pPr/>
-              <a:t>29.08.2012</a:t>
+              <a:t>30.08.2012</a:t>
             </a:fld>
             <a:endParaRPr lang="de-DE"/>
           </a:p>
@@ -33049,6 +33595,13 @@
   <p:transition>
     <p:fade/>
   </p:transition>
+  <p:timing>
+    <p:tnLst>
+      <p:par>
+        <p:cTn id="1" dur="indefinite" restart="never" nodeType="tmRoot"/>
+      </p:par>
+    </p:tnLst>
+  </p:timing>
 </p:sld>
 </file>
 
@@ -33143,7 +33696,7 @@
             <a:fld id="{1B016BD9-B961-4061-825C-528CF92485FD}" type="datetime1">
               <a:rPr lang="de-DE" smtClean="0"/>
               <a:pPr/>
-              <a:t>29.08.2012</a:t>
+              <a:t>30.08.2012</a:t>
             </a:fld>
             <a:endParaRPr lang="de-DE"/>
           </a:p>
@@ -33306,6 +33859,13 @@
   <p:transition>
     <p:fade/>
   </p:transition>
+  <p:timing>
+    <p:tnLst>
+      <p:par>
+        <p:cTn id="1" dur="indefinite" restart="never" nodeType="tmRoot"/>
+      </p:par>
+    </p:tnLst>
+  </p:timing>
 </p:sld>
 </file>
 
@@ -33400,7 +33960,7 @@
             <a:fld id="{1B016BD9-B961-4061-825C-528CF92485FD}" type="datetime1">
               <a:rPr lang="de-DE" smtClean="0"/>
               <a:pPr/>
-              <a:t>29.08.2012</a:t>
+              <a:t>30.08.2012</a:t>
             </a:fld>
             <a:endParaRPr lang="de-DE"/>
           </a:p>
@@ -33443,6 +34003,13 @@
   <p:transition>
     <p:fade/>
   </p:transition>
+  <p:timing>
+    <p:tnLst>
+      <p:par>
+        <p:cTn id="1" dur="indefinite" restart="never" nodeType="tmRoot"/>
+      </p:par>
+    </p:tnLst>
+  </p:timing>
 </p:sld>
 </file>
 
@@ -33528,7 +34095,7 @@
             <a:fld id="{1B016BD9-B961-4061-825C-528CF92485FD}" type="datetime1">
               <a:rPr lang="de-DE" smtClean="0"/>
               <a:pPr/>
-              <a:t>29.08.2012</a:t>
+              <a:t>30.08.2012</a:t>
             </a:fld>
             <a:endParaRPr lang="de-DE"/>
           </a:p>
@@ -33657,6 +34224,13 @@
   <p:transition>
     <p:fade/>
   </p:transition>
+  <p:timing>
+    <p:tnLst>
+      <p:par>
+        <p:cTn id="1" dur="indefinite" restart="never" nodeType="tmRoot"/>
+      </p:par>
+    </p:tnLst>
+  </p:timing>
 </p:sld>
 </file>
 
@@ -33875,6 +34449,13 @@
   <p:transition>
     <p:fade/>
   </p:transition>
+  <p:timing>
+    <p:tnLst>
+      <p:par>
+        <p:cTn id="1" dur="indefinite" restart="never" nodeType="tmRoot"/>
+      </p:par>
+    </p:tnLst>
+  </p:timing>
 </p:sld>
 </file>
 
@@ -33990,7 +34571,7 @@
             <a:fld id="{1B016BD9-B961-4061-825C-528CF92485FD}" type="datetime1">
               <a:rPr lang="de-DE" smtClean="0"/>
               <a:pPr/>
-              <a:t>29.08.2012</a:t>
+              <a:t>30.08.2012</a:t>
             </a:fld>
             <a:endParaRPr lang="de-DE"/>
           </a:p>
@@ -34123,6 +34704,13 @@
   <p:transition>
     <p:fade/>
   </p:transition>
+  <p:timing>
+    <p:tnLst>
+      <p:par>
+        <p:cTn id="1" dur="indefinite" restart="never" nodeType="tmRoot"/>
+      </p:par>
+    </p:tnLst>
+  </p:timing>
 </p:sld>
 </file>
 
@@ -34203,7 +34791,7 @@
             <a:fld id="{1B016BD9-B961-4061-825C-528CF92485FD}" type="datetime1">
               <a:rPr lang="de-DE" smtClean="0"/>
               <a:pPr/>
-              <a:t>29.08.2012</a:t>
+              <a:t>30.08.2012</a:t>
             </a:fld>
             <a:endParaRPr lang="de-DE"/>
           </a:p>
@@ -34339,6 +34927,13 @@
   <p:transition>
     <p:fade/>
   </p:transition>
+  <p:timing>
+    <p:tnLst>
+      <p:par>
+        <p:cTn id="1" dur="indefinite" restart="never" nodeType="tmRoot"/>
+      </p:par>
+    </p:tnLst>
+  </p:timing>
 </p:sld>
 </file>
 
@@ -34404,7 +34999,7 @@
             <a:fld id="{1B016BD9-B961-4061-825C-528CF92485FD}" type="datetime1">
               <a:rPr lang="de-DE" smtClean="0"/>
               <a:pPr/>
-              <a:t>29.08.2012</a:t>
+              <a:t>30.08.2012</a:t>
             </a:fld>
             <a:endParaRPr lang="de-DE"/>
           </a:p>
@@ -34686,6 +35281,13 @@
   <p:transition>
     <p:fade/>
   </p:transition>
+  <p:timing>
+    <p:tnLst>
+      <p:par>
+        <p:cTn id="1" dur="indefinite" restart="never" nodeType="tmRoot"/>
+      </p:par>
+    </p:tnLst>
+  </p:timing>
 </p:sld>
 </file>
 
@@ -34751,7 +35353,7 @@
             <a:fld id="{1B016BD9-B961-4061-825C-528CF92485FD}" type="datetime1">
               <a:rPr lang="de-DE" smtClean="0"/>
               <a:pPr/>
-              <a:t>29.08.2012</a:t>
+              <a:t>30.08.2012</a:t>
             </a:fld>
             <a:endParaRPr lang="de-DE"/>
           </a:p>
@@ -34791,7 +35393,7 @@
             <p:ph idx="1"/>
             <p:extLst>
               <p:ext uri="{D42A27DB-BD31-4B8C-83A1-F6EECF244321}">
-                <p14:modId xmlns:p14="http://schemas.microsoft.com/office/powerpoint/2010/main" val="1677975197"/>
+                <p14:modId xmlns:p14="http://schemas.microsoft.com/office/powerpoint/2010/main" val="2667425352"/>
               </p:ext>
             </p:extLst>
           </p:nvPr>
@@ -34819,6 +35421,13 @@
   <p:transition>
     <p:fade/>
   </p:transition>
+  <p:timing>
+    <p:tnLst>
+      <p:par>
+        <p:cTn id="1" dur="indefinite" restart="never" nodeType="tmRoot"/>
+      </p:par>
+    </p:tnLst>
+  </p:timing>
 </p:sld>
 </file>
 
@@ -34909,7 +35518,7 @@
             <a:fld id="{CBC0F77A-B02C-46ED-92AE-5313E2DEEECD}" type="datetime1">
               <a:rPr lang="de-DE" smtClean="0"/>
               <a:pPr/>
-              <a:t>29.08.2012</a:t>
+              <a:t>30.08.2012</a:t>
             </a:fld>
             <a:endParaRPr lang="de-DE"/>
           </a:p>
@@ -35108,7 +35717,7 @@
             <a:fld id="{1B016BD9-B961-4061-825C-528CF92485FD}" type="datetime1">
               <a:rPr lang="de-DE" smtClean="0"/>
               <a:pPr/>
-              <a:t>29.08.2012</a:t>
+              <a:t>30.08.2012</a:t>
             </a:fld>
             <a:endParaRPr lang="de-DE"/>
           </a:p>
@@ -35151,6 +35760,13 @@
   <p:transition>
     <p:fade/>
   </p:transition>
+  <p:timing>
+    <p:tnLst>
+      <p:par>
+        <p:cTn id="1" dur="indefinite" restart="never" nodeType="tmRoot"/>
+      </p:par>
+    </p:tnLst>
+  </p:timing>
 </p:sld>
 </file>
 
@@ -35304,7 +35920,7 @@
             <a:fld id="{1B016BD9-B961-4061-825C-528CF92485FD}" type="datetime1">
               <a:rPr lang="de-DE" smtClean="0"/>
               <a:pPr/>
-              <a:t>29.08.2012</a:t>
+              <a:t>30.08.2012</a:t>
             </a:fld>
             <a:endParaRPr lang="de-DE"/>
           </a:p>
@@ -35377,6 +35993,13 @@
   <p:transition>
     <p:fade/>
   </p:transition>
+  <p:timing>
+    <p:tnLst>
+      <p:par>
+        <p:cTn id="1" dur="indefinite" restart="never" nodeType="tmRoot"/>
+      </p:par>
+    </p:tnLst>
+  </p:timing>
 </p:sld>
 </file>
 
@@ -35544,7 +36167,7 @@
             <a:fld id="{1B016BD9-B961-4061-825C-528CF92485FD}" type="datetime1">
               <a:rPr lang="de-DE" smtClean="0"/>
               <a:pPr/>
-              <a:t>29.08.2012</a:t>
+              <a:t>30.08.2012</a:t>
             </a:fld>
             <a:endParaRPr lang="de-DE"/>
           </a:p>
@@ -35587,6 +36210,13 @@
   <p:transition>
     <p:fade/>
   </p:transition>
+  <p:timing>
+    <p:tnLst>
+      <p:par>
+        <p:cTn id="1" dur="indefinite" restart="never" nodeType="tmRoot"/>
+      </p:par>
+    </p:tnLst>
+  </p:timing>
 </p:sld>
 </file>
 
@@ -35745,7 +36375,7 @@
             <a:fld id="{1B016BD9-B961-4061-825C-528CF92485FD}" type="datetime1">
               <a:rPr lang="de-DE" smtClean="0"/>
               <a:pPr/>
-              <a:t>29.08.2012</a:t>
+              <a:t>30.08.2012</a:t>
             </a:fld>
             <a:endParaRPr lang="de-DE"/>
           </a:p>
@@ -35788,6 +36418,13 @@
   <p:transition>
     <p:fade/>
   </p:transition>
+  <p:timing>
+    <p:tnLst>
+      <p:par>
+        <p:cTn id="1" dur="indefinite" restart="never" nodeType="tmRoot"/>
+      </p:par>
+    </p:tnLst>
+  </p:timing>
 </p:sld>
 </file>
 
@@ -35975,7 +36612,7 @@
             <a:fld id="{1B016BD9-B961-4061-825C-528CF92485FD}" type="datetime1">
               <a:rPr lang="de-DE" smtClean="0"/>
               <a:pPr/>
-              <a:t>29.08.2012</a:t>
+              <a:t>30.08.2012</a:t>
             </a:fld>
             <a:endParaRPr lang="de-DE"/>
           </a:p>
@@ -36018,6 +36655,13 @@
   <p:transition>
     <p:fade/>
   </p:transition>
+  <p:timing>
+    <p:tnLst>
+      <p:par>
+        <p:cTn id="1" dur="indefinite" restart="never" nodeType="tmRoot"/>
+      </p:par>
+    </p:tnLst>
+  </p:timing>
 </p:sld>
 </file>
 
@@ -36071,7 +36715,7 @@
             <p:ph idx="1"/>
             <p:extLst>
               <p:ext uri="{D42A27DB-BD31-4B8C-83A1-F6EECF244321}">
-                <p14:modId xmlns:p14="http://schemas.microsoft.com/office/powerpoint/2010/main" val="695206735"/>
+                <p14:modId xmlns:p14="http://schemas.microsoft.com/office/powerpoint/2010/main" val="3222487317"/>
               </p:ext>
             </p:extLst>
           </p:nvPr>
@@ -36146,6 +36790,13 @@
   <p:transition>
     <p:fade/>
   </p:transition>
+  <p:timing>
+    <p:tnLst>
+      <p:par>
+        <p:cTn id="1" dur="indefinite" restart="never" nodeType="tmRoot"/>
+      </p:par>
+    </p:tnLst>
+  </p:timing>
 </p:sld>
 </file>
 
@@ -36240,7 +36891,7 @@
             <a:fld id="{1B016BD9-B961-4061-825C-528CF92485FD}" type="datetime1">
               <a:rPr lang="de-DE" smtClean="0"/>
               <a:pPr/>
-              <a:t>29.08.2012</a:t>
+              <a:t>30.08.2012</a:t>
             </a:fld>
             <a:endParaRPr lang="de-DE"/>
           </a:p>
@@ -36283,6 +36934,13 @@
   <p:transition>
     <p:fade/>
   </p:transition>
+  <p:timing>
+    <p:tnLst>
+      <p:par>
+        <p:cTn id="1" dur="indefinite" restart="never" nodeType="tmRoot"/>
+      </p:par>
+    </p:tnLst>
+  </p:timing>
 </p:sld>
 </file>
 
@@ -36373,7 +37031,7 @@
             <a:fld id="{CBC0F77A-B02C-46ED-92AE-5313E2DEEECD}" type="datetime1">
               <a:rPr lang="de-DE" smtClean="0"/>
               <a:pPr/>
-              <a:t>29.08.2012</a:t>
+              <a:t>30.08.2012</a:t>
             </a:fld>
             <a:endParaRPr lang="de-DE"/>
           </a:p>
@@ -36522,7 +37180,7 @@
             <a:fld id="{1B016BD9-B961-4061-825C-528CF92485FD}" type="datetime1">
               <a:rPr lang="de-DE" smtClean="0"/>
               <a:pPr/>
-              <a:t>29.08.2012</a:t>
+              <a:t>30.08.2012</a:t>
             </a:fld>
             <a:endParaRPr lang="de-DE"/>
           </a:p>
@@ -37010,7 +37668,7 @@
             <a:fld id="{1B016BD9-B961-4061-825C-528CF92485FD}" type="datetime1">
               <a:rPr lang="de-DE" smtClean="0"/>
               <a:pPr/>
-              <a:t>29.08.2012</a:t>
+              <a:t>30.08.2012</a:t>
             </a:fld>
             <a:endParaRPr lang="de-DE"/>
           </a:p>
@@ -37165,7 +37823,7 @@
             <a:fld id="{1B016BD9-B961-4061-825C-528CF92485FD}" type="datetime1">
               <a:rPr lang="de-DE" smtClean="0"/>
               <a:pPr/>
-              <a:t>29.08.2012</a:t>
+              <a:t>30.08.2012</a:t>
             </a:fld>
             <a:endParaRPr lang="de-DE"/>
           </a:p>
@@ -37366,7 +38024,7 @@
             <a:fld id="{1B016BD9-B961-4061-825C-528CF92485FD}" type="datetime1">
               <a:rPr lang="de-DE" smtClean="0"/>
               <a:pPr/>
-              <a:t>29.08.2012</a:t>
+              <a:t>30.08.2012</a:t>
             </a:fld>
             <a:endParaRPr lang="de-DE"/>
           </a:p>
@@ -37537,7 +38195,7 @@
             <a:fld id="{1B016BD9-B961-4061-825C-528CF92485FD}" type="datetime1">
               <a:rPr lang="de-DE" smtClean="0"/>
               <a:pPr/>
-              <a:t>29.08.2012</a:t>
+              <a:t>30.08.2012</a:t>
             </a:fld>
             <a:endParaRPr lang="de-DE"/>
           </a:p>
@@ -37956,7 +38614,7 @@
             <a:fld id="{1B016BD9-B961-4061-825C-528CF92485FD}" type="datetime1">
               <a:rPr lang="de-DE" smtClean="0"/>
               <a:pPr/>
-              <a:t>29.08.2012</a:t>
+              <a:t>30.08.2012</a:t>
             </a:fld>
             <a:endParaRPr lang="de-DE"/>
           </a:p>
@@ -38158,7 +38816,7 @@
             <a:fld id="{CBC0F77A-B02C-46ED-92AE-5313E2DEEECD}" type="datetime1">
               <a:rPr lang="de-DE" smtClean="0"/>
               <a:pPr/>
-              <a:t>29.08.2012</a:t>
+              <a:t>30.08.2012</a:t>
             </a:fld>
             <a:endParaRPr lang="de-DE"/>
           </a:p>
@@ -38284,11 +38942,7 @@
             <a:pPr lvl="1"/>
             <a:r>
               <a:rPr lang="de-DE" dirty="0" smtClean="0"/>
-              <a:t>Kombination von Testabdeckung </a:t>
-            </a:r>
-            <a:r>
-              <a:rPr lang="de-DE" dirty="0" smtClean="0"/>
-              <a:t>und </a:t>
+              <a:t>Kombination von Testabdeckung und </a:t>
             </a:r>
             <a:r>
               <a:rPr lang="de-DE" dirty="0" err="1" smtClean="0"/>
@@ -38296,11 +38950,7 @@
             </a:r>
             <a:r>
               <a:rPr lang="de-DE" dirty="0" smtClean="0"/>
-              <a:t> </a:t>
-            </a:r>
-            <a:r>
-              <a:rPr lang="de-DE" dirty="0" smtClean="0"/>
-              <a:t>Komplexität</a:t>
+              <a:t> Komplexität</a:t>
             </a:r>
           </a:p>
           <a:p>
@@ -38355,11 +39005,7 @@
             <a:pPr lvl="1"/>
             <a:r>
               <a:rPr lang="de-DE" dirty="0" smtClean="0"/>
-              <a:t>Grundlegende </a:t>
-            </a:r>
-            <a:r>
-              <a:rPr lang="de-DE" dirty="0" smtClean="0"/>
-              <a:t>Clean Code-</a:t>
+              <a:t>Grundlegende Clean Code-</a:t>
             </a:r>
             <a:r>
               <a:rPr lang="de-DE" dirty="0" err="1" smtClean="0"/>
@@ -38389,7 +39035,6 @@
               <a:rPr lang="de-DE" dirty="0" smtClean="0"/>
               <a:t>Bsp. Funktionen: „Small!“ („Clean Code“ Seite 34)</a:t>
             </a:r>
-            <a:endParaRPr lang="de-DE" dirty="0" smtClean="0"/>
           </a:p>
           <a:p>
             <a:pPr lvl="1"/>
@@ -38429,7 +39074,7 @@
             <a:fld id="{CBC0F77A-B02C-46ED-92AE-5313E2DEEECD}" type="datetime1">
               <a:rPr lang="de-DE" smtClean="0"/>
               <a:pPr/>
-              <a:t>29.08.2012</a:t>
+              <a:t>30.08.2012</a:t>
             </a:fld>
             <a:endParaRPr lang="de-DE"/>
           </a:p>
@@ -38569,7 +39214,7 @@
             <a:fld id="{CBC0F77A-B02C-46ED-92AE-5313E2DEEECD}" type="datetime1">
               <a:rPr lang="de-DE" smtClean="0"/>
               <a:pPr/>
-              <a:t>29.08.2012</a:t>
+              <a:t>30.08.2012</a:t>
             </a:fld>
             <a:endParaRPr lang="de-DE"/>
           </a:p>
@@ -38612,6 +39257,13 @@
   <p:transition>
     <p:fade/>
   </p:transition>
+  <p:timing>
+    <p:tnLst>
+      <p:par>
+        <p:cTn id="1" dur="indefinite" restart="never" nodeType="tmRoot"/>
+      </p:par>
+    </p:tnLst>
+  </p:timing>
 </p:sld>
 </file>
 
@@ -38700,7 +39352,7 @@
             <a:fld id="{CBC0F77A-B02C-46ED-92AE-5313E2DEEECD}" type="datetime1">
               <a:rPr lang="de-DE" smtClean="0"/>
               <a:pPr/>
-              <a:t>29.08.2012</a:t>
+              <a:t>30.08.2012</a:t>
             </a:fld>
             <a:endParaRPr lang="de-DE"/>
           </a:p>
@@ -38790,9 +39442,85 @@
           </a:prstGeom>
         </p:spPr>
       </p:pic>
+      <p:sp>
+        <p:nvSpPr>
+          <p:cNvPr id="12" name="Textfeld 11"/>
+          <p:cNvSpPr txBox="1"/>
+          <p:nvPr/>
+        </p:nvSpPr>
+        <p:spPr>
+          <a:xfrm>
+            <a:off x="6657476" y="3861048"/>
+            <a:ext cx="1944216" cy="2031325"/>
+          </a:xfrm>
+          <a:prstGeom prst="rect">
+            <a:avLst/>
+          </a:prstGeom>
+        </p:spPr>
+        <p:style>
+          <a:lnRef idx="1">
+            <a:schemeClr val="accent2"/>
+          </a:lnRef>
+          <a:fillRef idx="2">
+            <a:schemeClr val="accent2"/>
+          </a:fillRef>
+          <a:effectRef idx="1">
+            <a:schemeClr val="accent2"/>
+          </a:effectRef>
+          <a:fontRef idx="minor">
+            <a:schemeClr val="dk1"/>
+          </a:fontRef>
+        </p:style>
+        <p:txBody>
+          <a:bodyPr wrap="square" rtlCol="0">
+            <a:spAutoFit/>
+          </a:bodyPr>
+          <a:lstStyle/>
+          <a:p>
+            <a:pPr algn="ctr"/>
+            <a:r>
+              <a:rPr lang="de-DE" dirty="0">
+                <a:solidFill>
+                  <a:schemeClr val="tx1"/>
+                </a:solidFill>
+              </a:rPr>
+              <a:t>Je größer das λ, desto eher entsprechen die Werte der </a:t>
+            </a:r>
+            <a:r>
+              <a:rPr lang="de-DE" dirty="0" smtClean="0">
+                <a:solidFill>
+                  <a:schemeClr val="tx1"/>
+                </a:solidFill>
+              </a:rPr>
+              <a:t>betrachteten Metrik </a:t>
+            </a:r>
+            <a:r>
+              <a:rPr lang="de-DE" dirty="0">
+                <a:solidFill>
+                  <a:schemeClr val="tx1"/>
+                </a:solidFill>
+              </a:rPr>
+              <a:t>dem Clean Code-Paradigma</a:t>
+            </a:r>
+            <a:r>
+              <a:rPr lang="de-DE" dirty="0" smtClean="0">
+                <a:solidFill>
+                  <a:schemeClr val="tx1"/>
+                </a:solidFill>
+              </a:rPr>
+              <a:t>.</a:t>
+            </a:r>
+            <a:endParaRPr lang="de-DE" dirty="0">
+              <a:solidFill>
+                <a:schemeClr val="tx1"/>
+              </a:solidFill>
+            </a:endParaRPr>
+          </a:p>
+        </p:txBody>
+      </p:sp>
       <p:pic>
         <p:nvPicPr>
-          <p:cNvPr id="2050" name="Picture 2"/>
+          <p:cNvPr id="1026" name="Picture 2"/>
           <p:cNvPicPr>
             <a:picLocks noChangeAspect="1" noChangeArrowheads="1"/>
           </p:cNvPicPr>
@@ -38813,8 +39541,8 @@
         </p:blipFill>
         <p:spPr bwMode="auto">
           <a:xfrm>
-            <a:off x="2051720" y="4088108"/>
-            <a:ext cx="4245716" cy="828960"/>
+            <a:off x="1907704" y="3861049"/>
+            <a:ext cx="4652379" cy="792088"/>
           </a:xfrm>
           <a:prstGeom prst="rect">
             <a:avLst/>
@@ -38854,82 +39582,6 @@
           </a:extLst>
         </p:spPr>
       </p:pic>
-      <p:sp>
-        <p:nvSpPr>
-          <p:cNvPr id="12" name="Textfeld 11"/>
-          <p:cNvSpPr txBox="1"/>
-          <p:nvPr/>
-        </p:nvSpPr>
-        <p:spPr>
-          <a:xfrm>
-            <a:off x="6657476" y="3861048"/>
-            <a:ext cx="1944216" cy="2031325"/>
-          </a:xfrm>
-          <a:prstGeom prst="rect">
-            <a:avLst/>
-          </a:prstGeom>
-        </p:spPr>
-        <p:style>
-          <a:lnRef idx="1">
-            <a:schemeClr val="accent2"/>
-          </a:lnRef>
-          <a:fillRef idx="2">
-            <a:schemeClr val="accent2"/>
-          </a:fillRef>
-          <a:effectRef idx="1">
-            <a:schemeClr val="accent2"/>
-          </a:effectRef>
-          <a:fontRef idx="minor">
-            <a:schemeClr val="dk1"/>
-          </a:fontRef>
-        </p:style>
-        <p:txBody>
-          <a:bodyPr wrap="square" rtlCol="0">
-            <a:spAutoFit/>
-          </a:bodyPr>
-          <a:lstStyle/>
-          <a:p>
-            <a:pPr algn="ctr"/>
-            <a:r>
-              <a:rPr lang="de-DE" dirty="0">
-                <a:solidFill>
-                  <a:schemeClr val="tx1"/>
-                </a:solidFill>
-              </a:rPr>
-              <a:t>Je größer das λ, desto eher entsprechen die Werte der </a:t>
-            </a:r>
-            <a:r>
-              <a:rPr lang="de-DE" dirty="0" smtClean="0">
-                <a:solidFill>
-                  <a:schemeClr val="tx1"/>
-                </a:solidFill>
-              </a:rPr>
-              <a:t>betrachteten Metrik </a:t>
-            </a:r>
-            <a:r>
-              <a:rPr lang="de-DE" dirty="0">
-                <a:solidFill>
-                  <a:schemeClr val="tx1"/>
-                </a:solidFill>
-              </a:rPr>
-              <a:t>dem Clean Code-Paradigma</a:t>
-            </a:r>
-            <a:r>
-              <a:rPr lang="de-DE" dirty="0" smtClean="0">
-                <a:solidFill>
-                  <a:schemeClr val="tx1"/>
-                </a:solidFill>
-              </a:rPr>
-              <a:t>.</a:t>
-            </a:r>
-            <a:endParaRPr lang="de-DE" dirty="0">
-              <a:solidFill>
-                <a:schemeClr val="tx1"/>
-              </a:solidFill>
-            </a:endParaRPr>
-          </a:p>
-        </p:txBody>
-      </p:sp>
     </p:spTree>
     <p:extLst>
       <p:ext uri="{BB962C8B-B14F-4D97-AF65-F5344CB8AC3E}">
@@ -39082,13 +39734,8 @@
             <a:pPr lvl="1"/>
             <a:r>
               <a:rPr lang="de-DE" dirty="0" smtClean="0"/>
-              <a:t>Neue Clean </a:t>
-            </a:r>
-            <a:r>
-              <a:rPr lang="de-DE" dirty="0" smtClean="0"/>
-              <a:t>Code-Metrik</a:t>
-            </a:r>
-            <a:endParaRPr lang="de-DE" dirty="0" smtClean="0"/>
+              <a:t>Neue Clean Code-Metrik</a:t>
+            </a:r>
           </a:p>
           <a:p>
             <a:pPr lvl="1"/>
@@ -39147,7 +39794,7 @@
             <a:fld id="{CBC0F77A-B02C-46ED-92AE-5313E2DEEECD}" type="datetime1">
               <a:rPr lang="de-DE" smtClean="0"/>
               <a:pPr/>
-              <a:t>29.08.2012</a:t>
+              <a:t>30.08.2012</a:t>
             </a:fld>
             <a:endParaRPr lang="de-DE"/>
           </a:p>
@@ -39376,7 +40023,6 @@
               <a:rPr lang="de-DE" dirty="0"/>
               <a:t>Clean Code Unterstützung / Zusammenfassung</a:t>
             </a:r>
-            <a:endParaRPr lang="de-DE" dirty="0"/>
           </a:p>
         </p:txBody>
       </p:sp>
@@ -39398,7 +40044,7 @@
             <a:fld id="{1B016BD9-B961-4061-825C-528CF92485FD}" type="datetime1">
               <a:rPr lang="de-DE" smtClean="0"/>
               <a:pPr/>
-              <a:t>29.08.2012</a:t>
+              <a:t>30.08.2012</a:t>
             </a:fld>
             <a:endParaRPr lang="de-DE"/>
           </a:p>
@@ -39438,7 +40084,7 @@
             <p:ph idx="1"/>
             <p:extLst>
               <p:ext uri="{D42A27DB-BD31-4B8C-83A1-F6EECF244321}">
-                <p14:modId xmlns:p14="http://schemas.microsoft.com/office/powerpoint/2010/main" val="1129063589"/>
+                <p14:modId xmlns:p14="http://schemas.microsoft.com/office/powerpoint/2010/main" val="3544141459"/>
               </p:ext>
             </p:extLst>
           </p:nvPr>
@@ -39466,6 +40112,13 @@
   <p:transition>
     <p:fade/>
   </p:transition>
+  <p:timing>
+    <p:tnLst>
+      <p:par>
+        <p:cTn id="1" dur="indefinite" restart="never" nodeType="tmRoot"/>
+      </p:par>
+    </p:tnLst>
+  </p:timing>
 </p:sld>
 </file>
 
@@ -39560,7 +40213,7 @@
             <a:fld id="{CBC0F77A-B02C-46ED-92AE-5313E2DEEECD}" type="datetime1">
               <a:rPr lang="de-DE" smtClean="0"/>
               <a:pPr/>
-              <a:t>29.08.2012</a:t>
+              <a:t>30.08.2012</a:t>
             </a:fld>
             <a:endParaRPr lang="de-DE"/>
           </a:p>
@@ -39652,11 +40305,7 @@
             </a:r>
             <a:r>
               <a:rPr lang="de-DE" dirty="0" smtClean="0"/>
-              <a:t>-Softwarequalitätsindex / </a:t>
-            </a:r>
-            <a:r>
-              <a:rPr lang="de-DE" dirty="0" smtClean="0"/>
-              <a:t>Allgemein</a:t>
+              <a:t>-Softwarequalitätsindex / Allgemein</a:t>
             </a:r>
             <a:endParaRPr lang="de-DE" dirty="0"/>
           </a:p>
@@ -39735,7 +40384,6 @@
               <a:rPr lang="de-DE" dirty="0"/>
               <a:t>Eberhard Kuhn</a:t>
             </a:r>
-            <a:endParaRPr lang="de-DE" dirty="0"/>
           </a:p>
         </p:txBody>
       </p:sp>
@@ -39757,7 +40405,7 @@
             <a:fld id="{CBC0F77A-B02C-46ED-92AE-5313E2DEEECD}" type="datetime1">
               <a:rPr lang="de-DE" smtClean="0"/>
               <a:pPr/>
-              <a:t>29.08.2012</a:t>
+              <a:t>30.08.2012</a:t>
             </a:fld>
             <a:endParaRPr lang="de-DE"/>
           </a:p>
@@ -39922,7 +40570,7 @@
             <a:fld id="{CBC0F77A-B02C-46ED-92AE-5313E2DEEECD}" type="datetime1">
               <a:rPr lang="de-DE" smtClean="0"/>
               <a:pPr/>
-              <a:t>29.08.2012</a:t>
+              <a:t>30.08.2012</a:t>
             </a:fld>
             <a:endParaRPr lang="de-DE"/>
           </a:p>
@@ -40074,11 +40722,7 @@
             </a:r>
             <a:r>
               <a:rPr lang="de-DE" dirty="0" smtClean="0"/>
-              <a:t>-Softwarequalitätsindex / </a:t>
-            </a:r>
-            <a:r>
-              <a:rPr lang="de-DE" dirty="0" smtClean="0"/>
-              <a:t>Berechnung</a:t>
+              <a:t>-Softwarequalitätsindex / Berechnung</a:t>
             </a:r>
             <a:endParaRPr lang="de-DE" dirty="0"/>
           </a:p>
@@ -40105,6 +40749,13 @@
             </a:r>
           </a:p>
           <a:p>
+            <a:pPr lvl="1"/>
+            <a:r>
+              <a:rPr lang="de-DE" dirty="0" smtClean="0"/>
+              <a:t>(außer Testabdeckung)</a:t>
+            </a:r>
+          </a:p>
+          <a:p>
             <a:endParaRPr lang="de-DE" dirty="0"/>
           </a:p>
           <a:p>
@@ -40160,7 +40811,7 @@
             <a:fld id="{CBC0F77A-B02C-46ED-92AE-5313E2DEEECD}" type="datetime1">
               <a:rPr lang="de-DE" smtClean="0"/>
               <a:pPr/>
-              <a:t>29.08.2012</a:t>
+              <a:t>30.08.2012</a:t>
             </a:fld>
             <a:endParaRPr lang="de-DE"/>
           </a:p>
@@ -40198,7 +40849,7 @@
           </p:cNvPicPr>
           <p:nvPr/>
         </p:nvPicPr>
-        <p:blipFill>
+        <p:blipFill rotWithShape="1">
           <a:blip r:embed="rId2">
             <a:extLst>
               <a:ext uri="{28A0092B-C50C-407E-A947-70E740481C1C}">
@@ -40206,15 +40857,13 @@
               </a:ext>
             </a:extLst>
           </a:blip>
-          <a:srcRect/>
-          <a:stretch>
-            <a:fillRect/>
-          </a:stretch>
+          <a:srcRect t="11366"/>
+          <a:stretch/>
         </p:blipFill>
         <p:spPr bwMode="auto">
           <a:xfrm>
-            <a:off x="1608559" y="1988840"/>
-            <a:ext cx="4619625" cy="885825"/>
+            <a:off x="1608559" y="2410691"/>
+            <a:ext cx="4619625" cy="785145"/>
           </a:xfrm>
           <a:prstGeom prst="rect">
             <a:avLst/>
@@ -40277,7 +40926,7 @@
         </p:blipFill>
         <p:spPr bwMode="auto">
           <a:xfrm>
-            <a:off x="1675681" y="2996952"/>
+            <a:off x="1675681" y="3318123"/>
             <a:ext cx="4229100" cy="809625"/>
           </a:xfrm>
           <a:prstGeom prst="rect">
@@ -40341,7 +40990,7 @@
         </p:blipFill>
         <p:spPr bwMode="auto">
           <a:xfrm>
-            <a:off x="1728069" y="4005064"/>
+            <a:off x="1728069" y="4326235"/>
             <a:ext cx="4124325" cy="304800"/>
           </a:xfrm>
           <a:prstGeom prst="rect">
@@ -40405,7 +41054,7 @@
         </p:blipFill>
         <p:spPr bwMode="auto">
           <a:xfrm>
-            <a:off x="1691680" y="5013176"/>
+            <a:off x="1691680" y="5334347"/>
             <a:ext cx="4629150" cy="542925"/>
           </a:xfrm>
           <a:prstGeom prst="rect">
@@ -40535,7 +41184,7 @@
             <a:fld id="{1B016BD9-B961-4061-825C-528CF92485FD}" type="datetime1">
               <a:rPr lang="de-DE" smtClean="0"/>
               <a:pPr/>
-              <a:t>29.08.2012</a:t>
+              <a:t>30.08.2012</a:t>
             </a:fld>
             <a:endParaRPr lang="de-DE"/>
           </a:p>
@@ -40575,7 +41224,7 @@
             <p:ph idx="1"/>
             <p:extLst>
               <p:ext uri="{D42A27DB-BD31-4B8C-83A1-F6EECF244321}">
-                <p14:modId xmlns:p14="http://schemas.microsoft.com/office/powerpoint/2010/main" val="24608630"/>
+                <p14:modId xmlns:p14="http://schemas.microsoft.com/office/powerpoint/2010/main" val="2805439457"/>
               </p:ext>
             </p:extLst>
           </p:nvPr>
@@ -40603,6 +41252,13 @@
   <p:transition>
     <p:fade/>
   </p:transition>
+  <p:timing>
+    <p:tnLst>
+      <p:par>
+        <p:cTn id="1" dur="indefinite" restart="never" nodeType="tmRoot"/>
+      </p:par>
+    </p:tnLst>
+  </p:timing>
 </p:sld>
 </file>
 
@@ -40693,7 +41349,7 @@
             <a:fld id="{CBC0F77A-B02C-46ED-92AE-5313E2DEEECD}" type="datetime1">
               <a:rPr lang="de-DE" smtClean="0"/>
               <a:pPr/>
-              <a:t>29.08.2012</a:t>
+              <a:t>30.08.2012</a:t>
             </a:fld>
             <a:endParaRPr lang="de-DE"/>
           </a:p>
@@ -40805,7 +41461,7 @@
             <a:fld id="{CBC0F77A-B02C-46ED-92AE-5313E2DEEECD}" type="datetime1">
               <a:rPr lang="de-DE" smtClean="0"/>
               <a:pPr/>
-              <a:t>29.08.2012</a:t>
+              <a:t>30.08.2012</a:t>
             </a:fld>
             <a:endParaRPr lang="de-DE"/>
           </a:p>
@@ -41003,7 +41659,7 @@
             <a:fld id="{CBC0F77A-B02C-46ED-92AE-5313E2DEEECD}" type="datetime1">
               <a:rPr lang="de-DE" smtClean="0"/>
               <a:pPr/>
-              <a:t>29.08.2012</a:t>
+              <a:t>30.08.2012</a:t>
             </a:fld>
             <a:endParaRPr lang="de-DE"/>
           </a:p>
@@ -41197,6 +41853,13 @@
   <p:transition>
     <p:fade/>
   </p:transition>
+  <p:timing>
+    <p:tnLst>
+      <p:par>
+        <p:cTn id="1" dur="indefinite" restart="never" nodeType="tmRoot"/>
+      </p:par>
+    </p:tnLst>
+  </p:timing>
 </p:sld>
 </file>
 
@@ -41259,7 +41922,7 @@
             <a:fld id="{CBC0F77A-B02C-46ED-92AE-5313E2DEEECD}" type="datetime1">
               <a:rPr lang="de-DE" smtClean="0"/>
               <a:pPr/>
-              <a:t>29.08.2012</a:t>
+              <a:t>30.08.2012</a:t>
             </a:fld>
             <a:endParaRPr lang="de-DE"/>
           </a:p>
@@ -41462,7 +42125,7 @@
             <a:fld id="{CBC0F77A-B02C-46ED-92AE-5313E2DEEECD}" type="datetime1">
               <a:rPr lang="de-DE" smtClean="0"/>
               <a:pPr/>
-              <a:t>29.08.2012</a:t>
+              <a:t>30.08.2012</a:t>
             </a:fld>
             <a:endParaRPr lang="de-DE"/>
           </a:p>
@@ -41611,7 +42274,7 @@
             <a:fld id="{CBC0F77A-B02C-46ED-92AE-5313E2DEEECD}" type="datetime1">
               <a:rPr lang="de-DE" smtClean="0"/>
               <a:pPr/>
-              <a:t>29.08.2012</a:t>
+              <a:t>30.08.2012</a:t>
             </a:fld>
             <a:endParaRPr lang="de-DE"/>
           </a:p>
@@ -41759,7 +42422,7 @@
             <a:fld id="{CBC0F77A-B02C-46ED-92AE-5313E2DEEECD}" type="datetime1">
               <a:rPr lang="de-DE" smtClean="0"/>
               <a:pPr/>
-              <a:t>29.08.2012</a:t>
+              <a:t>30.08.2012</a:t>
             </a:fld>
             <a:endParaRPr lang="de-DE"/>
           </a:p>
@@ -41903,7 +42566,7 @@
             <a:fld id="{1B016BD9-B961-4061-825C-528CF92485FD}" type="datetime1">
               <a:rPr lang="de-DE" smtClean="0"/>
               <a:pPr/>
-              <a:t>29.08.2012</a:t>
+              <a:t>30.08.2012</a:t>
             </a:fld>
             <a:endParaRPr lang="de-DE"/>
           </a:p>
@@ -41971,6 +42634,13 @@
   <p:transition>
     <p:fade/>
   </p:transition>
+  <p:timing>
+    <p:tnLst>
+      <p:par>
+        <p:cTn id="1" dur="indefinite" restart="never" nodeType="tmRoot"/>
+      </p:par>
+    </p:tnLst>
+  </p:timing>
 </p:sld>
 </file>
 
@@ -42062,7 +42732,7 @@
             <a:fld id="{CBC0F77A-B02C-46ED-92AE-5313E2DEEECD}" type="datetime1">
               <a:rPr lang="de-DE" smtClean="0"/>
               <a:pPr/>
-              <a:t>29.08.2012</a:t>
+              <a:t>30.08.2012</a:t>
             </a:fld>
             <a:endParaRPr lang="de-DE"/>
           </a:p>
@@ -42177,15 +42847,7 @@
             </a:r>
             <a:r>
               <a:rPr lang="de-DE" dirty="0" smtClean="0"/>
-              <a:t> - Visual </a:t>
-            </a:r>
-            <a:r>
-              <a:rPr lang="de-DE" dirty="0" smtClean="0"/>
-              <a:t>Studio-Erweiterung zur statischen </a:t>
-            </a:r>
-            <a:r>
-              <a:rPr lang="de-DE" dirty="0" smtClean="0"/>
-              <a:t>Code-Analyse</a:t>
+              <a:t> - Visual Studio-Erweiterung zur statischen Code-Analyse</a:t>
             </a:r>
           </a:p>
           <a:p>
@@ -42272,7 +42934,7 @@
             <a:fld id="{CBC0F77A-B02C-46ED-92AE-5313E2DEEECD}" type="datetime1">
               <a:rPr lang="de-DE" smtClean="0"/>
               <a:pPr/>
-              <a:t>29.08.2012</a:t>
+              <a:t>30.08.2012</a:t>
             </a:fld>
             <a:endParaRPr lang="de-DE"/>
           </a:p>
@@ -42413,7 +43075,7 @@
             <a:fld id="{CBC0F77A-B02C-46ED-92AE-5313E2DEEECD}" type="datetime1">
               <a:rPr lang="de-DE" smtClean="0"/>
               <a:pPr/>
-              <a:t>29.08.2012</a:t>
+              <a:t>30.08.2012</a:t>
             </a:fld>
             <a:endParaRPr lang="de-DE"/>
           </a:p>
@@ -42532,14 +43194,12 @@
               <a:rPr lang="de-DE" dirty="0" smtClean="0"/>
               <a:t>Kleinster Zyklus in einem Namespace-Zyklus finden</a:t>
             </a:r>
-            <a:endParaRPr lang="de-DE" dirty="0" smtClean="0"/>
           </a:p>
           <a:p>
             <a:r>
               <a:rPr lang="de-DE" dirty="0" smtClean="0"/>
               <a:t>Testabdeckung automatisiert bestimmen (SQI, CRAP)</a:t>
             </a:r>
-            <a:endParaRPr lang="de-DE" dirty="0" smtClean="0"/>
           </a:p>
           <a:p>
             <a:r>
@@ -42589,6 +43249,16 @@
             <a:r>
               <a:rPr lang="de-DE" dirty="0" err="1" smtClean="0"/>
               <a:t>Refactorings</a:t>
+            </a:r>
+            <a:endParaRPr lang="de-DE" dirty="0" smtClean="0"/>
+          </a:p>
+          <a:p>
+            <a:endParaRPr lang="de-DE" dirty="0" smtClean="0"/>
+          </a:p>
+          <a:p>
+            <a:r>
+              <a:rPr lang="de-DE" dirty="0" smtClean="0"/>
+              <a:t>Usus.NET als Grundlage weitere Trends zu implementieren/auszuprobieren</a:t>
             </a:r>
             <a:endParaRPr lang="de-DE" dirty="0"/>
           </a:p>
@@ -42612,7 +43282,7 @@
             <a:fld id="{CBC0F77A-B02C-46ED-92AE-5313E2DEEECD}" type="datetime1">
               <a:rPr lang="de-DE" smtClean="0"/>
               <a:pPr/>
-              <a:t>29.08.2012</a:t>
+              <a:t>30.08.2012</a:t>
             </a:fld>
             <a:endParaRPr lang="de-DE"/>
           </a:p>
@@ -42739,7 +43409,7 @@
             <a:fld id="{1B016BD9-B961-4061-825C-528CF92485FD}" type="datetime1">
               <a:rPr lang="de-DE" smtClean="0"/>
               <a:pPr/>
-              <a:t>29.08.2012</a:t>
+              <a:t>30.08.2012</a:t>
             </a:fld>
             <a:endParaRPr lang="de-DE"/>
           </a:p>
@@ -42879,7 +43549,7 @@
             <a:fld id="{CBC0F77A-B02C-46ED-92AE-5313E2DEEECD}" type="datetime1">
               <a:rPr lang="de-DE" smtClean="0"/>
               <a:pPr/>
-              <a:t>29.08.2012</a:t>
+              <a:t>30.08.2012</a:t>
             </a:fld>
             <a:endParaRPr lang="de-DE"/>
           </a:p>
@@ -42922,6 +43592,13 @@
   <p:transition>
     <p:fade/>
   </p:transition>
+  <p:timing>
+    <p:tnLst>
+      <p:par>
+        <p:cTn id="1" dur="indefinite" restart="never" nodeType="tmRoot"/>
+      </p:par>
+    </p:tnLst>
+  </p:timing>
 </p:sld>
 </file>
 
@@ -42987,7 +43664,7 @@
             <a:fld id="{CBC0F77A-B02C-46ED-92AE-5313E2DEEECD}" type="datetime1">
               <a:rPr lang="de-DE" smtClean="0"/>
               <a:pPr/>
-              <a:t>29.08.2012</a:t>
+              <a:t>30.08.2012</a:t>
             </a:fld>
             <a:endParaRPr lang="de-DE"/>
           </a:p>
@@ -43055,6 +43732,13 @@
   <p:transition>
     <p:fade/>
   </p:transition>
+  <p:timing>
+    <p:tnLst>
+      <p:par>
+        <p:cTn id="1" dur="indefinite" restart="never" nodeType="tmRoot"/>
+      </p:par>
+    </p:tnLst>
+  </p:timing>
 </p:sld>
 </file>
 
@@ -43157,7 +43841,7 @@
             <a:fld id="{CBC0F77A-B02C-46ED-92AE-5313E2DEEECD}" type="datetime1">
               <a:rPr lang="de-DE" smtClean="0"/>
               <a:pPr/>
-              <a:t>29.08.2012</a:t>
+              <a:t>30.08.2012</a:t>
             </a:fld>
             <a:endParaRPr lang="de-DE"/>
           </a:p>
@@ -43200,6 +43884,13 @@
   <p:transition>
     <p:fade/>
   </p:transition>
+  <p:timing>
+    <p:tnLst>
+      <p:par>
+        <p:cTn id="1" dur="indefinite" restart="never" nodeType="tmRoot"/>
+      </p:par>
+    </p:tnLst>
+  </p:timing>
 </p:sld>
 </file>
 
@@ -43294,7 +43985,7 @@
             <a:fld id="{CBC0F77A-B02C-46ED-92AE-5313E2DEEECD}" type="datetime1">
               <a:rPr lang="de-DE" smtClean="0"/>
               <a:pPr/>
-              <a:t>29.08.2012</a:t>
+              <a:t>30.08.2012</a:t>
             </a:fld>
             <a:endParaRPr lang="de-DE"/>
           </a:p>

</xml_diff>

<commit_message>
more details in slides
</commit_message>
<xml_diff>
--- a/text/Usus.NET.pptx
+++ b/text/Usus.NET.pptx
@@ -5,10 +5,10 @@
     <p:sldMasterId id="2147483648" r:id="rId1"/>
   </p:sldMasterIdLst>
   <p:notesMasterIdLst>
-    <p:notesMasterId r:id="rId61"/>
+    <p:notesMasterId r:id="rId63"/>
   </p:notesMasterIdLst>
   <p:handoutMasterIdLst>
-    <p:handoutMasterId r:id="rId62"/>
+    <p:handoutMasterId r:id="rId64"/>
   </p:handoutMasterIdLst>
   <p:sldIdLst>
     <p:sldId id="316" r:id="rId2"/>
@@ -55,21 +55,23 @@
     <p:sldId id="364" r:id="rId43"/>
     <p:sldId id="338" r:id="rId44"/>
     <p:sldId id="355" r:id="rId45"/>
-    <p:sldId id="363" r:id="rId46"/>
-    <p:sldId id="362" r:id="rId47"/>
-    <p:sldId id="365" r:id="rId48"/>
-    <p:sldId id="339" r:id="rId49"/>
-    <p:sldId id="369" r:id="rId50"/>
-    <p:sldId id="367" r:id="rId51"/>
-    <p:sldId id="368" r:id="rId52"/>
-    <p:sldId id="370" r:id="rId53"/>
-    <p:sldId id="373" r:id="rId54"/>
-    <p:sldId id="366" r:id="rId55"/>
-    <p:sldId id="340" r:id="rId56"/>
-    <p:sldId id="371" r:id="rId57"/>
-    <p:sldId id="341" r:id="rId58"/>
-    <p:sldId id="372" r:id="rId59"/>
-    <p:sldId id="342" r:id="rId60"/>
+    <p:sldId id="374" r:id="rId46"/>
+    <p:sldId id="363" r:id="rId47"/>
+    <p:sldId id="362" r:id="rId48"/>
+    <p:sldId id="375" r:id="rId49"/>
+    <p:sldId id="365" r:id="rId50"/>
+    <p:sldId id="339" r:id="rId51"/>
+    <p:sldId id="369" r:id="rId52"/>
+    <p:sldId id="367" r:id="rId53"/>
+    <p:sldId id="368" r:id="rId54"/>
+    <p:sldId id="370" r:id="rId55"/>
+    <p:sldId id="373" r:id="rId56"/>
+    <p:sldId id="366" r:id="rId57"/>
+    <p:sldId id="340" r:id="rId58"/>
+    <p:sldId id="371" r:id="rId59"/>
+    <p:sldId id="341" r:id="rId60"/>
+    <p:sldId id="372" r:id="rId61"/>
+    <p:sldId id="342" r:id="rId62"/>
   </p:sldIdLst>
   <p:sldSz cx="9144000" cy="6858000" type="screen4x3"/>
   <p:notesSz cx="7099300" cy="10234613"/>
@@ -28500,7 +28502,7 @@
             <a:fld id="{69A4D274-F89A-475C-98AC-A35180A58BA7}" type="datetimeFigureOut">
               <a:rPr lang="de-DE" smtClean="0"/>
               <a:pPr/>
-              <a:t>30.08.2012</a:t>
+              <a:t>07.09.2012</a:t>
             </a:fld>
             <a:endParaRPr lang="de-DE"/>
           </a:p>
@@ -28567,7 +28569,7 @@
             <a:fld id="{414B6CA9-562D-42AF-A330-25654FF5F5BE}" type="slidenum">
               <a:rPr lang="de-DE" smtClean="0"/>
               <a:pPr/>
-              <a:t>‹Nr.›</a:t>
+              <a:t>‹#›</a:t>
             </a:fld>
             <a:endParaRPr lang="de-DE"/>
           </a:p>
@@ -28881,7 +28883,7 @@
             <a:fld id="{A0B3EF8B-956F-4CDC-8B33-15D39D7809D2}" type="slidenum">
               <a:rPr lang="de-DE"/>
               <a:pPr/>
-              <a:t>‹Nr.›</a:t>
+              <a:t>‹#›</a:t>
             </a:fld>
             <a:endParaRPr lang="de-DE"/>
           </a:p>
@@ -29202,7 +29204,7 @@
             <a:fld id="{2132E481-F655-4011-8F04-C9235C2A4B83}" type="datetime1">
               <a:rPr lang="de-DE"/>
               <a:pPr/>
-              <a:t>30.08.2012</a:t>
+              <a:t>07.09.2012</a:t>
             </a:fld>
             <a:endParaRPr lang="de-DE"/>
           </a:p>
@@ -29261,7 +29263,7 @@
             <a:fld id="{6037FC24-E09A-43CB-A837-6E807F4AF82B}" type="slidenum">
               <a:rPr lang="de-DE"/>
               <a:pPr/>
-              <a:t>‹Nr.›</a:t>
+              <a:t>‹#›</a:t>
             </a:fld>
             <a:endParaRPr lang="de-DE"/>
           </a:p>
@@ -29425,7 +29427,7 @@
             <a:fld id="{931DD153-71D8-4C46-A432-1713C7F792FC}" type="datetime1">
               <a:rPr lang="de-DE"/>
               <a:pPr/>
-              <a:t>30.08.2012</a:t>
+              <a:t>07.09.2012</a:t>
             </a:fld>
             <a:endParaRPr lang="de-DE"/>
           </a:p>
@@ -29476,7 +29478,7 @@
             <a:fld id="{20977B6C-FD2C-4713-AC3F-B06E8D3D4EB5}" type="slidenum">
               <a:rPr lang="de-DE"/>
               <a:pPr/>
-              <a:t>‹Nr.›</a:t>
+              <a:t>‹#›</a:t>
             </a:fld>
             <a:endParaRPr lang="de-DE"/>
           </a:p>
@@ -29617,7 +29619,7 @@
             <a:fld id="{079AF691-E88B-40AF-BE24-228988EBF0AD}" type="datetime1">
               <a:rPr lang="de-DE"/>
               <a:pPr/>
-              <a:t>30.08.2012</a:t>
+              <a:t>07.09.2012</a:t>
             </a:fld>
             <a:endParaRPr lang="de-DE"/>
           </a:p>
@@ -29668,7 +29670,7 @@
             <a:fld id="{ACE11718-6644-424B-987B-2C58C361D195}" type="slidenum">
               <a:rPr lang="de-DE"/>
               <a:pPr/>
-              <a:t>‹Nr.›</a:t>
+              <a:t>‹#›</a:t>
             </a:fld>
             <a:endParaRPr lang="de-DE"/>
           </a:p>
@@ -29799,7 +29801,7 @@
             <a:fld id="{CBC0F77A-B02C-46ED-92AE-5313E2DEEECD}" type="datetime1">
               <a:rPr lang="de-DE"/>
               <a:pPr/>
-              <a:t>30.08.2012</a:t>
+              <a:t>07.09.2012</a:t>
             </a:fld>
             <a:endParaRPr lang="de-DE"/>
           </a:p>
@@ -29850,7 +29852,7 @@
             <a:fld id="{8D677B59-25B7-4E9E-8A1D-B1026FACA9B2}" type="slidenum">
               <a:rPr lang="de-DE"/>
               <a:pPr/>
-              <a:t>‹Nr.›</a:t>
+              <a:t>‹#›</a:t>
             </a:fld>
             <a:endParaRPr lang="de-DE"/>
           </a:p>
@@ -30003,7 +30005,7 @@
             <a:fld id="{1B016BD9-B961-4061-825C-528CF92485FD}" type="datetime1">
               <a:rPr lang="de-DE"/>
               <a:pPr/>
-              <a:t>30.08.2012</a:t>
+              <a:t>07.09.2012</a:t>
             </a:fld>
             <a:endParaRPr lang="de-DE"/>
           </a:p>
@@ -30054,7 +30056,7 @@
             <a:fld id="{A437370E-0A3A-4D85-96CB-71DC38947A9B}" type="slidenum">
               <a:rPr lang="de-DE"/>
               <a:pPr/>
-              <a:t>‹Nr.›</a:t>
+              <a:t>‹#›</a:t>
             </a:fld>
             <a:endParaRPr lang="de-DE"/>
           </a:p>
@@ -30303,7 +30305,7 @@
             <a:fld id="{A280FF88-694E-4002-9B14-0F12622BD036}" type="datetime1">
               <a:rPr lang="de-DE"/>
               <a:pPr/>
-              <a:t>30.08.2012</a:t>
+              <a:t>07.09.2012</a:t>
             </a:fld>
             <a:endParaRPr lang="de-DE"/>
           </a:p>
@@ -30354,7 +30356,7 @@
             <a:fld id="{43814607-42BF-478C-9620-EBE22DAC8512}" type="slidenum">
               <a:rPr lang="de-DE"/>
               <a:pPr/>
-              <a:t>‹Nr.›</a:t>
+              <a:t>‹#›</a:t>
             </a:fld>
             <a:endParaRPr lang="de-DE"/>
           </a:p>
@@ -30742,7 +30744,7 @@
             <a:fld id="{C82890F3-9A04-47A6-A7A3-ECB89FFBD575}" type="datetime1">
               <a:rPr lang="de-DE"/>
               <a:pPr/>
-              <a:t>30.08.2012</a:t>
+              <a:t>07.09.2012</a:t>
             </a:fld>
             <a:endParaRPr lang="de-DE"/>
           </a:p>
@@ -30793,7 +30795,7 @@
             <a:fld id="{3EE2E919-C0B0-4642-AD39-411F54134710}" type="slidenum">
               <a:rPr lang="de-DE"/>
               <a:pPr/>
-              <a:t>‹Nr.›</a:t>
+              <a:t>‹#›</a:t>
             </a:fld>
             <a:endParaRPr lang="de-DE"/>
           </a:p>
@@ -30872,7 +30874,7 @@
             <a:fld id="{C16F9097-2E66-461B-B729-D824989516FF}" type="datetime1">
               <a:rPr lang="de-DE"/>
               <a:pPr/>
-              <a:t>30.08.2012</a:t>
+              <a:t>07.09.2012</a:t>
             </a:fld>
             <a:endParaRPr lang="de-DE"/>
           </a:p>
@@ -30923,7 +30925,7 @@
             <a:fld id="{B6432635-A0FC-413E-AACF-7AE2A7B75020}" type="slidenum">
               <a:rPr lang="de-DE"/>
               <a:pPr/>
-              <a:t>‹Nr.›</a:t>
+              <a:t>‹#›</a:t>
             </a:fld>
             <a:endParaRPr lang="de-DE"/>
           </a:p>
@@ -30979,7 +30981,7 @@
             <a:fld id="{7AC69A8F-2ACC-45D4-A87F-B7D676E1814C}" type="datetime1">
               <a:rPr lang="de-DE"/>
               <a:pPr/>
-              <a:t>30.08.2012</a:t>
+              <a:t>07.09.2012</a:t>
             </a:fld>
             <a:endParaRPr lang="de-DE"/>
           </a:p>
@@ -31030,7 +31032,7 @@
             <a:fld id="{FD9C6722-1C79-40AF-A0FB-20F75A41D0A2}" type="slidenum">
               <a:rPr lang="de-DE"/>
               <a:pPr/>
-              <a:t>‹Nr.›</a:t>
+              <a:t>‹#›</a:t>
             </a:fld>
             <a:endParaRPr lang="de-DE"/>
           </a:p>
@@ -31268,7 +31270,7 @@
             <a:fld id="{6EA65B51-4750-4E05-9C7D-9527F16C7307}" type="datetime1">
               <a:rPr lang="de-DE"/>
               <a:pPr/>
-              <a:t>30.08.2012</a:t>
+              <a:t>07.09.2012</a:t>
             </a:fld>
             <a:endParaRPr lang="de-DE"/>
           </a:p>
@@ -31319,7 +31321,7 @@
             <a:fld id="{EAE692F4-38E9-44AB-A24C-B8D190594008}" type="slidenum">
               <a:rPr lang="de-DE"/>
               <a:pPr/>
-              <a:t>‹Nr.›</a:t>
+              <a:t>‹#›</a:t>
             </a:fld>
             <a:endParaRPr lang="de-DE"/>
           </a:p>
@@ -31537,7 +31539,7 @@
             <a:fld id="{2A05A253-57A7-478E-BB6D-D26F8F225B73}" type="datetime1">
               <a:rPr lang="de-DE"/>
               <a:pPr/>
-              <a:t>30.08.2012</a:t>
+              <a:t>07.09.2012</a:t>
             </a:fld>
             <a:endParaRPr lang="de-DE"/>
           </a:p>
@@ -31588,7 +31590,7 @@
             <a:fld id="{DEAE42F7-A0CD-4C36-8AA8-F2C64F9154E2}" type="slidenum">
               <a:rPr lang="de-DE"/>
               <a:pPr/>
-              <a:t>‹Nr.›</a:t>
+              <a:t>‹#›</a:t>
             </a:fld>
             <a:endParaRPr lang="de-DE"/>
           </a:p>
@@ -31876,7 +31878,7 @@
             <a:fld id="{F0C1A889-87E8-48E6-B675-A3932D4416BB}" type="datetime1">
               <a:rPr lang="de-DE"/>
               <a:pPr/>
-              <a:t>30.08.2012</a:t>
+              <a:t>07.09.2012</a:t>
             </a:fld>
             <a:endParaRPr lang="de-DE"/>
           </a:p>
@@ -31977,7 +31979,7 @@
             <a:fld id="{78514C50-AA4F-49B7-B428-909B3A5A2CA5}" type="slidenum">
               <a:rPr lang="de-DE"/>
               <a:pPr/>
-              <a:t>‹Nr.›</a:t>
+              <a:t>‹#›</a:t>
             </a:fld>
             <a:endParaRPr lang="de-DE"/>
           </a:p>
@@ -32460,7 +32462,7 @@
             <a:fld id="{CBC0F77A-B02C-46ED-92AE-5313E2DEEECD}" type="datetime1">
               <a:rPr lang="de-DE" smtClean="0"/>
               <a:pPr/>
-              <a:t>30.08.2012</a:t>
+              <a:t>07.09.2012</a:t>
             </a:fld>
             <a:endParaRPr lang="de-DE"/>
           </a:p>
@@ -32608,7 +32610,7 @@
             <a:fld id="{CBC0F77A-B02C-46ED-92AE-5313E2DEEECD}" type="datetime1">
               <a:rPr lang="de-DE" smtClean="0"/>
               <a:pPr/>
-              <a:t>30.08.2012</a:t>
+              <a:t>07.09.2012</a:t>
             </a:fld>
             <a:endParaRPr lang="de-DE"/>
           </a:p>
@@ -32747,7 +32749,7 @@
             <a:fld id="{CBC0F77A-B02C-46ED-92AE-5313E2DEEECD}" type="datetime1">
               <a:rPr lang="de-DE" smtClean="0"/>
               <a:pPr/>
-              <a:t>30.08.2012</a:t>
+              <a:t>07.09.2012</a:t>
             </a:fld>
             <a:endParaRPr lang="de-DE"/>
           </a:p>
@@ -32918,7 +32920,7 @@
             <a:fld id="{CBC0F77A-B02C-46ED-92AE-5313E2DEEECD}" type="datetime1">
               <a:rPr lang="de-DE" smtClean="0"/>
               <a:pPr/>
-              <a:t>30.08.2012</a:t>
+              <a:t>07.09.2012</a:t>
             </a:fld>
             <a:endParaRPr lang="de-DE"/>
           </a:p>
@@ -33062,7 +33064,7 @@
             <a:fld id="{A280FF88-694E-4002-9B14-0F12622BD036}" type="datetime1">
               <a:rPr lang="de-DE" smtClean="0"/>
               <a:pPr/>
-              <a:t>30.08.2012</a:t>
+              <a:t>07.09.2012</a:t>
             </a:fld>
             <a:endParaRPr lang="de-DE"/>
           </a:p>
@@ -33206,7 +33208,7 @@
             <a:fld id="{A280FF88-694E-4002-9B14-0F12622BD036}" type="datetime1">
               <a:rPr lang="de-DE" smtClean="0"/>
               <a:pPr/>
-              <a:t>30.08.2012</a:t>
+              <a:t>07.09.2012</a:t>
             </a:fld>
             <a:endParaRPr lang="de-DE"/>
           </a:p>
@@ -33346,7 +33348,7 @@
             <a:fld id="{CBC0F77A-B02C-46ED-92AE-5313E2DEEECD}" type="datetime1">
               <a:rPr lang="de-DE" smtClean="0"/>
               <a:pPr/>
-              <a:t>30.08.2012</a:t>
+              <a:t>07.09.2012</a:t>
             </a:fld>
             <a:endParaRPr lang="de-DE"/>
           </a:p>
@@ -33552,7 +33554,7 @@
             <a:fld id="{1B016BD9-B961-4061-825C-528CF92485FD}" type="datetime1">
               <a:rPr lang="de-DE" smtClean="0"/>
               <a:pPr/>
-              <a:t>30.08.2012</a:t>
+              <a:t>07.09.2012</a:t>
             </a:fld>
             <a:endParaRPr lang="de-DE"/>
           </a:p>
@@ -33696,7 +33698,7 @@
             <a:fld id="{1B016BD9-B961-4061-825C-528CF92485FD}" type="datetime1">
               <a:rPr lang="de-DE" smtClean="0"/>
               <a:pPr/>
-              <a:t>30.08.2012</a:t>
+              <a:t>07.09.2012</a:t>
             </a:fld>
             <a:endParaRPr lang="de-DE"/>
           </a:p>
@@ -33960,7 +33962,7 @@
             <a:fld id="{1B016BD9-B961-4061-825C-528CF92485FD}" type="datetime1">
               <a:rPr lang="de-DE" smtClean="0"/>
               <a:pPr/>
-              <a:t>30.08.2012</a:t>
+              <a:t>07.09.2012</a:t>
             </a:fld>
             <a:endParaRPr lang="de-DE"/>
           </a:p>
@@ -34095,7 +34097,7 @@
             <a:fld id="{1B016BD9-B961-4061-825C-528CF92485FD}" type="datetime1">
               <a:rPr lang="de-DE" smtClean="0"/>
               <a:pPr/>
-              <a:t>30.08.2012</a:t>
+              <a:t>07.09.2012</a:t>
             </a:fld>
             <a:endParaRPr lang="de-DE"/>
           </a:p>
@@ -34571,7 +34573,7 @@
             <a:fld id="{1B016BD9-B961-4061-825C-528CF92485FD}" type="datetime1">
               <a:rPr lang="de-DE" smtClean="0"/>
               <a:pPr/>
-              <a:t>30.08.2012</a:t>
+              <a:t>07.09.2012</a:t>
             </a:fld>
             <a:endParaRPr lang="de-DE"/>
           </a:p>
@@ -34791,7 +34793,7 @@
             <a:fld id="{1B016BD9-B961-4061-825C-528CF92485FD}" type="datetime1">
               <a:rPr lang="de-DE" smtClean="0"/>
               <a:pPr/>
-              <a:t>30.08.2012</a:t>
+              <a:t>07.09.2012</a:t>
             </a:fld>
             <a:endParaRPr lang="de-DE"/>
           </a:p>
@@ -34999,7 +35001,7 @@
             <a:fld id="{1B016BD9-B961-4061-825C-528CF92485FD}" type="datetime1">
               <a:rPr lang="de-DE" smtClean="0"/>
               <a:pPr/>
-              <a:t>30.08.2012</a:t>
+              <a:t>07.09.2012</a:t>
             </a:fld>
             <a:endParaRPr lang="de-DE"/>
           </a:p>
@@ -35116,10 +35118,6 @@
           </a:p>
           <a:p>
             <a:r>
-              <a:rPr lang="de-DE" dirty="0"/>
-              <a:t>Durchschnittliche </a:t>
-            </a:r>
-            <a:r>
               <a:rPr lang="de-DE" dirty="0" smtClean="0"/>
               <a:t>Methodenlänge (</a:t>
             </a:r>
@@ -35179,11 +35177,11 @@
             </a:r>
             <a:r>
               <a:rPr lang="de-DE" dirty="0" smtClean="0"/>
-              <a:t>Abhängigkeiten</a:t>
+              <a:t>Abhängigkeiten (Größe des Kreis) </a:t>
             </a:r>
             <a:r>
               <a:rPr lang="de-DE" dirty="0"/>
-              <a:t> (Schwellwert </a:t>
+              <a:t>(Schwellwert </a:t>
             </a:r>
             <a:r>
               <a:rPr lang="de-DE" b="1" dirty="0" smtClean="0">
@@ -35353,7 +35351,7 @@
             <a:fld id="{1B016BD9-B961-4061-825C-528CF92485FD}" type="datetime1">
               <a:rPr lang="de-DE" smtClean="0"/>
               <a:pPr/>
-              <a:t>30.08.2012</a:t>
+              <a:t>07.09.2012</a:t>
             </a:fld>
             <a:endParaRPr lang="de-DE"/>
           </a:p>
@@ -35518,7 +35516,7 @@
             <a:fld id="{CBC0F77A-B02C-46ED-92AE-5313E2DEEECD}" type="datetime1">
               <a:rPr lang="de-DE" smtClean="0"/>
               <a:pPr/>
-              <a:t>30.08.2012</a:t>
+              <a:t>07.09.2012</a:t>
             </a:fld>
             <a:endParaRPr lang="de-DE"/>
           </a:p>
@@ -35717,7 +35715,7 @@
             <a:fld id="{1B016BD9-B961-4061-825C-528CF92485FD}" type="datetime1">
               <a:rPr lang="de-DE" smtClean="0"/>
               <a:pPr/>
-              <a:t>30.08.2012</a:t>
+              <a:t>07.09.2012</a:t>
             </a:fld>
             <a:endParaRPr lang="de-DE"/>
           </a:p>
@@ -35920,7 +35918,7 @@
             <a:fld id="{1B016BD9-B961-4061-825C-528CF92485FD}" type="datetime1">
               <a:rPr lang="de-DE" smtClean="0"/>
               <a:pPr/>
-              <a:t>30.08.2012</a:t>
+              <a:t>07.09.2012</a:t>
             </a:fld>
             <a:endParaRPr lang="de-DE"/>
           </a:p>
@@ -36167,7 +36165,7 @@
             <a:fld id="{1B016BD9-B961-4061-825C-528CF92485FD}" type="datetime1">
               <a:rPr lang="de-DE" smtClean="0"/>
               <a:pPr/>
-              <a:t>30.08.2012</a:t>
+              <a:t>07.09.2012</a:t>
             </a:fld>
             <a:endParaRPr lang="de-DE"/>
           </a:p>
@@ -36375,7 +36373,7 @@
             <a:fld id="{1B016BD9-B961-4061-825C-528CF92485FD}" type="datetime1">
               <a:rPr lang="de-DE" smtClean="0"/>
               <a:pPr/>
-              <a:t>30.08.2012</a:t>
+              <a:t>07.09.2012</a:t>
             </a:fld>
             <a:endParaRPr lang="de-DE"/>
           </a:p>
@@ -36612,7 +36610,7 @@
             <a:fld id="{1B016BD9-B961-4061-825C-528CF92485FD}" type="datetime1">
               <a:rPr lang="de-DE" smtClean="0"/>
               <a:pPr/>
-              <a:t>30.08.2012</a:t>
+              <a:t>07.09.2012</a:t>
             </a:fld>
             <a:endParaRPr lang="de-DE"/>
           </a:p>
@@ -36891,7 +36889,7 @@
             <a:fld id="{1B016BD9-B961-4061-825C-528CF92485FD}" type="datetime1">
               <a:rPr lang="de-DE" smtClean="0"/>
               <a:pPr/>
-              <a:t>30.08.2012</a:t>
+              <a:t>07.09.2012</a:t>
             </a:fld>
             <a:endParaRPr lang="de-DE"/>
           </a:p>
@@ -37031,7 +37029,7 @@
             <a:fld id="{CBC0F77A-B02C-46ED-92AE-5313E2DEEECD}" type="datetime1">
               <a:rPr lang="de-DE" smtClean="0"/>
               <a:pPr/>
-              <a:t>30.08.2012</a:t>
+              <a:t>07.09.2012</a:t>
             </a:fld>
             <a:endParaRPr lang="de-DE"/>
           </a:p>
@@ -37180,7 +37178,7 @@
             <a:fld id="{1B016BD9-B961-4061-825C-528CF92485FD}" type="datetime1">
               <a:rPr lang="de-DE" smtClean="0"/>
               <a:pPr/>
-              <a:t>30.08.2012</a:t>
+              <a:t>07.09.2012</a:t>
             </a:fld>
             <a:endParaRPr lang="de-DE"/>
           </a:p>
@@ -37668,7 +37666,7 @@
             <a:fld id="{1B016BD9-B961-4061-825C-528CF92485FD}" type="datetime1">
               <a:rPr lang="de-DE" smtClean="0"/>
               <a:pPr/>
-              <a:t>30.08.2012</a:t>
+              <a:t>07.09.2012</a:t>
             </a:fld>
             <a:endParaRPr lang="de-DE"/>
           </a:p>
@@ -37823,7 +37821,7 @@
             <a:fld id="{1B016BD9-B961-4061-825C-528CF92485FD}" type="datetime1">
               <a:rPr lang="de-DE" smtClean="0"/>
               <a:pPr/>
-              <a:t>30.08.2012</a:t>
+              <a:t>07.09.2012</a:t>
             </a:fld>
             <a:endParaRPr lang="de-DE"/>
           </a:p>
@@ -38024,7 +38022,7 @@
             <a:fld id="{1B016BD9-B961-4061-825C-528CF92485FD}" type="datetime1">
               <a:rPr lang="de-DE" smtClean="0"/>
               <a:pPr/>
-              <a:t>30.08.2012</a:t>
+              <a:t>07.09.2012</a:t>
             </a:fld>
             <a:endParaRPr lang="de-DE"/>
           </a:p>
@@ -38195,7 +38193,7 @@
             <a:fld id="{1B016BD9-B961-4061-825C-528CF92485FD}" type="datetime1">
               <a:rPr lang="de-DE" smtClean="0"/>
               <a:pPr/>
-              <a:t>30.08.2012</a:t>
+              <a:t>07.09.2012</a:t>
             </a:fld>
             <a:endParaRPr lang="de-DE"/>
           </a:p>
@@ -38614,7 +38612,7 @@
             <a:fld id="{1B016BD9-B961-4061-825C-528CF92485FD}" type="datetime1">
               <a:rPr lang="de-DE" smtClean="0"/>
               <a:pPr/>
-              <a:t>30.08.2012</a:t>
+              <a:t>07.09.2012</a:t>
             </a:fld>
             <a:endParaRPr lang="de-DE"/>
           </a:p>
@@ -38816,7 +38814,7 @@
             <a:fld id="{CBC0F77A-B02C-46ED-92AE-5313E2DEEECD}" type="datetime1">
               <a:rPr lang="de-DE" smtClean="0"/>
               <a:pPr/>
-              <a:t>30.08.2012</a:t>
+              <a:t>07.09.2012</a:t>
             </a:fld>
             <a:endParaRPr lang="de-DE"/>
           </a:p>
@@ -38980,19 +38978,11 @@
             </a:r>
             <a:r>
               <a:rPr lang="de-DE" dirty="0"/>
-              <a:t>logarithmische Skalen um eine Pareto-Verteilung der </a:t>
-            </a:r>
-            <a:r>
-              <a:rPr lang="de-DE" dirty="0" err="1"/>
-              <a:t>zyklomatischen</a:t>
-            </a:r>
-            <a:r>
-              <a:rPr lang="de-DE" dirty="0"/>
-              <a:t> Komplexität zu </a:t>
+              <a:t>logarithmische </a:t>
             </a:r>
             <a:r>
               <a:rPr lang="de-DE" dirty="0" smtClean="0"/>
-              <a:t>bestimmen</a:t>
+              <a:t>Skalen, lineare Regression und Pareto-Verteilung</a:t>
             </a:r>
           </a:p>
           <a:p>
@@ -39005,15 +38995,41 @@
             <a:pPr lvl="1"/>
             <a:r>
               <a:rPr lang="de-DE" dirty="0" smtClean="0"/>
-              <a:t>Grundlegende Clean Code-</a:t>
-            </a:r>
-            <a:r>
-              <a:rPr lang="de-DE" dirty="0" err="1" smtClean="0"/>
-              <a:t>Metriken</a:t>
+              <a:t>Bedeutung von CRAP oder </a:t>
+            </a:r>
+            <a:r>
+              <a:rPr lang="de-DE" dirty="0"/>
+              <a:t>Braithwaite </a:t>
             </a:r>
             <a:r>
               <a:rPr lang="de-DE" dirty="0" smtClean="0"/>
+              <a:t>Correlation?</a:t>
+            </a:r>
+            <a:r>
+              <a:rPr lang="de-DE" dirty="0"/>
               <a:t> </a:t>
+            </a:r>
+            <a:endParaRPr lang="de-DE" dirty="0" smtClean="0"/>
+          </a:p>
+          <a:p>
+            <a:pPr lvl="2"/>
+            <a:r>
+              <a:rPr lang="de-DE" dirty="0" smtClean="0"/>
+              <a:t>Bezug zu Clean Code? Nicht offensichtlich </a:t>
+            </a:r>
+            <a:r>
+              <a:rPr lang="de-DE" dirty="0" smtClean="0">
+                <a:sym typeface="Wingdings" pitchFamily="2" charset="2"/>
+              </a:rPr>
+              <a:t></a:t>
+            </a:r>
+            <a:endParaRPr lang="de-DE" dirty="0" smtClean="0"/>
+          </a:p>
+          <a:p>
+            <a:pPr lvl="1"/>
+            <a:r>
+              <a:rPr lang="de-DE" dirty="0" smtClean="0"/>
+              <a:t>Grundlegende Clean Code-Metriken </a:t>
             </a:r>
             <a:r>
               <a:rPr lang="de-DE" dirty="0"/>
@@ -39021,13 +39037,8 @@
             </a:r>
             <a:r>
               <a:rPr lang="de-DE" dirty="0" smtClean="0"/>
-              <a:t>kleine </a:t>
-            </a:r>
-            <a:r>
-              <a:rPr lang="de-DE" dirty="0" err="1" smtClean="0"/>
-              <a:t>Metriken</a:t>
-            </a:r>
-            <a:endParaRPr lang="de-DE" dirty="0" smtClean="0"/>
+              <a:t>kleine Metriken</a:t>
+            </a:r>
           </a:p>
           <a:p>
             <a:pPr lvl="1"/>
@@ -39074,7 +39085,7 @@
             <a:fld id="{CBC0F77A-B02C-46ED-92AE-5313E2DEEECD}" type="datetime1">
               <a:rPr lang="de-DE" smtClean="0"/>
               <a:pPr/>
-              <a:t>30.08.2012</a:t>
+              <a:t>07.09.2012</a:t>
             </a:fld>
             <a:endParaRPr lang="de-DE"/>
           </a:p>
@@ -39214,7 +39225,7 @@
             <a:fld id="{CBC0F77A-B02C-46ED-92AE-5313E2DEEECD}" type="datetime1">
               <a:rPr lang="de-DE" smtClean="0"/>
               <a:pPr/>
-              <a:t>30.08.2012</a:t>
+              <a:t>07.09.2012</a:t>
             </a:fld>
             <a:endParaRPr lang="de-DE"/>
           </a:p>
@@ -39352,7 +39363,7 @@
             <a:fld id="{CBC0F77A-B02C-46ED-92AE-5313E2DEEECD}" type="datetime1">
               <a:rPr lang="de-DE" smtClean="0"/>
               <a:pPr/>
-              <a:t>30.08.2012</a:t>
+              <a:t>07.09.2012</a:t>
             </a:fld>
             <a:endParaRPr lang="de-DE"/>
           </a:p>
@@ -39663,7 +39674,12 @@
             <p:ph idx="1"/>
           </p:nvPr>
         </p:nvSpPr>
-        <p:spPr/>
+        <p:spPr>
+          <a:xfrm>
+            <a:off x="457200" y="1700212"/>
+            <a:ext cx="8229600" cy="4753123"/>
+          </a:xfrm>
+        </p:spPr>
         <p:txBody>
           <a:bodyPr/>
           <a:lstStyle/>
@@ -39734,39 +39750,101 @@
             <a:pPr lvl="1"/>
             <a:r>
               <a:rPr lang="de-DE" dirty="0" smtClean="0"/>
-              <a:t>Neue Clean Code-Metrik</a:t>
+              <a:t>Neue </a:t>
+            </a:r>
+            <a:r>
+              <a:rPr lang="de-DE" dirty="0"/>
+              <a:t>Metrik mit </a:t>
+            </a:r>
+            <a:r>
+              <a:rPr lang="de-DE" dirty="0" smtClean="0"/>
+              <a:t>direktem Bezug zu Clean Code</a:t>
             </a:r>
           </a:p>
           <a:p>
             <a:pPr lvl="1"/>
             <a:r>
               <a:rPr lang="de-DE" dirty="0" smtClean="0"/>
-              <a:t>Kleinere </a:t>
-            </a:r>
-            <a:r>
-              <a:rPr lang="de-DE" dirty="0" err="1" smtClean="0"/>
-              <a:t>Metriken</a:t>
-            </a:r>
+              <a:t>Mehr kleinere Metriken, größeres Lambda</a:t>
+            </a:r>
+          </a:p>
+          <a:p>
+            <a:pPr lvl="2"/>
             <a:r>
               <a:rPr lang="de-DE" dirty="0" smtClean="0"/>
-              <a:t>, größeres Lambda</a:t>
-            </a:r>
-          </a:p>
-          <a:p>
-            <a:pPr lvl="1"/>
-            <a:r>
-              <a:rPr lang="de-DE" dirty="0" smtClean="0"/>
-              <a:t>Kleine Methodenlängen von Robert C. Martin </a:t>
-            </a:r>
-          </a:p>
-          <a:p>
-            <a:pPr marL="457200" lvl="1" indent="0">
+              <a:t>Bsp.: kleine Methodenlängen von Robert C. Martin </a:t>
+            </a:r>
+          </a:p>
+          <a:p>
+            <a:pPr marL="914400" lvl="2" indent="0">
               <a:buNone/>
             </a:pPr>
             <a:r>
+              <a:rPr lang="de-DE" dirty="0"/>
+              <a:t> </a:t>
+            </a:r>
+            <a:r>
               <a:rPr lang="de-DE" dirty="0" smtClean="0"/>
-              <a:t>     explizit befürwortet</a:t>
-            </a:r>
+              <a:t>    explizit befürwortet!</a:t>
+            </a:r>
+            <a:endParaRPr lang="de-DE" dirty="0"/>
+          </a:p>
+          <a:p>
+            <a:pPr lvl="1"/>
+            <a:r>
+              <a:rPr lang="de-DE" dirty="0" smtClean="0">
+                <a:solidFill>
+                  <a:srgbClr val="000000"/>
+                </a:solidFill>
+              </a:rPr>
+              <a:t>Veränderungen des </a:t>
+            </a:r>
+            <a:r>
+              <a:rPr lang="el-GR" dirty="0" smtClean="0">
+                <a:solidFill>
+                  <a:srgbClr val="000000"/>
+                </a:solidFill>
+              </a:rPr>
+              <a:t>λ</a:t>
+            </a:r>
+            <a:r>
+              <a:rPr lang="de-DE" dirty="0" smtClean="0">
+                <a:solidFill>
+                  <a:srgbClr val="000000"/>
+                </a:solidFill>
+              </a:rPr>
+              <a:t> klassifizieren Refactorings</a:t>
+            </a:r>
+          </a:p>
+          <a:p>
+            <a:pPr lvl="2"/>
+            <a:r>
+              <a:rPr lang="el-GR" dirty="0" smtClean="0">
+                <a:solidFill>
+                  <a:srgbClr val="000000"/>
+                </a:solidFill>
+              </a:rPr>
+              <a:t>λ</a:t>
+            </a:r>
+            <a:r>
+              <a:rPr lang="de-DE" dirty="0" smtClean="0">
+                <a:solidFill>
+                  <a:srgbClr val="000000"/>
+                </a:solidFill>
+              </a:rPr>
+              <a:t>-verbessernde Refactorings fördern Clean Code</a:t>
+            </a:r>
+            <a:endParaRPr lang="de-DE" dirty="0">
+              <a:solidFill>
+                <a:srgbClr val="000000"/>
+              </a:solidFill>
+            </a:endParaRPr>
+          </a:p>
+          <a:p>
+            <a:pPr marL="914400" lvl="2" indent="0">
+              <a:buNone/>
+            </a:pPr>
+            <a:endParaRPr lang="de-DE" dirty="0" smtClean="0"/>
           </a:p>
           <a:p>
             <a:pPr marL="457200" lvl="1" indent="0">
@@ -39794,7 +39872,7 @@
             <a:fld id="{CBC0F77A-B02C-46ED-92AE-5313E2DEEECD}" type="datetime1">
               <a:rPr lang="de-DE" smtClean="0"/>
               <a:pPr/>
-              <a:t>30.08.2012</a:t>
+              <a:t>07.09.2012</a:t>
             </a:fld>
             <a:endParaRPr lang="de-DE"/>
           </a:p>
@@ -40044,7 +40122,7 @@
             <a:fld id="{1B016BD9-B961-4061-825C-528CF92485FD}" type="datetime1">
               <a:rPr lang="de-DE" smtClean="0"/>
               <a:pPr/>
-              <a:t>30.08.2012</a:t>
+              <a:t>07.09.2012</a:t>
             </a:fld>
             <a:endParaRPr lang="de-DE"/>
           </a:p>
@@ -40213,7 +40291,7 @@
             <a:fld id="{CBC0F77A-B02C-46ED-92AE-5313E2DEEECD}" type="datetime1">
               <a:rPr lang="de-DE" smtClean="0"/>
               <a:pPr/>
-              <a:t>30.08.2012</a:t>
+              <a:t>07.09.2012</a:t>
             </a:fld>
             <a:endParaRPr lang="de-DE"/>
           </a:p>
@@ -40352,37 +40430,22 @@
           <a:p>
             <a:r>
               <a:rPr lang="de-DE" dirty="0" smtClean="0"/>
-              <a:t>Ein einziger transparenter Wert erleichtert Interpretation</a:t>
+              <a:t>Einschätzungen</a:t>
+            </a:r>
+            <a:r>
+              <a:rPr lang="de-DE" dirty="0"/>
+              <a:t>, Gewichtungen </a:t>
+            </a:r>
+            <a:r>
+              <a:rPr lang="de-DE" dirty="0" smtClean="0"/>
+              <a:t>und Vergleiche basieren auf Erfahrung</a:t>
             </a:r>
           </a:p>
           <a:p>
             <a:pPr lvl="1"/>
             <a:r>
-              <a:rPr lang="de-DE" dirty="0" err="1" smtClean="0"/>
-              <a:t>andrena</a:t>
-            </a:r>
-            <a:r>
               <a:rPr lang="de-DE" dirty="0" smtClean="0"/>
-              <a:t>-</a:t>
-            </a:r>
-            <a:r>
-              <a:rPr lang="de-DE" b="1" dirty="0" smtClean="0">
-                <a:solidFill>
-                  <a:schemeClr val="accent6">
-                    <a:lumMod val="60000"/>
-                    <a:lumOff val="40000"/>
-                  </a:schemeClr>
-                </a:solidFill>
-              </a:rPr>
-              <a:t>Softwarequalitätsindex</a:t>
-            </a:r>
-            <a:r>
-              <a:rPr lang="de-DE" dirty="0" smtClean="0"/>
-              <a:t> von Dr. </a:t>
-            </a:r>
-            <a:r>
-              <a:rPr lang="de-DE" dirty="0"/>
-              <a:t>Eberhard Kuhn</a:t>
+              <a:t>Automatisierbar?</a:t>
             </a:r>
           </a:p>
         </p:txBody>
@@ -40405,7 +40468,7 @@
             <a:fld id="{CBC0F77A-B02C-46ED-92AE-5313E2DEEECD}" type="datetime1">
               <a:rPr lang="de-DE" smtClean="0"/>
               <a:pPr/>
-              <a:t>30.08.2012</a:t>
+              <a:t>07.09.2012</a:t>
             </a:fld>
             <a:endParaRPr lang="de-DE"/>
           </a:p>
@@ -40527,7 +40590,7 @@
             </a:r>
             <a:r>
               <a:rPr lang="de-DE" dirty="0" smtClean="0"/>
-              <a:t>-Softwarequalitätsindex / Fenster</a:t>
+              <a:t>-Softwarequalitätsindex / Allgemein</a:t>
             </a:r>
             <a:endParaRPr lang="de-DE" dirty="0"/>
           </a:p>
@@ -40548,7 +40611,121 @@
           <a:bodyPr/>
           <a:lstStyle/>
           <a:p>
+            <a:r>
+              <a:rPr lang="de-DE" dirty="0" smtClean="0"/>
+              <a:t>Ein einziger transparenter Wert erleichtert Interpretation</a:t>
+            </a:r>
+          </a:p>
+          <a:p>
+            <a:pPr lvl="1"/>
+            <a:r>
+              <a:rPr lang="de-DE" dirty="0" err="1" smtClean="0"/>
+              <a:t>andrena</a:t>
+            </a:r>
+            <a:r>
+              <a:rPr lang="de-DE" dirty="0" smtClean="0"/>
+              <a:t>-</a:t>
+            </a:r>
+            <a:r>
+              <a:rPr lang="de-DE" b="1" dirty="0" smtClean="0">
+                <a:solidFill>
+                  <a:schemeClr val="accent6">
+                    <a:lumMod val="60000"/>
+                    <a:lumOff val="40000"/>
+                  </a:schemeClr>
+                </a:solidFill>
+              </a:rPr>
+              <a:t>Softwarequalitätsindex</a:t>
+            </a:r>
+            <a:r>
+              <a:rPr lang="de-DE" dirty="0" smtClean="0"/>
+              <a:t> von Dr. </a:t>
+            </a:r>
+            <a:r>
+              <a:rPr lang="de-DE" dirty="0"/>
+              <a:t>Eberhard </a:t>
+            </a:r>
+            <a:r>
+              <a:rPr lang="de-DE" dirty="0" smtClean="0"/>
+              <a:t>Kuhn</a:t>
+            </a:r>
+          </a:p>
+          <a:p>
+            <a:r>
+              <a:rPr lang="de-DE" dirty="0" smtClean="0"/>
+              <a:t>Aktuelle Bestimmung</a:t>
+            </a:r>
+          </a:p>
+          <a:p>
+            <a:pPr lvl="1"/>
+            <a:r>
+              <a:rPr lang="de-DE" dirty="0" smtClean="0"/>
+              <a:t>Software kompilieren</a:t>
+            </a:r>
+          </a:p>
+          <a:p>
+            <a:pPr lvl="1"/>
+            <a:r>
+              <a:rPr lang="de-DE" dirty="0" smtClean="0"/>
+              <a:t>Externes Tool für statische Code-Analyse starten (NDepend)</a:t>
+            </a:r>
+          </a:p>
+          <a:p>
+            <a:pPr lvl="1"/>
+            <a:r>
+              <a:rPr lang="de-DE" dirty="0" smtClean="0"/>
+              <a:t>Ergebnisbericht (Metriken) aufbereiten und in </a:t>
+            </a:r>
+            <a:r>
+              <a:rPr lang="de-DE" b="1" dirty="0" smtClean="0"/>
+              <a:t>Isis</a:t>
+            </a:r>
+            <a:r>
+              <a:rPr lang="de-DE" dirty="0" smtClean="0"/>
+              <a:t> importieren</a:t>
+            </a:r>
             <a:endParaRPr lang="de-DE" dirty="0"/>
+          </a:p>
+          <a:p>
+            <a:r>
+              <a:rPr lang="de-DE" b="1" dirty="0" smtClean="0"/>
+              <a:t>Isis</a:t>
+            </a:r>
+            <a:r>
+              <a:rPr lang="de-DE" dirty="0" smtClean="0"/>
+              <a:t> verwaltet und visualisiert die </a:t>
+            </a:r>
+            <a:r>
+              <a:rPr lang="de-DE" b="1" dirty="0" smtClean="0">
+                <a:solidFill>
+                  <a:schemeClr val="accent6">
+                    <a:lumMod val="60000"/>
+                    <a:lumOff val="40000"/>
+                  </a:schemeClr>
+                </a:solidFill>
+              </a:rPr>
+              <a:t>Softwarequalitätsindizes</a:t>
+            </a:r>
+          </a:p>
+          <a:p>
+            <a:r>
+              <a:rPr lang="de-DE" dirty="0" smtClean="0"/>
+              <a:t>Zu viele Context Switches erforderlich </a:t>
+            </a:r>
+            <a:r>
+              <a:rPr lang="de-DE" dirty="0" smtClean="0">
+                <a:sym typeface="Wingdings" pitchFamily="2" charset="2"/>
+              </a:rPr>
+              <a:t></a:t>
+            </a:r>
+            <a:endParaRPr lang="de-DE" b="1" dirty="0" smtClean="0">
+              <a:solidFill>
+                <a:schemeClr val="accent6">
+                  <a:lumMod val="60000"/>
+                  <a:lumOff val="40000"/>
+                </a:schemeClr>
+              </a:solidFill>
+            </a:endParaRPr>
           </a:p>
         </p:txBody>
       </p:sp>
@@ -40570,7 +40747,7 @@
             <a:fld id="{CBC0F77A-B02C-46ED-92AE-5313E2DEEECD}" type="datetime1">
               <a:rPr lang="de-DE" smtClean="0"/>
               <a:pPr/>
-              <a:t>30.08.2012</a:t>
+              <a:t>07.09.2012</a:t>
             </a:fld>
             <a:endParaRPr lang="de-DE"/>
           </a:p>
@@ -40595,6 +40772,141 @@
               <a:rPr lang="de-DE" smtClean="0"/>
               <a:pPr/>
               <a:t>45</a:t>
+            </a:fld>
+            <a:endParaRPr lang="de-DE"/>
+          </a:p>
+        </p:txBody>
+      </p:sp>
+    </p:spTree>
+    <p:extLst>
+      <p:ext uri="{BB962C8B-B14F-4D97-AF65-F5344CB8AC3E}">
+        <p14:creationId xmlns:p14="http://schemas.microsoft.com/office/powerpoint/2010/main" val="1130297946"/>
+      </p:ext>
+    </p:extLst>
+  </p:cSld>
+  <p:clrMapOvr>
+    <a:masterClrMapping/>
+  </p:clrMapOvr>
+  <p:transition>
+    <p:fade/>
+  </p:transition>
+  <p:timing>
+    <p:tnLst>
+      <p:par>
+        <p:cTn id="1" dur="indefinite" restart="never" nodeType="tmRoot"/>
+      </p:par>
+    </p:tnLst>
+  </p:timing>
+</p:sld>
+</file>
+
+<file path=ppt/slides/slide46.xml><?xml version="1.0" encoding="utf-8"?>
+<p:sld xmlns:a="http://schemas.openxmlformats.org/drawingml/2006/main" xmlns:r="http://schemas.openxmlformats.org/officeDocument/2006/relationships" xmlns:p="http://schemas.openxmlformats.org/presentationml/2006/main">
+  <p:cSld>
+    <p:spTree>
+      <p:nvGrpSpPr>
+        <p:cNvPr id="1" name=""/>
+        <p:cNvGrpSpPr/>
+        <p:nvPr/>
+      </p:nvGrpSpPr>
+      <p:grpSpPr>
+        <a:xfrm>
+          <a:off x="0" y="0"/>
+          <a:ext cx="0" cy="0"/>
+          <a:chOff x="0" y="0"/>
+          <a:chExt cx="0" cy="0"/>
+        </a:xfrm>
+      </p:grpSpPr>
+      <p:sp>
+        <p:nvSpPr>
+          <p:cNvPr id="6" name="Titel 5"/>
+          <p:cNvSpPr>
+            <a:spLocks noGrp="1"/>
+          </p:cNvSpPr>
+          <p:nvPr>
+            <p:ph type="title"/>
+          </p:nvPr>
+        </p:nvSpPr>
+        <p:spPr/>
+        <p:txBody>
+          <a:bodyPr/>
+          <a:lstStyle/>
+          <a:p>
+            <a:pPr marL="457200" indent="-457200"/>
+            <a:r>
+              <a:rPr lang="de-DE" dirty="0" err="1" smtClean="0"/>
+              <a:t>andrena</a:t>
+            </a:r>
+            <a:r>
+              <a:rPr lang="de-DE" dirty="0" smtClean="0"/>
+              <a:t>-Softwarequalitätsindex / Fenster</a:t>
+            </a:r>
+            <a:endParaRPr lang="de-DE" dirty="0"/>
+          </a:p>
+        </p:txBody>
+      </p:sp>
+      <p:sp>
+        <p:nvSpPr>
+          <p:cNvPr id="7" name="Textplatzhalter 6"/>
+          <p:cNvSpPr>
+            <a:spLocks noGrp="1"/>
+          </p:cNvSpPr>
+          <p:nvPr>
+            <p:ph idx="1"/>
+          </p:nvPr>
+        </p:nvSpPr>
+        <p:spPr/>
+        <p:txBody>
+          <a:bodyPr/>
+          <a:lstStyle/>
+          <a:p>
+            <a:endParaRPr lang="de-DE" dirty="0"/>
+          </a:p>
+        </p:txBody>
+      </p:sp>
+      <p:sp>
+        <p:nvSpPr>
+          <p:cNvPr id="4" name="Datumsplatzhalter 3"/>
+          <p:cNvSpPr>
+            <a:spLocks noGrp="1"/>
+          </p:cNvSpPr>
+          <p:nvPr>
+            <p:ph type="dt" sz="half" idx="10"/>
+          </p:nvPr>
+        </p:nvSpPr>
+        <p:spPr/>
+        <p:txBody>
+          <a:bodyPr/>
+          <a:lstStyle/>
+          <a:p>
+            <a:fld id="{CBC0F77A-B02C-46ED-92AE-5313E2DEEECD}" type="datetime1">
+              <a:rPr lang="de-DE" smtClean="0"/>
+              <a:pPr/>
+              <a:t>07.09.2012</a:t>
+            </a:fld>
+            <a:endParaRPr lang="de-DE"/>
+          </a:p>
+        </p:txBody>
+      </p:sp>
+      <p:sp>
+        <p:nvSpPr>
+          <p:cNvPr id="5" name="Foliennummernplatzhalter 4"/>
+          <p:cNvSpPr>
+            <a:spLocks noGrp="1"/>
+          </p:cNvSpPr>
+          <p:nvPr>
+            <p:ph type="sldNum" sz="quarter" idx="12"/>
+          </p:nvPr>
+        </p:nvSpPr>
+        <p:spPr/>
+        <p:txBody>
+          <a:bodyPr/>
+          <a:lstStyle/>
+          <a:p>
+            <a:fld id="{8D677B59-25B7-4E9E-8A1D-B1026FACA9B2}" type="slidenum">
+              <a:rPr lang="de-DE" smtClean="0"/>
+              <a:pPr/>
+              <a:t>46</a:t>
             </a:fld>
             <a:endParaRPr lang="de-DE"/>
           </a:p>
@@ -40683,7 +40995,7 @@
 </p:sld>
 </file>
 
-<file path=ppt/slides/slide46.xml><?xml version="1.0" encoding="utf-8"?>
+<file path=ppt/slides/slide47.xml><?xml version="1.0" encoding="utf-8"?>
 <p:sld xmlns:a="http://schemas.openxmlformats.org/drawingml/2006/main" xmlns:r="http://schemas.openxmlformats.org/officeDocument/2006/relationships" xmlns:p="http://schemas.openxmlformats.org/presentationml/2006/main">
   <p:cSld>
     <p:spTree>
@@ -40745,15 +41057,77 @@
           <a:p>
             <a:r>
               <a:rPr lang="de-DE" dirty="0" smtClean="0"/>
-              <a:t>Gewichtete Softwarequalitätsniveaus für jeden Parameter m</a:t>
-            </a:r>
-          </a:p>
-          <a:p>
-            <a:pPr lvl="1"/>
+              <a:t>Testabdeckung in Prozent</a:t>
+            </a:r>
+            <a:endParaRPr lang="de-DE" dirty="0" smtClean="0"/>
+          </a:p>
+          <a:p>
+            <a:r>
+              <a:rPr lang="de-DE" dirty="0"/>
+              <a:t>Anzahl der </a:t>
+            </a:r>
             <a:r>
               <a:rPr lang="de-DE" dirty="0" smtClean="0"/>
-              <a:t>(außer Testabdeckung)</a:t>
-            </a:r>
+              <a:t>Namespaces </a:t>
+            </a:r>
+            <a:r>
+              <a:rPr lang="de-DE" dirty="0" smtClean="0"/>
+              <a:t>in Zyklen</a:t>
+            </a:r>
+          </a:p>
+          <a:p>
+            <a:r>
+              <a:rPr lang="de-DE" dirty="0"/>
+              <a:t>Anzahl der </a:t>
+            </a:r>
+            <a:r>
+              <a:rPr lang="de-DE" dirty="0" smtClean="0"/>
+              <a:t>komplizierten </a:t>
+            </a:r>
+            <a:r>
+              <a:rPr lang="de-DE" dirty="0" smtClean="0"/>
+              <a:t>Methoden</a:t>
+            </a:r>
+          </a:p>
+          <a:p>
+            <a:pPr lvl="0"/>
+            <a:r>
+              <a:rPr lang="de-DE" dirty="0"/>
+              <a:t>Durchschnittliche Komponentenabhängigkeit </a:t>
+            </a:r>
+            <a:r>
+              <a:rPr lang="de-DE" dirty="0" smtClean="0"/>
+              <a:t>in Prozent</a:t>
+            </a:r>
+          </a:p>
+          <a:p>
+            <a:pPr lvl="0"/>
+            <a:r>
+              <a:rPr lang="de-DE" dirty="0" smtClean="0"/>
+              <a:t>Anzahl der großen Klassen</a:t>
+            </a:r>
+          </a:p>
+          <a:p>
+            <a:pPr lvl="0"/>
+            <a:r>
+              <a:rPr lang="de-DE" dirty="0"/>
+              <a:t>Anzahl der großen </a:t>
+            </a:r>
+            <a:r>
+              <a:rPr lang="de-DE" dirty="0" smtClean="0"/>
+              <a:t>Große Methoden</a:t>
+            </a:r>
+          </a:p>
+          <a:p>
+            <a:pPr lvl="0"/>
+            <a:r>
+              <a:rPr lang="de-DE" dirty="0" smtClean="0"/>
+              <a:t>Anzahl der Compiler-Warnungen</a:t>
+            </a:r>
+            <a:endParaRPr lang="en-US" dirty="0"/>
+          </a:p>
+          <a:p>
+            <a:endParaRPr lang="de-DE" dirty="0" smtClean="0"/>
           </a:p>
           <a:p>
             <a:endParaRPr lang="de-DE" dirty="0"/>
@@ -40811,7 +41185,7 @@
             <a:fld id="{CBC0F77A-B02C-46ED-92AE-5313E2DEEECD}" type="datetime1">
               <a:rPr lang="de-DE" smtClean="0"/>
               <a:pPr/>
-              <a:t>30.08.2012</a:t>
+              <a:t>07.09.2012</a:t>
             </a:fld>
             <a:endParaRPr lang="de-DE"/>
           </a:p>
@@ -40835,7 +41209,188 @@
             <a:fld id="{8D677B59-25B7-4E9E-8A1D-B1026FACA9B2}" type="slidenum">
               <a:rPr lang="de-DE" smtClean="0"/>
               <a:pPr/>
-              <a:t>46</a:t>
+              <a:t>47</a:t>
+            </a:fld>
+            <a:endParaRPr lang="de-DE"/>
+          </a:p>
+        </p:txBody>
+      </p:sp>
+    </p:spTree>
+    <p:extLst>
+      <p:ext uri="{BB962C8B-B14F-4D97-AF65-F5344CB8AC3E}">
+        <p14:creationId xmlns:p14="http://schemas.microsoft.com/office/powerpoint/2010/main" val="221501649"/>
+      </p:ext>
+    </p:extLst>
+  </p:cSld>
+  <p:clrMapOvr>
+    <a:masterClrMapping/>
+  </p:clrMapOvr>
+  <p:transition>
+    <p:fade/>
+  </p:transition>
+  <p:timing>
+    <p:tnLst>
+      <p:par>
+        <p:cTn id="1" dur="indefinite" restart="never" nodeType="tmRoot"/>
+      </p:par>
+    </p:tnLst>
+  </p:timing>
+</p:sld>
+</file>
+
+<file path=ppt/slides/slide48.xml><?xml version="1.0" encoding="utf-8"?>
+<p:sld xmlns:a="http://schemas.openxmlformats.org/drawingml/2006/main" xmlns:r="http://schemas.openxmlformats.org/officeDocument/2006/relationships" xmlns:p="http://schemas.openxmlformats.org/presentationml/2006/main">
+  <p:cSld>
+    <p:spTree>
+      <p:nvGrpSpPr>
+        <p:cNvPr id="1" name=""/>
+        <p:cNvGrpSpPr/>
+        <p:nvPr/>
+      </p:nvGrpSpPr>
+      <p:grpSpPr>
+        <a:xfrm>
+          <a:off x="0" y="0"/>
+          <a:ext cx="0" cy="0"/>
+          <a:chOff x="0" y="0"/>
+          <a:chExt cx="0" cy="0"/>
+        </a:xfrm>
+      </p:grpSpPr>
+      <p:sp>
+        <p:nvSpPr>
+          <p:cNvPr id="6" name="Titel 5"/>
+          <p:cNvSpPr>
+            <a:spLocks noGrp="1"/>
+          </p:cNvSpPr>
+          <p:nvPr>
+            <p:ph type="title"/>
+          </p:nvPr>
+        </p:nvSpPr>
+        <p:spPr/>
+        <p:txBody>
+          <a:bodyPr/>
+          <a:lstStyle/>
+          <a:p>
+            <a:pPr marL="457200" indent="-457200"/>
+            <a:r>
+              <a:rPr lang="de-DE" dirty="0" err="1" smtClean="0"/>
+              <a:t>andrena</a:t>
+            </a:r>
+            <a:r>
+              <a:rPr lang="de-DE" dirty="0" smtClean="0"/>
+              <a:t>-Softwarequalitätsindex / Berechnung</a:t>
+            </a:r>
+            <a:endParaRPr lang="de-DE" dirty="0"/>
+          </a:p>
+        </p:txBody>
+      </p:sp>
+      <p:sp>
+        <p:nvSpPr>
+          <p:cNvPr id="7" name="Textplatzhalter 6"/>
+          <p:cNvSpPr>
+            <a:spLocks noGrp="1"/>
+          </p:cNvSpPr>
+          <p:nvPr>
+            <p:ph idx="1"/>
+          </p:nvPr>
+        </p:nvSpPr>
+        <p:spPr/>
+        <p:txBody>
+          <a:bodyPr/>
+          <a:lstStyle/>
+          <a:p>
+            <a:r>
+              <a:rPr lang="de-DE" dirty="0" smtClean="0"/>
+              <a:t>Gewichtete Softwarequalitätsniveaus für jeden Parameter m</a:t>
+            </a:r>
+          </a:p>
+          <a:p>
+            <a:pPr lvl="1"/>
+            <a:r>
+              <a:rPr lang="de-DE" dirty="0" smtClean="0"/>
+              <a:t>(außer Testabdeckung)</a:t>
+            </a:r>
+          </a:p>
+          <a:p>
+            <a:endParaRPr lang="de-DE" dirty="0"/>
+          </a:p>
+          <a:p>
+            <a:endParaRPr lang="de-DE" dirty="0" smtClean="0"/>
+          </a:p>
+          <a:p>
+            <a:endParaRPr lang="de-DE" dirty="0"/>
+          </a:p>
+          <a:p>
+            <a:endParaRPr lang="de-DE" dirty="0" smtClean="0"/>
+          </a:p>
+          <a:p>
+            <a:endParaRPr lang="de-DE" dirty="0"/>
+          </a:p>
+          <a:p>
+            <a:endParaRPr lang="de-DE" dirty="0" smtClean="0"/>
+          </a:p>
+          <a:p>
+            <a:endParaRPr lang="de-DE" dirty="0"/>
+          </a:p>
+          <a:p>
+            <a:r>
+              <a:rPr lang="de-DE" dirty="0" smtClean="0"/>
+              <a:t>Summe aller gewichteten </a:t>
+            </a:r>
+            <a:r>
+              <a:rPr lang="de-DE" dirty="0" err="1" smtClean="0"/>
+              <a:t>gewichteten</a:t>
+            </a:r>
+            <a:r>
+              <a:rPr lang="de-DE" dirty="0" smtClean="0"/>
+              <a:t> Softwarequalitätsniveaus</a:t>
+            </a:r>
+            <a:endParaRPr lang="de-DE" dirty="0"/>
+          </a:p>
+        </p:txBody>
+      </p:sp>
+      <p:sp>
+        <p:nvSpPr>
+          <p:cNvPr id="4" name="Datumsplatzhalter 3"/>
+          <p:cNvSpPr>
+            <a:spLocks noGrp="1"/>
+          </p:cNvSpPr>
+          <p:nvPr>
+            <p:ph type="dt" sz="half" idx="10"/>
+          </p:nvPr>
+        </p:nvSpPr>
+        <p:spPr/>
+        <p:txBody>
+          <a:bodyPr/>
+          <a:lstStyle/>
+          <a:p>
+            <a:fld id="{CBC0F77A-B02C-46ED-92AE-5313E2DEEECD}" type="datetime1">
+              <a:rPr lang="de-DE" smtClean="0"/>
+              <a:pPr/>
+              <a:t>07.09.2012</a:t>
+            </a:fld>
+            <a:endParaRPr lang="de-DE"/>
+          </a:p>
+        </p:txBody>
+      </p:sp>
+      <p:sp>
+        <p:nvSpPr>
+          <p:cNvPr id="5" name="Foliennummernplatzhalter 4"/>
+          <p:cNvSpPr>
+            <a:spLocks noGrp="1"/>
+          </p:cNvSpPr>
+          <p:nvPr>
+            <p:ph type="sldNum" sz="quarter" idx="12"/>
+          </p:nvPr>
+        </p:nvSpPr>
+        <p:spPr/>
+        <p:txBody>
+          <a:bodyPr/>
+          <a:lstStyle/>
+          <a:p>
+            <a:fld id="{8D677B59-25B7-4E9E-8A1D-B1026FACA9B2}" type="slidenum">
+              <a:rPr lang="de-DE" smtClean="0"/>
+              <a:pPr/>
+              <a:t>48</a:t>
             </a:fld>
             <a:endParaRPr lang="de-DE"/>
           </a:p>
@@ -41098,7 +41653,7 @@
     </p:spTree>
     <p:extLst>
       <p:ext uri="{BB962C8B-B14F-4D97-AF65-F5344CB8AC3E}">
-        <p14:creationId xmlns:p14="http://schemas.microsoft.com/office/powerpoint/2010/main" val="221501649"/>
+        <p14:creationId xmlns:p14="http://schemas.microsoft.com/office/powerpoint/2010/main" val="519756718"/>
       </p:ext>
     </p:extLst>
   </p:cSld>
@@ -41118,7 +41673,7 @@
 </p:sld>
 </file>
 
-<file path=ppt/slides/slide47.xml><?xml version="1.0" encoding="utf-8"?>
+<file path=ppt/slides/slide49.xml><?xml version="1.0" encoding="utf-8"?>
 <p:sld xmlns:a="http://schemas.openxmlformats.org/drawingml/2006/main" xmlns:r="http://schemas.openxmlformats.org/officeDocument/2006/relationships" xmlns:p="http://schemas.openxmlformats.org/presentationml/2006/main">
   <p:cSld>
     <p:spTree>
@@ -41184,7 +41739,7 @@
             <a:fld id="{1B016BD9-B961-4061-825C-528CF92485FD}" type="datetime1">
               <a:rPr lang="de-DE" smtClean="0"/>
               <a:pPr/>
-              <a:t>30.08.2012</a:t>
+              <a:t>07.09.2012</a:t>
             </a:fld>
             <a:endParaRPr lang="de-DE"/>
           </a:p>
@@ -41208,7 +41763,7 @@
             <a:fld id="{A437370E-0A3A-4D85-96CB-71DC38947A9B}" type="slidenum">
               <a:rPr lang="de-DE" smtClean="0"/>
               <a:pPr/>
-              <a:t>47</a:t>
+              <a:t>49</a:t>
             </a:fld>
             <a:endParaRPr lang="de-DE"/>
           </a:p>
@@ -41262,7 +41817,273 @@
 </p:sld>
 </file>
 
-<file path=ppt/slides/slide48.xml><?xml version="1.0" encoding="utf-8"?>
+<file path=ppt/slides/slide5.xml><?xml version="1.0" encoding="utf-8"?>
+<p:sld xmlns:a="http://schemas.openxmlformats.org/drawingml/2006/main" xmlns:r="http://schemas.openxmlformats.org/officeDocument/2006/relationships" xmlns:p="http://schemas.openxmlformats.org/presentationml/2006/main">
+  <p:cSld>
+    <p:spTree>
+      <p:nvGrpSpPr>
+        <p:cNvPr id="1" name=""/>
+        <p:cNvGrpSpPr/>
+        <p:nvPr/>
+      </p:nvGrpSpPr>
+      <p:grpSpPr>
+        <a:xfrm>
+          <a:off x="0" y="0"/>
+          <a:ext cx="0" cy="0"/>
+          <a:chOff x="0" y="0"/>
+          <a:chExt cx="0" cy="0"/>
+        </a:xfrm>
+      </p:grpSpPr>
+      <p:sp>
+        <p:nvSpPr>
+          <p:cNvPr id="2" name="Titel 1"/>
+          <p:cNvSpPr>
+            <a:spLocks noGrp="1"/>
+          </p:cNvSpPr>
+          <p:nvPr>
+            <p:ph type="title"/>
+          </p:nvPr>
+        </p:nvSpPr>
+        <p:spPr/>
+        <p:txBody>
+          <a:bodyPr/>
+          <a:lstStyle/>
+          <a:p>
+            <a:r>
+              <a:rPr lang="de-DE" dirty="0"/>
+              <a:t>Anforderungen </a:t>
+            </a:r>
+            <a:r>
+              <a:rPr lang="de-DE" dirty="0" smtClean="0"/>
+              <a:t>/ Aufgabe</a:t>
+            </a:r>
+            <a:endParaRPr lang="de-DE" dirty="0"/>
+          </a:p>
+        </p:txBody>
+      </p:sp>
+      <p:sp>
+        <p:nvSpPr>
+          <p:cNvPr id="4" name="Datumsplatzhalter 3"/>
+          <p:cNvSpPr>
+            <a:spLocks noGrp="1"/>
+          </p:cNvSpPr>
+          <p:nvPr>
+            <p:ph type="dt" sz="half" idx="10"/>
+          </p:nvPr>
+        </p:nvSpPr>
+        <p:spPr/>
+        <p:txBody>
+          <a:bodyPr/>
+          <a:lstStyle/>
+          <a:p>
+            <a:fld id="{CBC0F77A-B02C-46ED-92AE-5313E2DEEECD}" type="datetime1">
+              <a:rPr lang="de-DE" smtClean="0"/>
+              <a:pPr/>
+              <a:t>07.09.2012</a:t>
+            </a:fld>
+            <a:endParaRPr lang="de-DE"/>
+          </a:p>
+        </p:txBody>
+      </p:sp>
+      <p:sp>
+        <p:nvSpPr>
+          <p:cNvPr id="5" name="Foliennummernplatzhalter 4"/>
+          <p:cNvSpPr>
+            <a:spLocks noGrp="1"/>
+          </p:cNvSpPr>
+          <p:nvPr>
+            <p:ph type="sldNum" sz="quarter" idx="12"/>
+          </p:nvPr>
+        </p:nvSpPr>
+        <p:spPr/>
+        <p:txBody>
+          <a:bodyPr/>
+          <a:lstStyle/>
+          <a:p>
+            <a:fld id="{8D677B59-25B7-4E9E-8A1D-B1026FACA9B2}" type="slidenum">
+              <a:rPr lang="de-DE" smtClean="0"/>
+              <a:pPr/>
+              <a:t>5</a:t>
+            </a:fld>
+            <a:endParaRPr lang="de-DE"/>
+          </a:p>
+        </p:txBody>
+      </p:sp>
+      <p:sp>
+        <p:nvSpPr>
+          <p:cNvPr id="8" name="Inhaltsplatzhalter 7"/>
+          <p:cNvSpPr>
+            <a:spLocks noGrp="1"/>
+          </p:cNvSpPr>
+          <p:nvPr>
+            <p:ph idx="1"/>
+          </p:nvPr>
+        </p:nvSpPr>
+        <p:spPr/>
+        <p:txBody>
+          <a:bodyPr/>
+          <a:lstStyle/>
+          <a:p>
+            <a:r>
+              <a:rPr lang="de-DE" dirty="0"/>
+              <a:t>Visual </a:t>
+            </a:r>
+            <a:r>
+              <a:rPr lang="de-DE" dirty="0" smtClean="0"/>
+              <a:t>Studio-Erweiterung (</a:t>
+            </a:r>
+            <a:r>
+              <a:rPr lang="de-DE" dirty="0"/>
+              <a:t>Usus für </a:t>
+            </a:r>
+            <a:r>
+              <a:rPr lang="de-DE" dirty="0" err="1"/>
+              <a:t>Eclipse</a:t>
+            </a:r>
+            <a:r>
+              <a:rPr lang="de-DE" dirty="0"/>
+              <a:t> als </a:t>
+            </a:r>
+            <a:r>
+              <a:rPr lang="de-DE" dirty="0" smtClean="0"/>
+              <a:t>Vorlage)</a:t>
+            </a:r>
+            <a:endParaRPr lang="de-DE" dirty="0"/>
+          </a:p>
+          <a:p>
+            <a:r>
+              <a:rPr lang="de-DE" dirty="0"/>
+              <a:t>direktes </a:t>
+            </a:r>
+            <a:r>
+              <a:rPr lang="de-DE" dirty="0" smtClean="0"/>
+              <a:t>Feedback anhand von </a:t>
+            </a:r>
+            <a:r>
+              <a:rPr lang="de-DE" dirty="0" err="1" smtClean="0"/>
+              <a:t>Softwaremetriken</a:t>
+            </a:r>
+            <a:endParaRPr lang="de-DE" dirty="0"/>
+          </a:p>
+          <a:p>
+            <a:r>
+              <a:rPr lang="de-DE" dirty="0" smtClean="0"/>
+              <a:t>Softwareentwickler </a:t>
+            </a:r>
+            <a:r>
+              <a:rPr lang="de-DE" dirty="0"/>
+              <a:t>unterstützen </a:t>
+            </a:r>
+            <a:r>
+              <a:rPr lang="de-DE" dirty="0" smtClean="0"/>
+              <a:t>bei </a:t>
+            </a:r>
+            <a:r>
+              <a:rPr lang="de-DE" dirty="0"/>
+              <a:t>Clean </a:t>
+            </a:r>
+            <a:r>
+              <a:rPr lang="de-DE" dirty="0" smtClean="0"/>
+              <a:t>Code-Entwicklung</a:t>
+            </a:r>
+          </a:p>
+          <a:p>
+            <a:endParaRPr lang="de-DE" dirty="0"/>
+          </a:p>
+          <a:p>
+            <a:r>
+              <a:rPr lang="de-DE" dirty="0" err="1"/>
+              <a:t>Heuristiken</a:t>
+            </a:r>
+            <a:r>
+              <a:rPr lang="de-DE" dirty="0"/>
+              <a:t> </a:t>
+            </a:r>
+            <a:r>
+              <a:rPr lang="de-DE" dirty="0" smtClean="0"/>
+              <a:t>der Histogramme erkennen</a:t>
+            </a:r>
+            <a:endParaRPr lang="de-DE" dirty="0"/>
+          </a:p>
+          <a:p>
+            <a:r>
+              <a:rPr lang="de-DE" dirty="0" smtClean="0"/>
+              <a:t>Softwarequalitätsindex (SQI</a:t>
+            </a:r>
+            <a:r>
+              <a:rPr lang="de-DE" dirty="0"/>
+              <a:t>) </a:t>
+            </a:r>
+            <a:r>
+              <a:rPr lang="de-DE" dirty="0" smtClean="0"/>
+              <a:t>berechnen</a:t>
+            </a:r>
+          </a:p>
+          <a:p>
+            <a:r>
+              <a:rPr lang="de-DE" dirty="0" smtClean="0"/>
+              <a:t>Evaluierung </a:t>
+            </a:r>
+            <a:r>
+              <a:rPr lang="de-DE" dirty="0"/>
+              <a:t>von </a:t>
+            </a:r>
+            <a:r>
+              <a:rPr lang="de-DE" dirty="0" smtClean="0"/>
+              <a:t>Beispielaufgabe </a:t>
+            </a:r>
+            <a:r>
+              <a:rPr lang="de-DE" dirty="0"/>
+              <a:t>(</a:t>
+            </a:r>
+            <a:r>
+              <a:rPr lang="de-DE" dirty="0" err="1" smtClean="0"/>
+              <a:t>andrena</a:t>
+            </a:r>
+            <a:r>
+              <a:rPr lang="de-DE" dirty="0" smtClean="0"/>
+              <a:t>-Kurs</a:t>
+            </a:r>
+            <a:r>
+              <a:rPr lang="de-DE" dirty="0"/>
+              <a:t>)</a:t>
+            </a:r>
+          </a:p>
+          <a:p>
+            <a:pPr marL="0" indent="0">
+              <a:buNone/>
+            </a:pPr>
+            <a:endParaRPr lang="de-DE" dirty="0"/>
+          </a:p>
+          <a:p>
+            <a:endParaRPr lang="de-DE" dirty="0"/>
+          </a:p>
+        </p:txBody>
+      </p:sp>
+    </p:spTree>
+    <p:extLst>
+      <p:ext uri="{BB962C8B-B14F-4D97-AF65-F5344CB8AC3E}">
+        <p14:creationId xmlns:p14="http://schemas.microsoft.com/office/powerpoint/2010/main" val="3010698932"/>
+      </p:ext>
+    </p:extLst>
+  </p:cSld>
+  <p:clrMapOvr>
+    <a:masterClrMapping/>
+  </p:clrMapOvr>
+  <p:transition>
+    <p:fade/>
+  </p:transition>
+  <p:timing>
+    <p:tnLst>
+      <p:par>
+        <p:cTn id="1" dur="indefinite" restart="never" nodeType="tmRoot"/>
+      </p:par>
+    </p:tnLst>
+  </p:timing>
+</p:sld>
+</file>
+
+<file path=ppt/slides/slide50.xml><?xml version="1.0" encoding="utf-8"?>
 <p:sld xmlns:a="http://schemas.openxmlformats.org/drawingml/2006/main" xmlns:r="http://schemas.openxmlformats.org/officeDocument/2006/relationships" xmlns:p="http://schemas.openxmlformats.org/presentationml/2006/main">
   <p:cSld>
     <p:spTree>
@@ -41349,7 +42170,7 @@
             <a:fld id="{CBC0F77A-B02C-46ED-92AE-5313E2DEEECD}" type="datetime1">
               <a:rPr lang="de-DE" smtClean="0"/>
               <a:pPr/>
-              <a:t>30.08.2012</a:t>
+              <a:t>07.09.2012</a:t>
             </a:fld>
             <a:endParaRPr lang="de-DE"/>
           </a:p>
@@ -41373,7 +42194,7 @@
             <a:fld id="{8D677B59-25B7-4E9E-8A1D-B1026FACA9B2}" type="slidenum">
               <a:rPr lang="de-DE" smtClean="0"/>
               <a:pPr/>
-              <a:t>48</a:t>
+              <a:t>50</a:t>
             </a:fld>
             <a:endParaRPr lang="de-DE"/>
           </a:p>
@@ -41402,7 +42223,7 @@
 </p:sld>
 </file>
 
-<file path=ppt/slides/slide49.xml><?xml version="1.0" encoding="utf-8"?>
+<file path=ppt/slides/slide51.xml><?xml version="1.0" encoding="utf-8"?>
 <p:sld xmlns:a="http://schemas.openxmlformats.org/drawingml/2006/main" xmlns:r="http://schemas.openxmlformats.org/officeDocument/2006/relationships" xmlns:p="http://schemas.openxmlformats.org/presentationml/2006/main">
   <p:cSld>
     <p:spTree>
@@ -41461,7 +42282,7 @@
             <a:fld id="{CBC0F77A-B02C-46ED-92AE-5313E2DEEECD}" type="datetime1">
               <a:rPr lang="de-DE" smtClean="0"/>
               <a:pPr/>
-              <a:t>30.08.2012</a:t>
+              <a:t>07.09.2012</a:t>
             </a:fld>
             <a:endParaRPr lang="de-DE"/>
           </a:p>
@@ -41485,7 +42306,7 @@
             <a:fld id="{8D677B59-25B7-4E9E-8A1D-B1026FACA9B2}" type="slidenum">
               <a:rPr lang="de-DE" smtClean="0"/>
               <a:pPr/>
-              <a:t>49</a:t>
+              <a:t>51</a:t>
             </a:fld>
             <a:endParaRPr lang="de-DE"/>
           </a:p>
@@ -41597,273 +42418,7 @@
 </p:sld>
 </file>
 
-<file path=ppt/slides/slide5.xml><?xml version="1.0" encoding="utf-8"?>
-<p:sld xmlns:a="http://schemas.openxmlformats.org/drawingml/2006/main" xmlns:r="http://schemas.openxmlformats.org/officeDocument/2006/relationships" xmlns:p="http://schemas.openxmlformats.org/presentationml/2006/main">
-  <p:cSld>
-    <p:spTree>
-      <p:nvGrpSpPr>
-        <p:cNvPr id="1" name=""/>
-        <p:cNvGrpSpPr/>
-        <p:nvPr/>
-      </p:nvGrpSpPr>
-      <p:grpSpPr>
-        <a:xfrm>
-          <a:off x="0" y="0"/>
-          <a:ext cx="0" cy="0"/>
-          <a:chOff x="0" y="0"/>
-          <a:chExt cx="0" cy="0"/>
-        </a:xfrm>
-      </p:grpSpPr>
-      <p:sp>
-        <p:nvSpPr>
-          <p:cNvPr id="2" name="Titel 1"/>
-          <p:cNvSpPr>
-            <a:spLocks noGrp="1"/>
-          </p:cNvSpPr>
-          <p:nvPr>
-            <p:ph type="title"/>
-          </p:nvPr>
-        </p:nvSpPr>
-        <p:spPr/>
-        <p:txBody>
-          <a:bodyPr/>
-          <a:lstStyle/>
-          <a:p>
-            <a:r>
-              <a:rPr lang="de-DE" dirty="0"/>
-              <a:t>Anforderungen </a:t>
-            </a:r>
-            <a:r>
-              <a:rPr lang="de-DE" dirty="0" smtClean="0"/>
-              <a:t>/ Aufgabe</a:t>
-            </a:r>
-            <a:endParaRPr lang="de-DE" dirty="0"/>
-          </a:p>
-        </p:txBody>
-      </p:sp>
-      <p:sp>
-        <p:nvSpPr>
-          <p:cNvPr id="4" name="Datumsplatzhalter 3"/>
-          <p:cNvSpPr>
-            <a:spLocks noGrp="1"/>
-          </p:cNvSpPr>
-          <p:nvPr>
-            <p:ph type="dt" sz="half" idx="10"/>
-          </p:nvPr>
-        </p:nvSpPr>
-        <p:spPr/>
-        <p:txBody>
-          <a:bodyPr/>
-          <a:lstStyle/>
-          <a:p>
-            <a:fld id="{CBC0F77A-B02C-46ED-92AE-5313E2DEEECD}" type="datetime1">
-              <a:rPr lang="de-DE" smtClean="0"/>
-              <a:pPr/>
-              <a:t>30.08.2012</a:t>
-            </a:fld>
-            <a:endParaRPr lang="de-DE"/>
-          </a:p>
-        </p:txBody>
-      </p:sp>
-      <p:sp>
-        <p:nvSpPr>
-          <p:cNvPr id="5" name="Foliennummernplatzhalter 4"/>
-          <p:cNvSpPr>
-            <a:spLocks noGrp="1"/>
-          </p:cNvSpPr>
-          <p:nvPr>
-            <p:ph type="sldNum" sz="quarter" idx="12"/>
-          </p:nvPr>
-        </p:nvSpPr>
-        <p:spPr/>
-        <p:txBody>
-          <a:bodyPr/>
-          <a:lstStyle/>
-          <a:p>
-            <a:fld id="{8D677B59-25B7-4E9E-8A1D-B1026FACA9B2}" type="slidenum">
-              <a:rPr lang="de-DE" smtClean="0"/>
-              <a:pPr/>
-              <a:t>5</a:t>
-            </a:fld>
-            <a:endParaRPr lang="de-DE"/>
-          </a:p>
-        </p:txBody>
-      </p:sp>
-      <p:sp>
-        <p:nvSpPr>
-          <p:cNvPr id="8" name="Inhaltsplatzhalter 7"/>
-          <p:cNvSpPr>
-            <a:spLocks noGrp="1"/>
-          </p:cNvSpPr>
-          <p:nvPr>
-            <p:ph idx="1"/>
-          </p:nvPr>
-        </p:nvSpPr>
-        <p:spPr/>
-        <p:txBody>
-          <a:bodyPr/>
-          <a:lstStyle/>
-          <a:p>
-            <a:r>
-              <a:rPr lang="de-DE" dirty="0"/>
-              <a:t>Visual </a:t>
-            </a:r>
-            <a:r>
-              <a:rPr lang="de-DE" dirty="0" smtClean="0"/>
-              <a:t>Studio-Erweiterung (</a:t>
-            </a:r>
-            <a:r>
-              <a:rPr lang="de-DE" dirty="0"/>
-              <a:t>Usus für </a:t>
-            </a:r>
-            <a:r>
-              <a:rPr lang="de-DE" dirty="0" err="1"/>
-              <a:t>Eclipse</a:t>
-            </a:r>
-            <a:r>
-              <a:rPr lang="de-DE" dirty="0"/>
-              <a:t> als </a:t>
-            </a:r>
-            <a:r>
-              <a:rPr lang="de-DE" dirty="0" smtClean="0"/>
-              <a:t>Vorlage)</a:t>
-            </a:r>
-            <a:endParaRPr lang="de-DE" dirty="0"/>
-          </a:p>
-          <a:p>
-            <a:r>
-              <a:rPr lang="de-DE" dirty="0"/>
-              <a:t>direktes </a:t>
-            </a:r>
-            <a:r>
-              <a:rPr lang="de-DE" dirty="0" smtClean="0"/>
-              <a:t>Feedback anhand von </a:t>
-            </a:r>
-            <a:r>
-              <a:rPr lang="de-DE" dirty="0" err="1" smtClean="0"/>
-              <a:t>Softwaremetriken</a:t>
-            </a:r>
-            <a:endParaRPr lang="de-DE" dirty="0"/>
-          </a:p>
-          <a:p>
-            <a:r>
-              <a:rPr lang="de-DE" dirty="0" smtClean="0"/>
-              <a:t>Softwareentwickler </a:t>
-            </a:r>
-            <a:r>
-              <a:rPr lang="de-DE" dirty="0"/>
-              <a:t>unterstützen </a:t>
-            </a:r>
-            <a:r>
-              <a:rPr lang="de-DE" dirty="0" smtClean="0"/>
-              <a:t>bei </a:t>
-            </a:r>
-            <a:r>
-              <a:rPr lang="de-DE" dirty="0"/>
-              <a:t>Clean </a:t>
-            </a:r>
-            <a:r>
-              <a:rPr lang="de-DE" dirty="0" smtClean="0"/>
-              <a:t>Code-Entwicklung</a:t>
-            </a:r>
-          </a:p>
-          <a:p>
-            <a:endParaRPr lang="de-DE" dirty="0"/>
-          </a:p>
-          <a:p>
-            <a:r>
-              <a:rPr lang="de-DE" dirty="0" err="1"/>
-              <a:t>Heuristiken</a:t>
-            </a:r>
-            <a:r>
-              <a:rPr lang="de-DE" dirty="0"/>
-              <a:t> </a:t>
-            </a:r>
-            <a:r>
-              <a:rPr lang="de-DE" dirty="0" smtClean="0"/>
-              <a:t>der Histogramme erkennen</a:t>
-            </a:r>
-            <a:endParaRPr lang="de-DE" dirty="0"/>
-          </a:p>
-          <a:p>
-            <a:r>
-              <a:rPr lang="de-DE" dirty="0" smtClean="0"/>
-              <a:t>Softwarequalitätsindex (SQI</a:t>
-            </a:r>
-            <a:r>
-              <a:rPr lang="de-DE" dirty="0"/>
-              <a:t>) </a:t>
-            </a:r>
-            <a:r>
-              <a:rPr lang="de-DE" dirty="0" smtClean="0"/>
-              <a:t>berechnen</a:t>
-            </a:r>
-          </a:p>
-          <a:p>
-            <a:r>
-              <a:rPr lang="de-DE" dirty="0" smtClean="0"/>
-              <a:t>Evaluierung </a:t>
-            </a:r>
-            <a:r>
-              <a:rPr lang="de-DE" dirty="0"/>
-              <a:t>von </a:t>
-            </a:r>
-            <a:r>
-              <a:rPr lang="de-DE" dirty="0" smtClean="0"/>
-              <a:t>Beispielaufgabe </a:t>
-            </a:r>
-            <a:r>
-              <a:rPr lang="de-DE" dirty="0"/>
-              <a:t>(</a:t>
-            </a:r>
-            <a:r>
-              <a:rPr lang="de-DE" dirty="0" err="1" smtClean="0"/>
-              <a:t>andrena</a:t>
-            </a:r>
-            <a:r>
-              <a:rPr lang="de-DE" dirty="0" smtClean="0"/>
-              <a:t>-Kurs</a:t>
-            </a:r>
-            <a:r>
-              <a:rPr lang="de-DE" dirty="0"/>
-              <a:t>)</a:t>
-            </a:r>
-          </a:p>
-          <a:p>
-            <a:pPr marL="0" indent="0">
-              <a:buNone/>
-            </a:pPr>
-            <a:endParaRPr lang="de-DE" dirty="0"/>
-          </a:p>
-          <a:p>
-            <a:endParaRPr lang="de-DE" dirty="0"/>
-          </a:p>
-        </p:txBody>
-      </p:sp>
-    </p:spTree>
-    <p:extLst>
-      <p:ext uri="{BB962C8B-B14F-4D97-AF65-F5344CB8AC3E}">
-        <p14:creationId xmlns:p14="http://schemas.microsoft.com/office/powerpoint/2010/main" val="3010698932"/>
-      </p:ext>
-    </p:extLst>
-  </p:cSld>
-  <p:clrMapOvr>
-    <a:masterClrMapping/>
-  </p:clrMapOvr>
-  <p:transition>
-    <p:fade/>
-  </p:transition>
-  <p:timing>
-    <p:tnLst>
-      <p:par>
-        <p:cTn id="1" dur="indefinite" restart="never" nodeType="tmRoot"/>
-      </p:par>
-    </p:tnLst>
-  </p:timing>
-</p:sld>
-</file>
-
-<file path=ppt/slides/slide50.xml><?xml version="1.0" encoding="utf-8"?>
+<file path=ppt/slides/slide52.xml><?xml version="1.0" encoding="utf-8"?>
 <p:sld xmlns:a="http://schemas.openxmlformats.org/drawingml/2006/main" xmlns:r="http://schemas.openxmlformats.org/officeDocument/2006/relationships" xmlns:p="http://schemas.openxmlformats.org/presentationml/2006/main">
   <p:cSld>
     <p:spTree>
@@ -41922,7 +42477,7 @@
             <a:fld id="{CBC0F77A-B02C-46ED-92AE-5313E2DEEECD}" type="datetime1">
               <a:rPr lang="de-DE" smtClean="0"/>
               <a:pPr/>
-              <a:t>30.08.2012</a:t>
+              <a:t>07.09.2012</a:t>
             </a:fld>
             <a:endParaRPr lang="de-DE"/>
           </a:p>
@@ -41946,7 +42501,7 @@
             <a:fld id="{8D677B59-25B7-4E9E-8A1D-B1026FACA9B2}" type="slidenum">
               <a:rPr lang="de-DE" smtClean="0"/>
               <a:pPr/>
-              <a:t>50</a:t>
+              <a:t>52</a:t>
             </a:fld>
             <a:endParaRPr lang="de-DE"/>
           </a:p>
@@ -42058,7 +42613,7 @@
 </p:sld>
 </file>
 
-<file path=ppt/slides/slide51.xml><?xml version="1.0" encoding="utf-8"?>
+<file path=ppt/slides/slide53.xml><?xml version="1.0" encoding="utf-8"?>
 <p:sld xmlns:a="http://schemas.openxmlformats.org/drawingml/2006/main" xmlns:r="http://schemas.openxmlformats.org/officeDocument/2006/relationships" xmlns:p="http://schemas.openxmlformats.org/presentationml/2006/main">
   <p:cSld>
     <p:spTree>
@@ -42125,7 +42680,7 @@
             <a:fld id="{CBC0F77A-B02C-46ED-92AE-5313E2DEEECD}" type="datetime1">
               <a:rPr lang="de-DE" smtClean="0"/>
               <a:pPr/>
-              <a:t>30.08.2012</a:t>
+              <a:t>07.09.2012</a:t>
             </a:fld>
             <a:endParaRPr lang="de-DE"/>
           </a:p>
@@ -42149,7 +42704,7 @@
             <a:fld id="{8D677B59-25B7-4E9E-8A1D-B1026FACA9B2}" type="slidenum">
               <a:rPr lang="de-DE" smtClean="0"/>
               <a:pPr/>
-              <a:t>51</a:t>
+              <a:t>53</a:t>
             </a:fld>
             <a:endParaRPr lang="de-DE"/>
           </a:p>
@@ -42207,7 +42762,7 @@
 </p:sld>
 </file>
 
-<file path=ppt/slides/slide52.xml><?xml version="1.0" encoding="utf-8"?>
+<file path=ppt/slides/slide54.xml><?xml version="1.0" encoding="utf-8"?>
 <p:sld xmlns:a="http://schemas.openxmlformats.org/drawingml/2006/main" xmlns:r="http://schemas.openxmlformats.org/officeDocument/2006/relationships" xmlns:p="http://schemas.openxmlformats.org/presentationml/2006/main">
   <p:cSld>
     <p:spTree>
@@ -42274,7 +42829,7 @@
             <a:fld id="{CBC0F77A-B02C-46ED-92AE-5313E2DEEECD}" type="datetime1">
               <a:rPr lang="de-DE" smtClean="0"/>
               <a:pPr/>
-              <a:t>30.08.2012</a:t>
+              <a:t>07.09.2012</a:t>
             </a:fld>
             <a:endParaRPr lang="de-DE"/>
           </a:p>
@@ -42298,7 +42853,7 @@
             <a:fld id="{8D677B59-25B7-4E9E-8A1D-B1026FACA9B2}" type="slidenum">
               <a:rPr lang="de-DE" smtClean="0"/>
               <a:pPr/>
-              <a:t>52</a:t>
+              <a:t>54</a:t>
             </a:fld>
             <a:endParaRPr lang="de-DE"/>
           </a:p>
@@ -42356,7 +42911,7 @@
 </p:sld>
 </file>
 
-<file path=ppt/slides/slide53.xml><?xml version="1.0" encoding="utf-8"?>
+<file path=ppt/slides/slide55.xml><?xml version="1.0" encoding="utf-8"?>
 <p:sld xmlns:a="http://schemas.openxmlformats.org/drawingml/2006/main" xmlns:r="http://schemas.openxmlformats.org/officeDocument/2006/relationships" xmlns:p="http://schemas.openxmlformats.org/presentationml/2006/main">
   <p:cSld>
     <p:spTree>
@@ -42422,7 +42977,7 @@
             <a:fld id="{CBC0F77A-B02C-46ED-92AE-5313E2DEEECD}" type="datetime1">
               <a:rPr lang="de-DE" smtClean="0"/>
               <a:pPr/>
-              <a:t>30.08.2012</a:t>
+              <a:t>07.09.2012</a:t>
             </a:fld>
             <a:endParaRPr lang="de-DE"/>
           </a:p>
@@ -42446,7 +43001,7 @@
             <a:fld id="{8D677B59-25B7-4E9E-8A1D-B1026FACA9B2}" type="slidenum">
               <a:rPr lang="de-DE" smtClean="0"/>
               <a:pPr/>
-              <a:t>53</a:t>
+              <a:t>55</a:t>
             </a:fld>
             <a:endParaRPr lang="de-DE"/>
           </a:p>
@@ -42504,7 +43059,7 @@
 </p:sld>
 </file>
 
-<file path=ppt/slides/slide54.xml><?xml version="1.0" encoding="utf-8"?>
+<file path=ppt/slides/slide56.xml><?xml version="1.0" encoding="utf-8"?>
 <p:sld xmlns:a="http://schemas.openxmlformats.org/drawingml/2006/main" xmlns:r="http://schemas.openxmlformats.org/officeDocument/2006/relationships" xmlns:p="http://schemas.openxmlformats.org/presentationml/2006/main">
   <p:cSld>
     <p:spTree>
@@ -42566,7 +43121,7 @@
             <a:fld id="{1B016BD9-B961-4061-825C-528CF92485FD}" type="datetime1">
               <a:rPr lang="de-DE" smtClean="0"/>
               <a:pPr/>
-              <a:t>30.08.2012</a:t>
+              <a:t>07.09.2012</a:t>
             </a:fld>
             <a:endParaRPr lang="de-DE"/>
           </a:p>
@@ -42590,7 +43145,7 @@
             <a:fld id="{A437370E-0A3A-4D85-96CB-71DC38947A9B}" type="slidenum">
               <a:rPr lang="de-DE" smtClean="0"/>
               <a:pPr/>
-              <a:t>54</a:t>
+              <a:t>56</a:t>
             </a:fld>
             <a:endParaRPr lang="de-DE"/>
           </a:p>
@@ -42644,349 +43199,6 @@
 </p:sld>
 </file>
 
-<file path=ppt/slides/slide55.xml><?xml version="1.0" encoding="utf-8"?>
-<p:sld xmlns:a="http://schemas.openxmlformats.org/drawingml/2006/main" xmlns:r="http://schemas.openxmlformats.org/officeDocument/2006/relationships" xmlns:p="http://schemas.openxmlformats.org/presentationml/2006/main">
-  <p:cSld>
-    <p:spTree>
-      <p:nvGrpSpPr>
-        <p:cNvPr id="1" name=""/>
-        <p:cNvGrpSpPr/>
-        <p:nvPr/>
-      </p:nvGrpSpPr>
-      <p:grpSpPr>
-        <a:xfrm>
-          <a:off x="0" y="0"/>
-          <a:ext cx="0" cy="0"/>
-          <a:chOff x="0" y="0"/>
-          <a:chExt cx="0" cy="0"/>
-        </a:xfrm>
-      </p:grpSpPr>
-      <p:sp>
-        <p:nvSpPr>
-          <p:cNvPr id="6" name="Titel 5"/>
-          <p:cNvSpPr>
-            <a:spLocks noGrp="1"/>
-          </p:cNvSpPr>
-          <p:nvPr>
-            <p:ph type="title"/>
-          </p:nvPr>
-        </p:nvSpPr>
-        <p:spPr/>
-        <p:txBody>
-          <a:bodyPr/>
-          <a:lstStyle/>
-          <a:p>
-            <a:pPr marL="457200" indent="-457200"/>
-            <a:r>
-              <a:rPr lang="de-DE" dirty="0" smtClean="0"/>
-              <a:t>Zusammenfassung</a:t>
-            </a:r>
-            <a:endParaRPr lang="de-DE" dirty="0"/>
-          </a:p>
-        </p:txBody>
-      </p:sp>
-      <p:sp>
-        <p:nvSpPr>
-          <p:cNvPr id="7" name="Textplatzhalter 6"/>
-          <p:cNvSpPr>
-            <a:spLocks noGrp="1"/>
-          </p:cNvSpPr>
-          <p:nvPr>
-            <p:ph type="body" idx="1"/>
-          </p:nvPr>
-        </p:nvSpPr>
-        <p:spPr/>
-        <p:txBody>
-          <a:bodyPr/>
-          <a:lstStyle/>
-          <a:p>
-            <a:r>
-              <a:rPr lang="de-DE" b="1" dirty="0" smtClean="0"/>
-              <a:t>Usus.NET</a:t>
-            </a:r>
-          </a:p>
-          <a:p>
-            <a:r>
-              <a:rPr lang="de-DE" dirty="0" smtClean="0"/>
-              <a:t>Visual Studio-Erweiterung zur statischen Code-Analyse</a:t>
-            </a:r>
-            <a:endParaRPr lang="de-DE" dirty="0"/>
-          </a:p>
-        </p:txBody>
-      </p:sp>
-      <p:sp>
-        <p:nvSpPr>
-          <p:cNvPr id="4" name="Datumsplatzhalter 3"/>
-          <p:cNvSpPr>
-            <a:spLocks noGrp="1"/>
-          </p:cNvSpPr>
-          <p:nvPr>
-            <p:ph type="dt" sz="half" idx="10"/>
-          </p:nvPr>
-        </p:nvSpPr>
-        <p:spPr/>
-        <p:txBody>
-          <a:bodyPr/>
-          <a:lstStyle/>
-          <a:p>
-            <a:fld id="{CBC0F77A-B02C-46ED-92AE-5313E2DEEECD}" type="datetime1">
-              <a:rPr lang="de-DE" smtClean="0"/>
-              <a:pPr/>
-              <a:t>30.08.2012</a:t>
-            </a:fld>
-            <a:endParaRPr lang="de-DE"/>
-          </a:p>
-        </p:txBody>
-      </p:sp>
-      <p:sp>
-        <p:nvSpPr>
-          <p:cNvPr id="5" name="Foliennummernplatzhalter 4"/>
-          <p:cNvSpPr>
-            <a:spLocks noGrp="1"/>
-          </p:cNvSpPr>
-          <p:nvPr>
-            <p:ph type="sldNum" sz="quarter" idx="12"/>
-          </p:nvPr>
-        </p:nvSpPr>
-        <p:spPr/>
-        <p:txBody>
-          <a:bodyPr/>
-          <a:lstStyle/>
-          <a:p>
-            <a:fld id="{8D677B59-25B7-4E9E-8A1D-B1026FACA9B2}" type="slidenum">
-              <a:rPr lang="de-DE" smtClean="0"/>
-              <a:pPr/>
-              <a:t>55</a:t>
-            </a:fld>
-            <a:endParaRPr lang="de-DE"/>
-          </a:p>
-        </p:txBody>
-      </p:sp>
-    </p:spTree>
-    <p:extLst>
-      <p:ext uri="{BB962C8B-B14F-4D97-AF65-F5344CB8AC3E}">
-        <p14:creationId xmlns:p14="http://schemas.microsoft.com/office/powerpoint/2010/main" val="629067456"/>
-      </p:ext>
-    </p:extLst>
-  </p:cSld>
-  <p:clrMapOvr>
-    <a:masterClrMapping/>
-  </p:clrMapOvr>
-  <p:transition>
-    <p:fade/>
-  </p:transition>
-  <p:timing>
-    <p:tnLst>
-      <p:par>
-        <p:cTn id="1" dur="indefinite" restart="never" nodeType="tmRoot"/>
-      </p:par>
-    </p:tnLst>
-  </p:timing>
-</p:sld>
-</file>
-
-<file path=ppt/slides/slide56.xml><?xml version="1.0" encoding="utf-8"?>
-<p:sld xmlns:a="http://schemas.openxmlformats.org/drawingml/2006/main" xmlns:r="http://schemas.openxmlformats.org/officeDocument/2006/relationships" xmlns:p="http://schemas.openxmlformats.org/presentationml/2006/main">
-  <p:cSld>
-    <p:spTree>
-      <p:nvGrpSpPr>
-        <p:cNvPr id="1" name=""/>
-        <p:cNvGrpSpPr/>
-        <p:nvPr/>
-      </p:nvGrpSpPr>
-      <p:grpSpPr>
-        <a:xfrm>
-          <a:off x="0" y="0"/>
-          <a:ext cx="0" cy="0"/>
-          <a:chOff x="0" y="0"/>
-          <a:chExt cx="0" cy="0"/>
-        </a:xfrm>
-      </p:grpSpPr>
-      <p:sp>
-        <p:nvSpPr>
-          <p:cNvPr id="6" name="Titel 5"/>
-          <p:cNvSpPr>
-            <a:spLocks noGrp="1"/>
-          </p:cNvSpPr>
-          <p:nvPr>
-            <p:ph type="title"/>
-          </p:nvPr>
-        </p:nvSpPr>
-        <p:spPr/>
-        <p:txBody>
-          <a:bodyPr/>
-          <a:lstStyle/>
-          <a:p>
-            <a:pPr marL="457200" indent="-457200"/>
-            <a:r>
-              <a:rPr lang="de-DE" dirty="0" smtClean="0"/>
-              <a:t>Zusammenfassung</a:t>
-            </a:r>
-            <a:endParaRPr lang="de-DE" dirty="0"/>
-          </a:p>
-        </p:txBody>
-      </p:sp>
-      <p:sp>
-        <p:nvSpPr>
-          <p:cNvPr id="7" name="Textplatzhalter 6"/>
-          <p:cNvSpPr>
-            <a:spLocks noGrp="1"/>
-          </p:cNvSpPr>
-          <p:nvPr>
-            <p:ph idx="1"/>
-          </p:nvPr>
-        </p:nvSpPr>
-        <p:spPr/>
-        <p:txBody>
-          <a:bodyPr/>
-          <a:lstStyle/>
-          <a:p>
-            <a:r>
-              <a:rPr lang="de-DE" b="1" dirty="0" smtClean="0"/>
-              <a:t>Usus.NET</a:t>
-            </a:r>
-            <a:r>
-              <a:rPr lang="de-DE" dirty="0" smtClean="0"/>
-              <a:t> - Visual Studio-Erweiterung zur statischen Code-Analyse</a:t>
-            </a:r>
-          </a:p>
-          <a:p>
-            <a:r>
-              <a:rPr lang="de-DE" dirty="0" smtClean="0"/>
-              <a:t>Berechnung aller </a:t>
-            </a:r>
-            <a:r>
-              <a:rPr lang="de-DE" dirty="0" err="1" smtClean="0"/>
-              <a:t>Softwaremetriken</a:t>
-            </a:r>
-            <a:r>
-              <a:rPr lang="de-DE" dirty="0" smtClean="0"/>
-              <a:t> von Usus für Java pro </a:t>
-            </a:r>
-            <a:r>
-              <a:rPr lang="de-DE" dirty="0" err="1" smtClean="0"/>
-              <a:t>Build</a:t>
-            </a:r>
-            <a:endParaRPr lang="de-DE" dirty="0"/>
-          </a:p>
-          <a:p>
-            <a:r>
-              <a:rPr lang="de-DE" dirty="0" smtClean="0"/>
-              <a:t>Fast alle Funktionen von Usus für Java</a:t>
-            </a:r>
-          </a:p>
-          <a:p>
-            <a:r>
-              <a:rPr lang="de-DE" dirty="0" smtClean="0"/>
-              <a:t>Clean Code-Unterstützung</a:t>
-            </a:r>
-            <a:endParaRPr lang="de-DE" dirty="0"/>
-          </a:p>
-          <a:p>
-            <a:r>
-              <a:rPr lang="de-DE" dirty="0" smtClean="0"/>
-              <a:t>Berechnung des </a:t>
-            </a:r>
-            <a:r>
-              <a:rPr lang="de-DE" dirty="0" err="1" smtClean="0"/>
-              <a:t>andrena</a:t>
-            </a:r>
-            <a:r>
-              <a:rPr lang="de-DE" dirty="0" smtClean="0"/>
-              <a:t>-Softwarequalitätsindex</a:t>
-            </a:r>
-          </a:p>
-          <a:p>
-            <a:r>
-              <a:rPr lang="de-DE" dirty="0" smtClean="0"/>
-              <a:t>Evaluierung der </a:t>
-            </a:r>
-            <a:r>
-              <a:rPr lang="de-DE" dirty="0" err="1" smtClean="0"/>
-              <a:t>Refactoring</a:t>
-            </a:r>
-            <a:r>
-              <a:rPr lang="de-DE" dirty="0" smtClean="0"/>
-              <a:t>-Übung des ASE-Kurs</a:t>
-            </a:r>
-            <a:endParaRPr lang="de-DE" dirty="0"/>
-          </a:p>
-          <a:p>
-            <a:endParaRPr lang="de-DE" dirty="0"/>
-          </a:p>
-        </p:txBody>
-      </p:sp>
-      <p:sp>
-        <p:nvSpPr>
-          <p:cNvPr id="4" name="Datumsplatzhalter 3"/>
-          <p:cNvSpPr>
-            <a:spLocks noGrp="1"/>
-          </p:cNvSpPr>
-          <p:nvPr>
-            <p:ph type="dt" sz="half" idx="10"/>
-          </p:nvPr>
-        </p:nvSpPr>
-        <p:spPr/>
-        <p:txBody>
-          <a:bodyPr/>
-          <a:lstStyle/>
-          <a:p>
-            <a:fld id="{CBC0F77A-B02C-46ED-92AE-5313E2DEEECD}" type="datetime1">
-              <a:rPr lang="de-DE" smtClean="0"/>
-              <a:pPr/>
-              <a:t>30.08.2012</a:t>
-            </a:fld>
-            <a:endParaRPr lang="de-DE"/>
-          </a:p>
-        </p:txBody>
-      </p:sp>
-      <p:sp>
-        <p:nvSpPr>
-          <p:cNvPr id="5" name="Foliennummernplatzhalter 4"/>
-          <p:cNvSpPr>
-            <a:spLocks noGrp="1"/>
-          </p:cNvSpPr>
-          <p:nvPr>
-            <p:ph type="sldNum" sz="quarter" idx="12"/>
-          </p:nvPr>
-        </p:nvSpPr>
-        <p:spPr/>
-        <p:txBody>
-          <a:bodyPr/>
-          <a:lstStyle/>
-          <a:p>
-            <a:fld id="{8D677B59-25B7-4E9E-8A1D-B1026FACA9B2}" type="slidenum">
-              <a:rPr lang="de-DE" smtClean="0"/>
-              <a:pPr/>
-              <a:t>56</a:t>
-            </a:fld>
-            <a:endParaRPr lang="de-DE"/>
-          </a:p>
-        </p:txBody>
-      </p:sp>
-    </p:spTree>
-    <p:extLst>
-      <p:ext uri="{BB962C8B-B14F-4D97-AF65-F5344CB8AC3E}">
-        <p14:creationId xmlns:p14="http://schemas.microsoft.com/office/powerpoint/2010/main" val="875087172"/>
-      </p:ext>
-    </p:extLst>
-  </p:cSld>
-  <p:clrMapOvr>
-    <a:masterClrMapping/>
-  </p:clrMapOvr>
-  <p:transition>
-    <p:fade/>
-  </p:transition>
-  <p:timing>
-    <p:tnLst>
-      <p:par>
-        <p:cTn id="1" dur="indefinite" restart="never" nodeType="tmRoot"/>
-      </p:par>
-    </p:tnLst>
-  </p:timing>
-</p:sld>
-</file>
-
 <file path=ppt/slides/slide57.xml><?xml version="1.0" encoding="utf-8"?>
 <p:sld xmlns:a="http://schemas.openxmlformats.org/drawingml/2006/main" xmlns:r="http://schemas.openxmlformats.org/officeDocument/2006/relationships" xmlns:p="http://schemas.openxmlformats.org/presentationml/2006/main">
   <p:cSld>
@@ -43022,7 +43234,7 @@
             <a:pPr marL="457200" indent="-457200"/>
             <a:r>
               <a:rPr lang="de-DE" dirty="0" smtClean="0"/>
-              <a:t>Ausblick</a:t>
+              <a:t>Zusammenfassung</a:t>
             </a:r>
             <a:endParaRPr lang="de-DE" dirty="0"/>
           </a:p>
@@ -43075,7 +43287,7 @@
             <a:fld id="{CBC0F77A-B02C-46ED-92AE-5313E2DEEECD}" type="datetime1">
               <a:rPr lang="de-DE" smtClean="0"/>
               <a:pPr/>
-              <a:t>30.08.2012</a:t>
+              <a:t>07.09.2012</a:t>
             </a:fld>
             <a:endParaRPr lang="de-DE"/>
           </a:p>
@@ -43108,7 +43320,7 @@
     </p:spTree>
     <p:extLst>
       <p:ext uri="{BB962C8B-B14F-4D97-AF65-F5344CB8AC3E}">
-        <p14:creationId xmlns:p14="http://schemas.microsoft.com/office/powerpoint/2010/main" val="92160614"/>
+        <p14:creationId xmlns:p14="http://schemas.microsoft.com/office/powerpoint/2010/main" val="629067456"/>
       </p:ext>
     </p:extLst>
   </p:cSld>
@@ -43163,7 +43375,7 @@
             <a:pPr marL="457200" indent="-457200"/>
             <a:r>
               <a:rPr lang="de-DE" dirty="0" smtClean="0"/>
-              <a:t>Ausblick</a:t>
+              <a:t>Zusammenfassung</a:t>
             </a:r>
             <a:endParaRPr lang="de-DE" dirty="0"/>
           </a:p>
@@ -43185,81 +43397,76 @@
           <a:lstStyle/>
           <a:p>
             <a:r>
+              <a:rPr lang="de-DE" b="1" dirty="0" smtClean="0"/>
+              <a:t>Usus.NET</a:t>
+            </a:r>
+            <a:r>
               <a:rPr lang="de-DE" dirty="0" smtClean="0"/>
-              <a:t>Visualisierung des Klassen- und Namespace-Graph</a:t>
+              <a:t> - Visual Studio-Erweiterung zur statischen Code-Analyse</a:t>
             </a:r>
           </a:p>
           <a:p>
             <a:r>
               <a:rPr lang="de-DE" dirty="0" smtClean="0"/>
-              <a:t>Kleinster Zyklus in einem Namespace-Zyklus finden</a:t>
-            </a:r>
-          </a:p>
-          <a:p>
+              <a:t>Berechnung aller </a:t>
+            </a:r>
+            <a:r>
+              <a:rPr lang="de-DE" dirty="0" err="1" smtClean="0"/>
+              <a:t>Softwaremetriken</a:t>
+            </a:r>
             <a:r>
               <a:rPr lang="de-DE" dirty="0" smtClean="0"/>
-              <a:t>Testabdeckung automatisiert bestimmen (SQI, CRAP)</a:t>
-            </a:r>
+              <a:t> von Usus für Java pro </a:t>
+            </a:r>
+            <a:r>
+              <a:rPr lang="de-DE" dirty="0" err="1" smtClean="0"/>
+              <a:t>Build</a:t>
+            </a:r>
+            <a:endParaRPr lang="de-DE" dirty="0"/>
           </a:p>
           <a:p>
             <a:r>
               <a:rPr lang="de-DE" dirty="0" smtClean="0"/>
-              <a:t>Mehr Verteilungen (Pareto (The </a:t>
-            </a:r>
-            <a:r>
-              <a:rPr lang="de-DE" dirty="0" err="1"/>
-              <a:t>Braithwaite</a:t>
-            </a:r>
-            <a:r>
-              <a:rPr lang="de-DE" dirty="0"/>
-              <a:t> </a:t>
+              <a:t>Fast alle Funktionen von Usus für Java</a:t>
+            </a:r>
+          </a:p>
+          <a:p>
+            <a:r>
+              <a:rPr lang="de-DE" dirty="0" smtClean="0"/>
+              <a:t>Clean Code-Unterstützung</a:t>
+            </a:r>
+            <a:endParaRPr lang="de-DE" dirty="0"/>
+          </a:p>
+          <a:p>
+            <a:r>
+              <a:rPr lang="de-DE" dirty="0" smtClean="0"/>
+              <a:t>Berechnung des </a:t>
             </a:r>
             <a:r>
               <a:rPr lang="de-DE" dirty="0" err="1" smtClean="0"/>
-              <a:t>Correlation</a:t>
+              <a:t>andrena</a:t>
             </a:r>
             <a:r>
               <a:rPr lang="de-DE" dirty="0" smtClean="0"/>
-              <a:t>), </a:t>
-            </a:r>
-            <a:r>
-              <a:rPr lang="de-DE" dirty="0" err="1" smtClean="0"/>
-              <a:t>Poisson</a:t>
-            </a:r>
+              <a:t>-Softwarequalitätsindex</a:t>
+            </a:r>
+          </a:p>
+          <a:p>
             <a:r>
               <a:rPr lang="de-DE" dirty="0" smtClean="0"/>
-              <a:t>)</a:t>
-            </a:r>
-          </a:p>
-          <a:p>
+              <a:t>Evaluierung der </a:t>
+            </a:r>
             <a:r>
               <a:rPr lang="de-DE" dirty="0" err="1" smtClean="0"/>
               <a:t>Refactoring</a:t>
             </a:r>
             <a:r>
               <a:rPr lang="de-DE" dirty="0" smtClean="0"/>
-              <a:t>-Vorschläge</a:t>
-            </a:r>
-          </a:p>
-          <a:p>
-            <a:r>
-              <a:rPr lang="de-DE" dirty="0" smtClean="0"/>
-              <a:t>Automatisierte </a:t>
-            </a:r>
-            <a:r>
-              <a:rPr lang="de-DE" dirty="0" err="1" smtClean="0"/>
-              <a:t>Refactorings</a:t>
-            </a:r>
-            <a:endParaRPr lang="de-DE" dirty="0" smtClean="0"/>
-          </a:p>
-          <a:p>
-            <a:endParaRPr lang="de-DE" dirty="0" smtClean="0"/>
-          </a:p>
-          <a:p>
-            <a:r>
-              <a:rPr lang="de-DE" dirty="0" smtClean="0"/>
-              <a:t>Usus.NET als Grundlage weitere Trends zu implementieren/auszuprobieren</a:t>
-            </a:r>
+              <a:t>-Übung des ASE-Kurs</a:t>
+            </a:r>
+            <a:endParaRPr lang="de-DE" dirty="0"/>
+          </a:p>
+          <a:p>
             <a:endParaRPr lang="de-DE" dirty="0"/>
           </a:p>
         </p:txBody>
@@ -43282,7 +43489,7 @@
             <a:fld id="{CBC0F77A-B02C-46ED-92AE-5313E2DEEECD}" type="datetime1">
               <a:rPr lang="de-DE" smtClean="0"/>
               <a:pPr/>
-              <a:t>30.08.2012</a:t>
+              <a:t>07.09.2012</a:t>
             </a:fld>
             <a:endParaRPr lang="de-DE"/>
           </a:p>
@@ -43315,7 +43522,7 @@
     </p:spTree>
     <p:extLst>
       <p:ext uri="{BB962C8B-B14F-4D97-AF65-F5344CB8AC3E}">
-        <p14:creationId xmlns:p14="http://schemas.microsoft.com/office/powerpoint/2010/main" val="1873838932"/>
+        <p14:creationId xmlns:p14="http://schemas.microsoft.com/office/powerpoint/2010/main" val="875087172"/>
       </p:ext>
     </p:extLst>
   </p:cSld>
@@ -43354,40 +43561,54 @@
       </p:grpSpPr>
       <p:sp>
         <p:nvSpPr>
-          <p:cNvPr id="7" name="Inhaltsplatzhalter 6"/>
+          <p:cNvPr id="6" name="Titel 5"/>
           <p:cNvSpPr>
             <a:spLocks noGrp="1"/>
           </p:cNvSpPr>
           <p:nvPr>
-            <p:ph idx="1"/>
+            <p:ph type="title"/>
           </p:nvPr>
         </p:nvSpPr>
-        <p:spPr>
-          <a:xfrm>
-            <a:off x="2771800" y="2924944"/>
-            <a:ext cx="5915000" cy="3201219"/>
-          </a:xfrm>
-        </p:spPr>
+        <p:spPr/>
         <p:txBody>
           <a:bodyPr/>
           <a:lstStyle/>
           <a:p>
-            <a:pPr marL="0" indent="0">
-              <a:buNone/>
-            </a:pPr>
-            <a:r>
-              <a:rPr lang="de-DE" sz="4000" dirty="0" smtClean="0"/>
-              <a:t>&lt;/</a:t>
-            </a:r>
-            <a:r>
-              <a:rPr lang="de-DE" sz="4000" dirty="0" err="1" smtClean="0"/>
-              <a:t>präsentation</a:t>
-            </a:r>
-            <a:r>
-              <a:rPr lang="de-DE" sz="4000" dirty="0" smtClean="0"/>
-              <a:t>&gt;</a:t>
-            </a:r>
-            <a:endParaRPr lang="de-DE" sz="4000" dirty="0"/>
+            <a:pPr marL="457200" indent="-457200"/>
+            <a:r>
+              <a:rPr lang="de-DE" dirty="0" smtClean="0"/>
+              <a:t>Ausblick</a:t>
+            </a:r>
+            <a:endParaRPr lang="de-DE" dirty="0"/>
+          </a:p>
+        </p:txBody>
+      </p:sp>
+      <p:sp>
+        <p:nvSpPr>
+          <p:cNvPr id="7" name="Textplatzhalter 6"/>
+          <p:cNvSpPr>
+            <a:spLocks noGrp="1"/>
+          </p:cNvSpPr>
+          <p:nvPr>
+            <p:ph type="body" idx="1"/>
+          </p:nvPr>
+        </p:nvSpPr>
+        <p:spPr/>
+        <p:txBody>
+          <a:bodyPr/>
+          <a:lstStyle/>
+          <a:p>
+            <a:r>
+              <a:rPr lang="de-DE" b="1" dirty="0" smtClean="0"/>
+              <a:t>Usus.NET</a:t>
+            </a:r>
+          </a:p>
+          <a:p>
+            <a:r>
+              <a:rPr lang="de-DE" dirty="0" smtClean="0"/>
+              <a:t>Visual Studio-Erweiterung zur statischen Code-Analyse</a:t>
+            </a:r>
+            <a:endParaRPr lang="de-DE" dirty="0"/>
           </a:p>
         </p:txBody>
       </p:sp>
@@ -43406,10 +43627,10 @@
           <a:bodyPr/>
           <a:lstStyle/>
           <a:p>
-            <a:fld id="{1B016BD9-B961-4061-825C-528CF92485FD}" type="datetime1">
+            <a:fld id="{CBC0F77A-B02C-46ED-92AE-5313E2DEEECD}" type="datetime1">
               <a:rPr lang="de-DE" smtClean="0"/>
               <a:pPr/>
-              <a:t>30.08.2012</a:t>
+              <a:t>07.09.2012</a:t>
             </a:fld>
             <a:endParaRPr lang="de-DE"/>
           </a:p>
@@ -43430,7 +43651,7 @@
           <a:bodyPr/>
           <a:lstStyle/>
           <a:p>
-            <a:fld id="{A437370E-0A3A-4D85-96CB-71DC38947A9B}" type="slidenum">
+            <a:fld id="{8D677B59-25B7-4E9E-8A1D-B1026FACA9B2}" type="slidenum">
               <a:rPr lang="de-DE" smtClean="0"/>
               <a:pPr/>
               <a:t>59</a:t>
@@ -43442,7 +43663,7 @@
     </p:spTree>
     <p:extLst>
       <p:ext uri="{BB962C8B-B14F-4D97-AF65-F5344CB8AC3E}">
-        <p14:creationId xmlns:p14="http://schemas.microsoft.com/office/powerpoint/2010/main" val="3874965935"/>
+        <p14:creationId xmlns:p14="http://schemas.microsoft.com/office/powerpoint/2010/main" val="92160614"/>
       </p:ext>
     </p:extLst>
   </p:cSld>
@@ -43549,7 +43770,7 @@
             <a:fld id="{CBC0F77A-B02C-46ED-92AE-5313E2DEEECD}" type="datetime1">
               <a:rPr lang="de-DE" smtClean="0"/>
               <a:pPr/>
-              <a:t>30.08.2012</a:t>
+              <a:t>07.09.2012</a:t>
             </a:fld>
             <a:endParaRPr lang="de-DE"/>
           </a:p>
@@ -43583,6 +43804,340 @@
     <p:extLst>
       <p:ext uri="{BB962C8B-B14F-4D97-AF65-F5344CB8AC3E}">
         <p14:creationId xmlns:p14="http://schemas.microsoft.com/office/powerpoint/2010/main" val="3294045501"/>
+      </p:ext>
+    </p:extLst>
+  </p:cSld>
+  <p:clrMapOvr>
+    <a:masterClrMapping/>
+  </p:clrMapOvr>
+  <p:transition>
+    <p:fade/>
+  </p:transition>
+  <p:timing>
+    <p:tnLst>
+      <p:par>
+        <p:cTn id="1" dur="indefinite" restart="never" nodeType="tmRoot"/>
+      </p:par>
+    </p:tnLst>
+  </p:timing>
+</p:sld>
+</file>
+
+<file path=ppt/slides/slide60.xml><?xml version="1.0" encoding="utf-8"?>
+<p:sld xmlns:a="http://schemas.openxmlformats.org/drawingml/2006/main" xmlns:r="http://schemas.openxmlformats.org/officeDocument/2006/relationships" xmlns:p="http://schemas.openxmlformats.org/presentationml/2006/main">
+  <p:cSld>
+    <p:spTree>
+      <p:nvGrpSpPr>
+        <p:cNvPr id="1" name=""/>
+        <p:cNvGrpSpPr/>
+        <p:nvPr/>
+      </p:nvGrpSpPr>
+      <p:grpSpPr>
+        <a:xfrm>
+          <a:off x="0" y="0"/>
+          <a:ext cx="0" cy="0"/>
+          <a:chOff x="0" y="0"/>
+          <a:chExt cx="0" cy="0"/>
+        </a:xfrm>
+      </p:grpSpPr>
+      <p:sp>
+        <p:nvSpPr>
+          <p:cNvPr id="6" name="Titel 5"/>
+          <p:cNvSpPr>
+            <a:spLocks noGrp="1"/>
+          </p:cNvSpPr>
+          <p:nvPr>
+            <p:ph type="title"/>
+          </p:nvPr>
+        </p:nvSpPr>
+        <p:spPr/>
+        <p:txBody>
+          <a:bodyPr/>
+          <a:lstStyle/>
+          <a:p>
+            <a:pPr marL="457200" indent="-457200"/>
+            <a:r>
+              <a:rPr lang="de-DE" dirty="0" smtClean="0"/>
+              <a:t>Ausblick</a:t>
+            </a:r>
+            <a:endParaRPr lang="de-DE" dirty="0"/>
+          </a:p>
+        </p:txBody>
+      </p:sp>
+      <p:sp>
+        <p:nvSpPr>
+          <p:cNvPr id="7" name="Textplatzhalter 6"/>
+          <p:cNvSpPr>
+            <a:spLocks noGrp="1"/>
+          </p:cNvSpPr>
+          <p:nvPr>
+            <p:ph idx="1"/>
+          </p:nvPr>
+        </p:nvSpPr>
+        <p:spPr/>
+        <p:txBody>
+          <a:bodyPr/>
+          <a:lstStyle/>
+          <a:p>
+            <a:r>
+              <a:rPr lang="de-DE" dirty="0" smtClean="0"/>
+              <a:t>Visualisierung des Klassen- und Namespace-Graph</a:t>
+            </a:r>
+          </a:p>
+          <a:p>
+            <a:r>
+              <a:rPr lang="de-DE" dirty="0" smtClean="0"/>
+              <a:t>Kleinster Zyklus in einem Namespace-Zyklus finden</a:t>
+            </a:r>
+          </a:p>
+          <a:p>
+            <a:r>
+              <a:rPr lang="de-DE" dirty="0" smtClean="0"/>
+              <a:t>Testabdeckung automatisiert bestimmen (SQI, CRAP)</a:t>
+            </a:r>
+          </a:p>
+          <a:p>
+            <a:r>
+              <a:rPr lang="de-DE" dirty="0" smtClean="0"/>
+              <a:t>Mehr Verteilungen (Pareto (The </a:t>
+            </a:r>
+            <a:r>
+              <a:rPr lang="de-DE" dirty="0" err="1"/>
+              <a:t>Braithwaite</a:t>
+            </a:r>
+            <a:r>
+              <a:rPr lang="de-DE" dirty="0"/>
+              <a:t> </a:t>
+            </a:r>
+            <a:r>
+              <a:rPr lang="de-DE" dirty="0" err="1" smtClean="0"/>
+              <a:t>Correlation</a:t>
+            </a:r>
+            <a:r>
+              <a:rPr lang="de-DE" dirty="0" smtClean="0"/>
+              <a:t>), </a:t>
+            </a:r>
+            <a:r>
+              <a:rPr lang="de-DE" dirty="0" err="1" smtClean="0"/>
+              <a:t>Poisson</a:t>
+            </a:r>
+            <a:r>
+              <a:rPr lang="de-DE" dirty="0" smtClean="0"/>
+              <a:t>)</a:t>
+            </a:r>
+          </a:p>
+          <a:p>
+            <a:r>
+              <a:rPr lang="de-DE" dirty="0" err="1" smtClean="0"/>
+              <a:t>Refactoring</a:t>
+            </a:r>
+            <a:r>
+              <a:rPr lang="de-DE" dirty="0" smtClean="0"/>
+              <a:t>-Vorschläge</a:t>
+            </a:r>
+          </a:p>
+          <a:p>
+            <a:r>
+              <a:rPr lang="de-DE" dirty="0" smtClean="0"/>
+              <a:t>Automatisierte </a:t>
+            </a:r>
+            <a:r>
+              <a:rPr lang="de-DE" dirty="0" err="1" smtClean="0"/>
+              <a:t>Refactorings</a:t>
+            </a:r>
+            <a:endParaRPr lang="de-DE" dirty="0" smtClean="0"/>
+          </a:p>
+          <a:p>
+            <a:endParaRPr lang="de-DE" dirty="0" smtClean="0"/>
+          </a:p>
+          <a:p>
+            <a:r>
+              <a:rPr lang="de-DE" dirty="0" smtClean="0"/>
+              <a:t>Usus.NET als Grundlage weitere Trends zu implementieren/auszuprobieren</a:t>
+            </a:r>
+            <a:endParaRPr lang="de-DE" dirty="0"/>
+          </a:p>
+        </p:txBody>
+      </p:sp>
+      <p:sp>
+        <p:nvSpPr>
+          <p:cNvPr id="4" name="Datumsplatzhalter 3"/>
+          <p:cNvSpPr>
+            <a:spLocks noGrp="1"/>
+          </p:cNvSpPr>
+          <p:nvPr>
+            <p:ph type="dt" sz="half" idx="10"/>
+          </p:nvPr>
+        </p:nvSpPr>
+        <p:spPr/>
+        <p:txBody>
+          <a:bodyPr/>
+          <a:lstStyle/>
+          <a:p>
+            <a:fld id="{CBC0F77A-B02C-46ED-92AE-5313E2DEEECD}" type="datetime1">
+              <a:rPr lang="de-DE" smtClean="0"/>
+              <a:pPr/>
+              <a:t>07.09.2012</a:t>
+            </a:fld>
+            <a:endParaRPr lang="de-DE"/>
+          </a:p>
+        </p:txBody>
+      </p:sp>
+      <p:sp>
+        <p:nvSpPr>
+          <p:cNvPr id="5" name="Foliennummernplatzhalter 4"/>
+          <p:cNvSpPr>
+            <a:spLocks noGrp="1"/>
+          </p:cNvSpPr>
+          <p:nvPr>
+            <p:ph type="sldNum" sz="quarter" idx="12"/>
+          </p:nvPr>
+        </p:nvSpPr>
+        <p:spPr/>
+        <p:txBody>
+          <a:bodyPr/>
+          <a:lstStyle/>
+          <a:p>
+            <a:fld id="{8D677B59-25B7-4E9E-8A1D-B1026FACA9B2}" type="slidenum">
+              <a:rPr lang="de-DE" smtClean="0"/>
+              <a:pPr/>
+              <a:t>60</a:t>
+            </a:fld>
+            <a:endParaRPr lang="de-DE"/>
+          </a:p>
+        </p:txBody>
+      </p:sp>
+    </p:spTree>
+    <p:extLst>
+      <p:ext uri="{BB962C8B-B14F-4D97-AF65-F5344CB8AC3E}">
+        <p14:creationId xmlns:p14="http://schemas.microsoft.com/office/powerpoint/2010/main" val="1873838932"/>
+      </p:ext>
+    </p:extLst>
+  </p:cSld>
+  <p:clrMapOvr>
+    <a:masterClrMapping/>
+  </p:clrMapOvr>
+  <p:transition>
+    <p:fade/>
+  </p:transition>
+  <p:timing>
+    <p:tnLst>
+      <p:par>
+        <p:cTn id="1" dur="indefinite" restart="never" nodeType="tmRoot"/>
+      </p:par>
+    </p:tnLst>
+  </p:timing>
+</p:sld>
+</file>
+
+<file path=ppt/slides/slide61.xml><?xml version="1.0" encoding="utf-8"?>
+<p:sld xmlns:a="http://schemas.openxmlformats.org/drawingml/2006/main" xmlns:r="http://schemas.openxmlformats.org/officeDocument/2006/relationships" xmlns:p="http://schemas.openxmlformats.org/presentationml/2006/main">
+  <p:cSld>
+    <p:spTree>
+      <p:nvGrpSpPr>
+        <p:cNvPr id="1" name=""/>
+        <p:cNvGrpSpPr/>
+        <p:nvPr/>
+      </p:nvGrpSpPr>
+      <p:grpSpPr>
+        <a:xfrm>
+          <a:off x="0" y="0"/>
+          <a:ext cx="0" cy="0"/>
+          <a:chOff x="0" y="0"/>
+          <a:chExt cx="0" cy="0"/>
+        </a:xfrm>
+      </p:grpSpPr>
+      <p:sp>
+        <p:nvSpPr>
+          <p:cNvPr id="7" name="Inhaltsplatzhalter 6"/>
+          <p:cNvSpPr>
+            <a:spLocks noGrp="1"/>
+          </p:cNvSpPr>
+          <p:nvPr>
+            <p:ph idx="1"/>
+          </p:nvPr>
+        </p:nvSpPr>
+        <p:spPr>
+          <a:xfrm>
+            <a:off x="2771800" y="2924944"/>
+            <a:ext cx="5915000" cy="3201219"/>
+          </a:xfrm>
+        </p:spPr>
+        <p:txBody>
+          <a:bodyPr/>
+          <a:lstStyle/>
+          <a:p>
+            <a:pPr marL="0" indent="0">
+              <a:buNone/>
+            </a:pPr>
+            <a:r>
+              <a:rPr lang="de-DE" sz="4000" dirty="0" smtClean="0"/>
+              <a:t>&lt;/</a:t>
+            </a:r>
+            <a:r>
+              <a:rPr lang="de-DE" sz="4000" dirty="0" err="1" smtClean="0"/>
+              <a:t>präsentation</a:t>
+            </a:r>
+            <a:r>
+              <a:rPr lang="de-DE" sz="4000" dirty="0" smtClean="0"/>
+              <a:t>&gt;</a:t>
+            </a:r>
+            <a:endParaRPr lang="de-DE" sz="4000" dirty="0"/>
+          </a:p>
+        </p:txBody>
+      </p:sp>
+      <p:sp>
+        <p:nvSpPr>
+          <p:cNvPr id="4" name="Datumsplatzhalter 3"/>
+          <p:cNvSpPr>
+            <a:spLocks noGrp="1"/>
+          </p:cNvSpPr>
+          <p:nvPr>
+            <p:ph type="dt" sz="half" idx="10"/>
+          </p:nvPr>
+        </p:nvSpPr>
+        <p:spPr/>
+        <p:txBody>
+          <a:bodyPr/>
+          <a:lstStyle/>
+          <a:p>
+            <a:fld id="{1B016BD9-B961-4061-825C-528CF92485FD}" type="datetime1">
+              <a:rPr lang="de-DE" smtClean="0"/>
+              <a:pPr/>
+              <a:t>07.09.2012</a:t>
+            </a:fld>
+            <a:endParaRPr lang="de-DE"/>
+          </a:p>
+        </p:txBody>
+      </p:sp>
+      <p:sp>
+        <p:nvSpPr>
+          <p:cNvPr id="5" name="Foliennummernplatzhalter 4"/>
+          <p:cNvSpPr>
+            <a:spLocks noGrp="1"/>
+          </p:cNvSpPr>
+          <p:nvPr>
+            <p:ph type="sldNum" sz="quarter" idx="12"/>
+          </p:nvPr>
+        </p:nvSpPr>
+        <p:spPr/>
+        <p:txBody>
+          <a:bodyPr/>
+          <a:lstStyle/>
+          <a:p>
+            <a:fld id="{A437370E-0A3A-4D85-96CB-71DC38947A9B}" type="slidenum">
+              <a:rPr lang="de-DE" smtClean="0"/>
+              <a:pPr/>
+              <a:t>61</a:t>
+            </a:fld>
+            <a:endParaRPr lang="de-DE"/>
+          </a:p>
+        </p:txBody>
+      </p:sp>
+    </p:spTree>
+    <p:extLst>
+      <p:ext uri="{BB962C8B-B14F-4D97-AF65-F5344CB8AC3E}">
+        <p14:creationId xmlns:p14="http://schemas.microsoft.com/office/powerpoint/2010/main" val="3874965935"/>
       </p:ext>
     </p:extLst>
   </p:cSld>
@@ -43664,7 +44219,7 @@
             <a:fld id="{CBC0F77A-B02C-46ED-92AE-5313E2DEEECD}" type="datetime1">
               <a:rPr lang="de-DE" smtClean="0"/>
               <a:pPr/>
-              <a:t>30.08.2012</a:t>
+              <a:t>07.09.2012</a:t>
             </a:fld>
             <a:endParaRPr lang="de-DE"/>
           </a:p>
@@ -43841,7 +44396,7 @@
             <a:fld id="{CBC0F77A-B02C-46ED-92AE-5313E2DEEECD}" type="datetime1">
               <a:rPr lang="de-DE" smtClean="0"/>
               <a:pPr/>
-              <a:t>30.08.2012</a:t>
+              <a:t>07.09.2012</a:t>
             </a:fld>
             <a:endParaRPr lang="de-DE"/>
           </a:p>
@@ -43985,7 +44540,7 @@
             <a:fld id="{CBC0F77A-B02C-46ED-92AE-5313E2DEEECD}" type="datetime1">
               <a:rPr lang="de-DE" smtClean="0"/>
               <a:pPr/>
-              <a:t>30.08.2012</a:t>
+              <a:t>07.09.2012</a:t>
             </a:fld>
             <a:endParaRPr lang="de-DE"/>
           </a:p>

</xml_diff>